<commit_message>
update the process of execution
</commit_message>
<xml_diff>
--- a/CS2225.BaoCaoCuoiKy.pptx
+++ b/CS2225.BaoCaoCuoiKy.pptx
@@ -12918,15 +12918,12 @@
             </a:pPr>
             <a:r>
               <a:rPr lang="en" sz="1600"/>
-              <a:t>Bước 1: thu thập dữ liệu.</a:t>
+              <a:t>Bước 1: thu thập dữ liệu ảnh.</a:t>
             </a:r>
             <a:endParaRPr sz="1600"/>
           </a:p>
           <a:p>
             <a:pPr indent="-330200" lvl="0" marL="457200" rtl="0" algn="l">
-              <a:lnSpc>
-                <a:spcPct val="115000"/>
-              </a:lnSpc>
               <a:spcBef>
                 <a:spcPts val="0"/>
               </a:spcBef>
@@ -12938,23 +12935,12 @@
             </a:pPr>
             <a:r>
               <a:rPr lang="en" sz="1600"/>
-              <a:t>Bước 2: sử dụng trang </a:t>
-            </a:r>
-            <a:r>
-              <a:rPr lang="en" sz="1600"/>
-              <a:t>roboflow</a:t>
-            </a:r>
-            <a:r>
-              <a:rPr lang="en" sz="1600"/>
-              <a:t> tăng cường thêm dữ liệu trên.</a:t>
+              <a:t>Bước 2: gán nhãn thủ công cho dữ liệu đã thu thập bằng roboflow.</a:t>
             </a:r>
             <a:endParaRPr sz="1600"/>
           </a:p>
           <a:p>
             <a:pPr indent="-330200" lvl="0" marL="457200" rtl="0" algn="l">
-              <a:lnSpc>
-                <a:spcPct val="115000"/>
-              </a:lnSpc>
               <a:spcBef>
                 <a:spcPts val="0"/>
               </a:spcBef>
@@ -12966,7 +12952,7 @@
             </a:pPr>
             <a:r>
               <a:rPr lang="en" sz="1600"/>
-              <a:t>Bước 3: gán nhãn cho dữ liệu đã thu thập bằng roboflow và trích xuất ra file TF-Record.</a:t>
+              <a:t>Bước 3: sử dụng trang roboflow tăng cường thêm dữ liệu trên và trích xuất file TF-Record.</a:t>
             </a:r>
             <a:endParaRPr sz="1600"/>
           </a:p>

</xml_diff>

<commit_message>
update dataset distribution for training and testing update model judgement
</commit_message>
<xml_diff>
--- a/CS2225.BaoCaoCuoiKy.pptx
+++ b/CS2225.BaoCaoCuoiKy.pptx
@@ -5,7 +5,7 @@
     <p:sldMasterId id="2147483648" r:id="rId1"/>
   </p:sldMasterIdLst>
   <p:notesMasterIdLst>
-    <p:notesMasterId r:id="rId14"/>
+    <p:notesMasterId r:id="rId17"/>
   </p:notesMasterIdLst>
   <p:sldIdLst>
     <p:sldId id="256" r:id="rId2"/>
@@ -15,11 +15,14 @@
     <p:sldId id="261" r:id="rId6"/>
     <p:sldId id="268" r:id="rId7"/>
     <p:sldId id="262" r:id="rId8"/>
-    <p:sldId id="263" r:id="rId9"/>
-    <p:sldId id="264" r:id="rId10"/>
-    <p:sldId id="265" r:id="rId11"/>
-    <p:sldId id="266" r:id="rId12"/>
-    <p:sldId id="267" r:id="rId13"/>
+    <p:sldId id="269" r:id="rId9"/>
+    <p:sldId id="263" r:id="rId10"/>
+    <p:sldId id="264" r:id="rId11"/>
+    <p:sldId id="265" r:id="rId12"/>
+    <p:sldId id="270" r:id="rId13"/>
+    <p:sldId id="266" r:id="rId14"/>
+    <p:sldId id="271" r:id="rId15"/>
+    <p:sldId id="267" r:id="rId16"/>
   </p:sldIdLst>
   <p:sldSz cx="9144000" cy="5143500" type="screen16x9"/>
   <p:notesSz cx="6858000" cy="9144000"/>
@@ -273,7 +276,7 @@
       </p15:sldGuideLst>
     </p:ext>
     <p:ext uri="http://customooxmlschemas.google.com/">
-      <go:slidesCustomData xmlns="" xmlns:mc="http://schemas.openxmlformats.org/markup-compatibility/2006" xmlns:mv="urn:schemas-microsoft-com:mac:vml" xmlns:c="http://schemas.openxmlformats.org/drawingml/2006/chart" xmlns:dgm="http://schemas.openxmlformats.org/drawingml/2006/diagram" xmlns:o="urn:schemas-microsoft-com:office:office" xmlns:v="urn:schemas-microsoft-com:vml" xmlns:pvml="urn:schemas-microsoft-com:office:powerpoint" xmlns:com="http://schemas.openxmlformats.org/drawingml/2006/compatibility" xmlns:p14="http://schemas.microsoft.com/office/powerpoint/2010/main" xmlns:p15="http://schemas.microsoft.com/office/powerpoint/2012/main" xmlns:ahyp="http://schemas.microsoft.com/office/drawing/2018/hyperlinkcolor" xmlns:go="http://customooxmlschemas.google.com/" r:id="rId18" roundtripDataSignature="AMtx7mgr+2s9Qem9sYdsXEFZxyB27Gtptw=="/>
+      <go:slidesCustomData xmlns:go="http://customooxmlschemas.google.com/" xmlns:ahyp="http://schemas.microsoft.com/office/drawing/2018/hyperlinkcolor" xmlns:p15="http://schemas.microsoft.com/office/powerpoint/2012/main" xmlns:p14="http://schemas.microsoft.com/office/powerpoint/2010/main" xmlns:com="http://schemas.openxmlformats.org/drawingml/2006/compatibility" xmlns:pvml="urn:schemas-microsoft-com:office:powerpoint" xmlns:v="urn:schemas-microsoft-com:vml" xmlns:o="urn:schemas-microsoft-com:office:office" xmlns:dgm="http://schemas.openxmlformats.org/drawingml/2006/diagram" xmlns:c="http://schemas.openxmlformats.org/drawingml/2006/chart" xmlns:mv="urn:schemas-microsoft-com:mac:vml" xmlns:mc="http://schemas.openxmlformats.org/markup-compatibility/2006" xmlns="" r:id="rId18" roundtripDataSignature="AMtx7mgr+2s9Qem9sYdsXEFZxyB27Gtptw=="/>
     </p:ext>
   </p:extLst>
 </p:presentation>
@@ -982,6 +985,110 @@
   <p:cSld>
     <p:spTree>
       <p:nvGrpSpPr>
+        <p:cNvPr id="1" name="Shape 118"/>
+        <p:cNvGrpSpPr/>
+        <p:nvPr/>
+      </p:nvGrpSpPr>
+      <p:grpSpPr>
+        <a:xfrm>
+          <a:off x="0" y="0"/>
+          <a:ext cx="0" cy="0"/>
+          <a:chOff x="0" y="0"/>
+          <a:chExt cx="0" cy="0"/>
+        </a:xfrm>
+      </p:grpSpPr>
+      <p:sp>
+        <p:nvSpPr>
+          <p:cNvPr id="119" name="Google Shape;119;ga95c1e85a4_0_19:notes"/>
+          <p:cNvSpPr>
+            <a:spLocks noGrp="1" noRot="1" noChangeAspect="1"/>
+          </p:cNvSpPr>
+          <p:nvPr>
+            <p:ph type="sldImg" idx="2"/>
+          </p:nvPr>
+        </p:nvSpPr>
+        <p:spPr>
+          <a:xfrm>
+            <a:off x="381000" y="685800"/>
+            <a:ext cx="6096000" cy="3429000"/>
+          </a:xfrm>
+          <a:custGeom>
+            <a:avLst/>
+            <a:gdLst/>
+            <a:ahLst/>
+            <a:cxnLst/>
+            <a:rect l="l" t="t" r="r" b="b"/>
+            <a:pathLst>
+              <a:path w="120000" h="120000" extrusionOk="0">
+                <a:moveTo>
+                  <a:pt x="0" y="0"/>
+                </a:moveTo>
+                <a:lnTo>
+                  <a:pt x="120000" y="0"/>
+                </a:lnTo>
+                <a:lnTo>
+                  <a:pt x="120000" y="120000"/>
+                </a:lnTo>
+                <a:lnTo>
+                  <a:pt x="0" y="120000"/>
+                </a:lnTo>
+                <a:close/>
+              </a:path>
+            </a:pathLst>
+          </a:custGeom>
+        </p:spPr>
+      </p:sp>
+      <p:sp>
+        <p:nvSpPr>
+          <p:cNvPr id="120" name="Google Shape;120;ga95c1e85a4_0_19:notes"/>
+          <p:cNvSpPr txBox="1">
+            <a:spLocks noGrp="1"/>
+          </p:cNvSpPr>
+          <p:nvPr>
+            <p:ph type="body" idx="1"/>
+          </p:nvPr>
+        </p:nvSpPr>
+        <p:spPr>
+          <a:xfrm>
+            <a:off x="685800" y="4343400"/>
+            <a:ext cx="5486400" cy="4114800"/>
+          </a:xfrm>
+          <a:prstGeom prst="rect">
+            <a:avLst/>
+          </a:prstGeom>
+        </p:spPr>
+        <p:txBody>
+          <a:bodyPr spcFirstLastPara="1" wrap="square" lIns="91425" tIns="91425" rIns="91425" bIns="91425" anchor="t" anchorCtr="0">
+            <a:noAutofit/>
+          </a:bodyPr>
+          <a:lstStyle/>
+          <a:p>
+            <a:pPr marL="0" lvl="0" indent="0" algn="l" rtl="0">
+              <a:spcBef>
+                <a:spcPts val="0"/>
+              </a:spcBef>
+              <a:spcAft>
+                <a:spcPts val="0"/>
+              </a:spcAft>
+              <a:buNone/>
+            </a:pPr>
+            <a:endParaRPr/>
+          </a:p>
+        </p:txBody>
+      </p:sp>
+    </p:spTree>
+  </p:cSld>
+  <p:clrMapOvr>
+    <a:masterClrMapping/>
+  </p:clrMapOvr>
+</p:notes>
+</file>
+
+<file path=ppt/notesSlides/notesSlide11.xml><?xml version="1.0" encoding="utf-8"?>
+<p:notes xmlns:a="http://schemas.openxmlformats.org/drawingml/2006/main" xmlns:r="http://schemas.openxmlformats.org/officeDocument/2006/relationships" xmlns:p="http://schemas.openxmlformats.org/presentationml/2006/main" showMasterSp="0" showMasterPhAnim="0">
+  <p:cSld>
+    <p:spTree>
+      <p:nvGrpSpPr>
         <p:cNvPr id="1" name="Shape 124"/>
         <p:cNvGrpSpPr/>
         <p:nvPr/>
@@ -1006,8 +1113,8 @@
         </p:nvSpPr>
         <p:spPr>
           <a:xfrm>
-            <a:off x="381175" y="685800"/>
-            <a:ext cx="6096300" cy="3429000"/>
+            <a:off x="381000" y="685800"/>
+            <a:ext cx="6096000" cy="3429000"/>
           </a:xfrm>
           <a:custGeom>
             <a:avLst/>
@@ -1092,6 +1199,11 @@
         </p:txBody>
       </p:sp>
     </p:spTree>
+    <p:extLst>
+      <p:ext uri="{BB962C8B-B14F-4D97-AF65-F5344CB8AC3E}">
+        <p14:creationId xmlns:p14="http://schemas.microsoft.com/office/powerpoint/2010/main" val="3727015183"/>
+      </p:ext>
+    </p:extLst>
   </p:cSld>
   <p:clrMapOvr>
     <a:masterClrMapping/>
@@ -1099,7 +1211,129 @@
 </p:notes>
 </file>
 
-<file path=ppt/notesSlides/notesSlide11.xml><?xml version="1.0" encoding="utf-8"?>
+<file path=ppt/notesSlides/notesSlide12.xml><?xml version="1.0" encoding="utf-8"?>
+<p:notes xmlns:a="http://schemas.openxmlformats.org/drawingml/2006/main" xmlns:r="http://schemas.openxmlformats.org/officeDocument/2006/relationships" xmlns:p="http://schemas.openxmlformats.org/presentationml/2006/main" showMasterSp="0" showMasterPhAnim="0">
+  <p:cSld>
+    <p:spTree>
+      <p:nvGrpSpPr>
+        <p:cNvPr id="1" name="Shape 124"/>
+        <p:cNvGrpSpPr/>
+        <p:nvPr/>
+      </p:nvGrpSpPr>
+      <p:grpSpPr>
+        <a:xfrm>
+          <a:off x="0" y="0"/>
+          <a:ext cx="0" cy="0"/>
+          <a:chOff x="0" y="0"/>
+          <a:chExt cx="0" cy="0"/>
+        </a:xfrm>
+      </p:grpSpPr>
+      <p:sp>
+        <p:nvSpPr>
+          <p:cNvPr id="125" name="Google Shape;125;gb23b97c7f9_0_16:notes"/>
+          <p:cNvSpPr>
+            <a:spLocks noGrp="1" noRot="1" noChangeAspect="1"/>
+          </p:cNvSpPr>
+          <p:nvPr>
+            <p:ph type="sldImg" idx="2"/>
+          </p:nvPr>
+        </p:nvSpPr>
+        <p:spPr>
+          <a:xfrm>
+            <a:off x="381000" y="685800"/>
+            <a:ext cx="6096000" cy="3429000"/>
+          </a:xfrm>
+          <a:custGeom>
+            <a:avLst/>
+            <a:gdLst/>
+            <a:ahLst/>
+            <a:cxnLst/>
+            <a:rect l="l" t="t" r="r" b="b"/>
+            <a:pathLst>
+              <a:path w="120000" h="120000" extrusionOk="0">
+                <a:moveTo>
+                  <a:pt x="0" y="0"/>
+                </a:moveTo>
+                <a:lnTo>
+                  <a:pt x="120000" y="0"/>
+                </a:lnTo>
+                <a:lnTo>
+                  <a:pt x="120000" y="120000"/>
+                </a:lnTo>
+                <a:lnTo>
+                  <a:pt x="0" y="120000"/>
+                </a:lnTo>
+                <a:close/>
+              </a:path>
+            </a:pathLst>
+          </a:custGeom>
+          <a:noFill/>
+          <a:ln w="9525" cap="flat" cmpd="sng">
+            <a:solidFill>
+              <a:srgbClr val="000000"/>
+            </a:solidFill>
+            <a:prstDash val="solid"/>
+            <a:round/>
+            <a:headEnd type="none" w="sm" len="sm"/>
+            <a:tailEnd type="none" w="sm" len="sm"/>
+          </a:ln>
+        </p:spPr>
+      </p:sp>
+      <p:sp>
+        <p:nvSpPr>
+          <p:cNvPr id="126" name="Google Shape;126;gb23b97c7f9_0_16:notes"/>
+          <p:cNvSpPr txBox="1">
+            <a:spLocks noGrp="1"/>
+          </p:cNvSpPr>
+          <p:nvPr>
+            <p:ph type="body" idx="1"/>
+          </p:nvPr>
+        </p:nvSpPr>
+        <p:spPr>
+          <a:xfrm>
+            <a:off x="685800" y="4343400"/>
+            <a:ext cx="5486400" cy="4114800"/>
+          </a:xfrm>
+          <a:prstGeom prst="rect">
+            <a:avLst/>
+          </a:prstGeom>
+          <a:noFill/>
+          <a:ln>
+            <a:noFill/>
+          </a:ln>
+        </p:spPr>
+        <p:txBody>
+          <a:bodyPr spcFirstLastPara="1" wrap="square" lIns="91425" tIns="91425" rIns="91425" bIns="91425" anchor="t" anchorCtr="0">
+            <a:noAutofit/>
+          </a:bodyPr>
+          <a:lstStyle/>
+          <a:p>
+            <a:pPr marL="0" lvl="0" indent="0" algn="l" rtl="0">
+              <a:lnSpc>
+                <a:spcPct val="100000"/>
+              </a:lnSpc>
+              <a:spcBef>
+                <a:spcPts val="0"/>
+              </a:spcBef>
+              <a:spcAft>
+                <a:spcPts val="0"/>
+              </a:spcAft>
+              <a:buSzPts val="1400"/>
+              <a:buNone/>
+            </a:pPr>
+            <a:endParaRPr/>
+          </a:p>
+        </p:txBody>
+      </p:sp>
+    </p:spTree>
+  </p:cSld>
+  <p:clrMapOvr>
+    <a:masterClrMapping/>
+  </p:clrMapOvr>
+</p:notes>
+</file>
+
+<file path=ppt/notesSlides/notesSlide13.xml><?xml version="1.0" encoding="utf-8"?>
 <p:notes xmlns:a="http://schemas.openxmlformats.org/drawingml/2006/main" xmlns:r="http://schemas.openxmlformats.org/officeDocument/2006/relationships" xmlns:p="http://schemas.openxmlformats.org/presentationml/2006/main" showMasterSp="0" showMasterPhAnim="0">
   <p:cSld>
     <p:spTree>
@@ -1720,8 +1954,8 @@
         </p:nvSpPr>
         <p:spPr>
           <a:xfrm>
-            <a:off x="381175" y="685800"/>
-            <a:ext cx="6096300" cy="3429000"/>
+            <a:off x="381000" y="685800"/>
+            <a:ext cx="6096000" cy="3429000"/>
           </a:xfrm>
           <a:custGeom>
             <a:avLst/>
@@ -1814,6 +2048,133 @@
 </file>
 
 <file path=ppt/notesSlides/notesSlide7.xml><?xml version="1.0" encoding="utf-8"?>
+<p:notes xmlns:a="http://schemas.openxmlformats.org/drawingml/2006/main" xmlns:r="http://schemas.openxmlformats.org/officeDocument/2006/relationships" xmlns:p="http://schemas.openxmlformats.org/presentationml/2006/main" showMasterSp="0" showMasterPhAnim="0">
+  <p:cSld>
+    <p:spTree>
+      <p:nvGrpSpPr>
+        <p:cNvPr id="1" name="Shape 100"/>
+        <p:cNvGrpSpPr/>
+        <p:nvPr/>
+      </p:nvGrpSpPr>
+      <p:grpSpPr>
+        <a:xfrm>
+          <a:off x="0" y="0"/>
+          <a:ext cx="0" cy="0"/>
+          <a:chOff x="0" y="0"/>
+          <a:chExt cx="0" cy="0"/>
+        </a:xfrm>
+      </p:grpSpPr>
+      <p:sp>
+        <p:nvSpPr>
+          <p:cNvPr id="101" name="Google Shape;101;p9:notes"/>
+          <p:cNvSpPr>
+            <a:spLocks noGrp="1" noRot="1" noChangeAspect="1"/>
+          </p:cNvSpPr>
+          <p:nvPr>
+            <p:ph type="sldImg" idx="2"/>
+          </p:nvPr>
+        </p:nvSpPr>
+        <p:spPr>
+          <a:xfrm>
+            <a:off x="381000" y="685800"/>
+            <a:ext cx="6096000" cy="3429000"/>
+          </a:xfrm>
+          <a:custGeom>
+            <a:avLst/>
+            <a:gdLst/>
+            <a:ahLst/>
+            <a:cxnLst/>
+            <a:rect l="l" t="t" r="r" b="b"/>
+            <a:pathLst>
+              <a:path w="120000" h="120000" extrusionOk="0">
+                <a:moveTo>
+                  <a:pt x="0" y="0"/>
+                </a:moveTo>
+                <a:lnTo>
+                  <a:pt x="120000" y="0"/>
+                </a:lnTo>
+                <a:lnTo>
+                  <a:pt x="120000" y="120000"/>
+                </a:lnTo>
+                <a:lnTo>
+                  <a:pt x="0" y="120000"/>
+                </a:lnTo>
+                <a:close/>
+              </a:path>
+            </a:pathLst>
+          </a:custGeom>
+          <a:noFill/>
+          <a:ln w="9525" cap="flat" cmpd="sng">
+            <a:solidFill>
+              <a:srgbClr val="000000"/>
+            </a:solidFill>
+            <a:prstDash val="solid"/>
+            <a:round/>
+            <a:headEnd type="none" w="sm" len="sm"/>
+            <a:tailEnd type="none" w="sm" len="sm"/>
+          </a:ln>
+        </p:spPr>
+      </p:sp>
+      <p:sp>
+        <p:nvSpPr>
+          <p:cNvPr id="102" name="Google Shape;102;p9:notes"/>
+          <p:cNvSpPr txBox="1">
+            <a:spLocks noGrp="1"/>
+          </p:cNvSpPr>
+          <p:nvPr>
+            <p:ph type="body" idx="1"/>
+          </p:nvPr>
+        </p:nvSpPr>
+        <p:spPr>
+          <a:xfrm>
+            <a:off x="685800" y="4343400"/>
+            <a:ext cx="5486400" cy="4114800"/>
+          </a:xfrm>
+          <a:prstGeom prst="rect">
+            <a:avLst/>
+          </a:prstGeom>
+          <a:noFill/>
+          <a:ln>
+            <a:noFill/>
+          </a:ln>
+        </p:spPr>
+        <p:txBody>
+          <a:bodyPr spcFirstLastPara="1" wrap="square" lIns="91425" tIns="91425" rIns="91425" bIns="91425" anchor="t" anchorCtr="0">
+            <a:noAutofit/>
+          </a:bodyPr>
+          <a:lstStyle/>
+          <a:p>
+            <a:pPr marL="0" lvl="0" indent="0" algn="l" rtl="0">
+              <a:lnSpc>
+                <a:spcPct val="100000"/>
+              </a:lnSpc>
+              <a:spcBef>
+                <a:spcPts val="0"/>
+              </a:spcBef>
+              <a:spcAft>
+                <a:spcPts val="0"/>
+              </a:spcAft>
+              <a:buSzPts val="1400"/>
+              <a:buNone/>
+            </a:pPr>
+            <a:endParaRPr/>
+          </a:p>
+        </p:txBody>
+      </p:sp>
+    </p:spTree>
+    <p:extLst>
+      <p:ext uri="{BB962C8B-B14F-4D97-AF65-F5344CB8AC3E}">
+        <p14:creationId xmlns:p14="http://schemas.microsoft.com/office/powerpoint/2010/main" val="1733157217"/>
+      </p:ext>
+    </p:extLst>
+  </p:cSld>
+  <p:clrMapOvr>
+    <a:masterClrMapping/>
+  </p:clrMapOvr>
+</p:notes>
+</file>
+
+<file path=ppt/notesSlides/notesSlide8.xml><?xml version="1.0" encoding="utf-8"?>
 <p:notes xmlns:a="http://schemas.openxmlformats.org/drawingml/2006/main" xmlns:r="http://schemas.openxmlformats.org/officeDocument/2006/relationships" xmlns:p="http://schemas.openxmlformats.org/presentationml/2006/main" showMasterSp="0" showMasterPhAnim="0">
   <p:cSld>
     <p:spTree>
@@ -1935,7 +2296,7 @@
 </p:notes>
 </file>
 
-<file path=ppt/notesSlides/notesSlide8.xml><?xml version="1.0" encoding="utf-8"?>
+<file path=ppt/notesSlides/notesSlide9.xml><?xml version="1.0" encoding="utf-8"?>
 <p:notes xmlns:a="http://schemas.openxmlformats.org/drawingml/2006/main" xmlns:r="http://schemas.openxmlformats.org/officeDocument/2006/relationships" xmlns:p="http://schemas.openxmlformats.org/presentationml/2006/main" showMasterSp="0" showMasterPhAnim="0">
   <p:cSld>
     <p:spTree>
@@ -1964,8 +2325,8 @@
         </p:nvSpPr>
         <p:spPr>
           <a:xfrm>
-            <a:off x="381175" y="685800"/>
-            <a:ext cx="6096300" cy="3429000"/>
+            <a:off x="381000" y="685800"/>
+            <a:ext cx="6096000" cy="3429000"/>
           </a:xfrm>
           <a:custGeom>
             <a:avLst/>
@@ -2043,110 +2404,6 @@
                 <a:spcPts val="0"/>
               </a:spcAft>
               <a:buSzPts val="1400"/>
-              <a:buNone/>
-            </a:pPr>
-            <a:endParaRPr/>
-          </a:p>
-        </p:txBody>
-      </p:sp>
-    </p:spTree>
-  </p:cSld>
-  <p:clrMapOvr>
-    <a:masterClrMapping/>
-  </p:clrMapOvr>
-</p:notes>
-</file>
-
-<file path=ppt/notesSlides/notesSlide9.xml><?xml version="1.0" encoding="utf-8"?>
-<p:notes xmlns:a="http://schemas.openxmlformats.org/drawingml/2006/main" xmlns:r="http://schemas.openxmlformats.org/officeDocument/2006/relationships" xmlns:p="http://schemas.openxmlformats.org/presentationml/2006/main" showMasterSp="0" showMasterPhAnim="0">
-  <p:cSld>
-    <p:spTree>
-      <p:nvGrpSpPr>
-        <p:cNvPr id="1" name="Shape 118"/>
-        <p:cNvGrpSpPr/>
-        <p:nvPr/>
-      </p:nvGrpSpPr>
-      <p:grpSpPr>
-        <a:xfrm>
-          <a:off x="0" y="0"/>
-          <a:ext cx="0" cy="0"/>
-          <a:chOff x="0" y="0"/>
-          <a:chExt cx="0" cy="0"/>
-        </a:xfrm>
-      </p:grpSpPr>
-      <p:sp>
-        <p:nvSpPr>
-          <p:cNvPr id="119" name="Google Shape;119;ga95c1e85a4_0_19:notes"/>
-          <p:cNvSpPr>
-            <a:spLocks noGrp="1" noRot="1" noChangeAspect="1"/>
-          </p:cNvSpPr>
-          <p:nvPr>
-            <p:ph type="sldImg" idx="2"/>
-          </p:nvPr>
-        </p:nvSpPr>
-        <p:spPr>
-          <a:xfrm>
-            <a:off x="381309" y="685800"/>
-            <a:ext cx="6096000" cy="3429000"/>
-          </a:xfrm>
-          <a:custGeom>
-            <a:avLst/>
-            <a:gdLst/>
-            <a:ahLst/>
-            <a:cxnLst/>
-            <a:rect l="l" t="t" r="r" b="b"/>
-            <a:pathLst>
-              <a:path w="120000" h="120000" extrusionOk="0">
-                <a:moveTo>
-                  <a:pt x="0" y="0"/>
-                </a:moveTo>
-                <a:lnTo>
-                  <a:pt x="120000" y="0"/>
-                </a:lnTo>
-                <a:lnTo>
-                  <a:pt x="120000" y="120000"/>
-                </a:lnTo>
-                <a:lnTo>
-                  <a:pt x="0" y="120000"/>
-                </a:lnTo>
-                <a:close/>
-              </a:path>
-            </a:pathLst>
-          </a:custGeom>
-        </p:spPr>
-      </p:sp>
-      <p:sp>
-        <p:nvSpPr>
-          <p:cNvPr id="120" name="Google Shape;120;ga95c1e85a4_0_19:notes"/>
-          <p:cNvSpPr txBox="1">
-            <a:spLocks noGrp="1"/>
-          </p:cNvSpPr>
-          <p:nvPr>
-            <p:ph type="body" idx="1"/>
-          </p:nvPr>
-        </p:nvSpPr>
-        <p:spPr>
-          <a:xfrm>
-            <a:off x="685800" y="4343400"/>
-            <a:ext cx="5486400" cy="4114800"/>
-          </a:xfrm>
-          <a:prstGeom prst="rect">
-            <a:avLst/>
-          </a:prstGeom>
-        </p:spPr>
-        <p:txBody>
-          <a:bodyPr spcFirstLastPara="1" wrap="square" lIns="91425" tIns="91425" rIns="91425" bIns="91425" anchor="t" anchorCtr="0">
-            <a:noAutofit/>
-          </a:bodyPr>
-          <a:lstStyle/>
-          <a:p>
-            <a:pPr marL="0" lvl="0" indent="0" algn="l" rtl="0">
-              <a:spcBef>
-                <a:spcPts val="0"/>
-              </a:spcBef>
-              <a:spcAft>
-                <a:spcPts val="0"/>
-              </a:spcAft>
               <a:buNone/>
             </a:pPr>
             <a:endParaRPr/>
@@ -10828,6 +11085,151 @@
   <p:cSld>
     <p:spTree>
       <p:nvGrpSpPr>
+        <p:cNvPr id="1" name="Shape 115"/>
+        <p:cNvGrpSpPr/>
+        <p:nvPr/>
+      </p:nvGrpSpPr>
+      <p:grpSpPr>
+        <a:xfrm>
+          <a:off x="0" y="0"/>
+          <a:ext cx="0" cy="0"/>
+          <a:chOff x="0" y="0"/>
+          <a:chExt cx="0" cy="0"/>
+        </a:xfrm>
+      </p:grpSpPr>
+      <p:sp>
+        <p:nvSpPr>
+          <p:cNvPr id="116" name="Google Shape;116;p8"/>
+          <p:cNvSpPr txBox="1">
+            <a:spLocks noGrp="1"/>
+          </p:cNvSpPr>
+          <p:nvPr>
+            <p:ph type="title"/>
+          </p:nvPr>
+        </p:nvSpPr>
+        <p:spPr>
+          <a:xfrm>
+            <a:off x="471900" y="57875"/>
+            <a:ext cx="8222100" cy="670500"/>
+          </a:xfrm>
+          <a:prstGeom prst="rect">
+            <a:avLst/>
+          </a:prstGeom>
+          <a:noFill/>
+          <a:ln>
+            <a:noFill/>
+          </a:ln>
+        </p:spPr>
+        <p:txBody>
+          <a:bodyPr spcFirstLastPara="1" wrap="square" lIns="91425" tIns="91425" rIns="91425" bIns="91425" anchor="ctr" anchorCtr="0">
+            <a:noAutofit/>
+          </a:bodyPr>
+          <a:lstStyle/>
+          <a:p>
+            <a:pPr marL="0" lvl="0" indent="0" algn="l" rtl="0">
+              <a:lnSpc>
+                <a:spcPct val="100000"/>
+              </a:lnSpc>
+              <a:spcBef>
+                <a:spcPts val="0"/>
+              </a:spcBef>
+              <a:spcAft>
+                <a:spcPts val="0"/>
+              </a:spcAft>
+              <a:buSzPts val="3200"/>
+              <a:buNone/>
+            </a:pPr>
+            <a:r>
+              <a:rPr lang="en" b="1"/>
+              <a:t>Loại bài toán ML</a:t>
+            </a:r>
+            <a:r>
+              <a:rPr lang="en"/>
+              <a:t> </a:t>
+            </a:r>
+            <a:endParaRPr/>
+          </a:p>
+        </p:txBody>
+      </p:sp>
+      <p:sp>
+        <p:nvSpPr>
+          <p:cNvPr id="117" name="Google Shape;117;p8"/>
+          <p:cNvSpPr txBox="1">
+            <a:spLocks noGrp="1"/>
+          </p:cNvSpPr>
+          <p:nvPr>
+            <p:ph type="body" idx="1"/>
+          </p:nvPr>
+        </p:nvSpPr>
+        <p:spPr>
+          <a:xfrm>
+            <a:off x="471900" y="820500"/>
+            <a:ext cx="8222100" cy="3908400"/>
+          </a:xfrm>
+          <a:prstGeom prst="rect">
+            <a:avLst/>
+          </a:prstGeom>
+          <a:noFill/>
+          <a:ln>
+            <a:noFill/>
+          </a:ln>
+        </p:spPr>
+        <p:txBody>
+          <a:bodyPr spcFirstLastPara="1" wrap="square" lIns="91425" tIns="91425" rIns="91425" bIns="91425" anchor="t" anchorCtr="0">
+            <a:noAutofit/>
+          </a:bodyPr>
+          <a:lstStyle/>
+          <a:p>
+            <a:pPr marL="457200" lvl="0" indent="-368300" algn="l" rtl="0">
+              <a:lnSpc>
+                <a:spcPct val="115000"/>
+              </a:lnSpc>
+              <a:spcBef>
+                <a:spcPts val="0"/>
+              </a:spcBef>
+              <a:spcAft>
+                <a:spcPts val="0"/>
+              </a:spcAft>
+              <a:buSzPts val="2200"/>
+              <a:buChar char="●"/>
+            </a:pPr>
+            <a:r>
+              <a:rPr lang="en" sz="1600" dirty="0"/>
+              <a:t>Object Detection</a:t>
+            </a:r>
+            <a:endParaRPr sz="1600" dirty="0"/>
+          </a:p>
+          <a:p>
+            <a:pPr marL="914400" lvl="0" indent="0" algn="l" rtl="0">
+              <a:lnSpc>
+                <a:spcPct val="115000"/>
+              </a:lnSpc>
+              <a:spcBef>
+                <a:spcPts val="1600"/>
+              </a:spcBef>
+              <a:spcAft>
+                <a:spcPts val="1600"/>
+              </a:spcAft>
+              <a:buSzPts val="2200"/>
+              <a:buNone/>
+            </a:pPr>
+            <a:endParaRPr sz="1600" dirty="0"/>
+          </a:p>
+        </p:txBody>
+      </p:sp>
+    </p:spTree>
+  </p:cSld>
+  <p:clrMapOvr>
+    <a:masterClrMapping/>
+  </p:clrMapOvr>
+</p:sld>
+</file>
+
+<file path=ppt/slides/slide11.xml><?xml version="1.0" encoding="utf-8"?>
+<p:sld xmlns:a="http://schemas.openxmlformats.org/drawingml/2006/main" xmlns:r="http://schemas.openxmlformats.org/officeDocument/2006/relationships" xmlns:p="http://schemas.openxmlformats.org/presentationml/2006/main">
+  <p:cSld>
+    <p:spTree>
+      <p:nvGrpSpPr>
         <p:cNvPr id="1" name="Shape 121"/>
         <p:cNvGrpSpPr/>
         <p:nvPr/>
@@ -10918,10 +11320,134 @@
               <a:buChar char="●"/>
             </a:pPr>
             <a:r>
-              <a:rPr lang="en"/>
-              <a:t>Cải thiện hệ thống bằng cách bổ sung thêm dữ liệu đầu vào từ nhiều nguồn khác.</a:t>
-            </a:r>
-            <a:endParaRPr/>
+              <a:rPr lang="en" sz="1600" dirty="0" err="1"/>
+              <a:t>Cải</a:t>
+            </a:r>
+            <a:r>
+              <a:rPr lang="en" sz="1600" dirty="0"/>
+              <a:t> </a:t>
+            </a:r>
+            <a:r>
+              <a:rPr lang="en" sz="1600" dirty="0" err="1"/>
+              <a:t>thiện</a:t>
+            </a:r>
+            <a:r>
+              <a:rPr lang="en" sz="1600" dirty="0"/>
+              <a:t> </a:t>
+            </a:r>
+            <a:r>
+              <a:rPr lang="en" sz="1600" dirty="0" err="1"/>
+              <a:t>hệ</a:t>
+            </a:r>
+            <a:r>
+              <a:rPr lang="en" sz="1600" dirty="0"/>
+              <a:t> </a:t>
+            </a:r>
+            <a:r>
+              <a:rPr lang="en" sz="1600" dirty="0" err="1"/>
+              <a:t>thống</a:t>
+            </a:r>
+            <a:r>
+              <a:rPr lang="en" sz="1600" dirty="0"/>
+              <a:t> </a:t>
+            </a:r>
+            <a:r>
+              <a:rPr lang="en" sz="1600" dirty="0" err="1"/>
+              <a:t>bằng</a:t>
+            </a:r>
+            <a:r>
+              <a:rPr lang="en" sz="1600" dirty="0"/>
+              <a:t> </a:t>
+            </a:r>
+            <a:r>
+              <a:rPr lang="en" sz="1600" dirty="0" err="1"/>
+              <a:t>cách</a:t>
+            </a:r>
+            <a:r>
+              <a:rPr lang="en" sz="1600" dirty="0"/>
+              <a:t> </a:t>
+            </a:r>
+            <a:r>
+              <a:rPr lang="en" sz="1600" dirty="0" err="1"/>
+              <a:t>bổ</a:t>
+            </a:r>
+            <a:r>
+              <a:rPr lang="en" sz="1600" dirty="0"/>
+              <a:t> sung </a:t>
+            </a:r>
+            <a:r>
+              <a:rPr lang="en" sz="1600" dirty="0" err="1"/>
+              <a:t>thêm</a:t>
+            </a:r>
+            <a:r>
+              <a:rPr lang="en" sz="1600" dirty="0"/>
+              <a:t> </a:t>
+            </a:r>
+            <a:r>
+              <a:rPr lang="en" sz="1600" dirty="0" err="1"/>
+              <a:t>dữ</a:t>
+            </a:r>
+            <a:r>
+              <a:rPr lang="en" sz="1600" dirty="0"/>
+              <a:t> </a:t>
+            </a:r>
+            <a:r>
+              <a:rPr lang="en" sz="1600" dirty="0" err="1"/>
+              <a:t>liệu</a:t>
+            </a:r>
+            <a:r>
+              <a:rPr lang="en" sz="1600" dirty="0"/>
+              <a:t> </a:t>
+            </a:r>
+            <a:r>
+              <a:rPr lang="en" sz="1600" dirty="0" err="1"/>
+              <a:t>đầu</a:t>
+            </a:r>
+            <a:r>
+              <a:rPr lang="en" sz="1600" dirty="0"/>
+              <a:t> </a:t>
+            </a:r>
+            <a:r>
+              <a:rPr lang="en" sz="1600" dirty="0" err="1"/>
+              <a:t>vào</a:t>
+            </a:r>
+            <a:r>
+              <a:rPr lang="en" sz="1600" dirty="0"/>
+              <a:t> </a:t>
+            </a:r>
+            <a:r>
+              <a:rPr lang="en" sz="1600" dirty="0" err="1"/>
+              <a:t>từ</a:t>
+            </a:r>
+            <a:r>
+              <a:rPr lang="en" sz="1600" dirty="0"/>
+              <a:t> </a:t>
+            </a:r>
+            <a:r>
+              <a:rPr lang="en" sz="1600" dirty="0" err="1"/>
+              <a:t>nhiều</a:t>
+            </a:r>
+            <a:r>
+              <a:rPr lang="en" sz="1600" dirty="0"/>
+              <a:t> </a:t>
+            </a:r>
+            <a:r>
+              <a:rPr lang="en" sz="1600" dirty="0" err="1"/>
+              <a:t>nguồn</a:t>
+            </a:r>
+            <a:r>
+              <a:rPr lang="en" sz="1600" dirty="0"/>
+              <a:t> </a:t>
+            </a:r>
+            <a:r>
+              <a:rPr lang="en" sz="1600" dirty="0" err="1"/>
+              <a:t>khác</a:t>
+            </a:r>
+            <a:r>
+              <a:rPr lang="en" sz="1600" dirty="0"/>
+              <a:t>.</a:t>
+            </a:r>
+            <a:endParaRPr sz="1600" dirty="0"/>
           </a:p>
           <a:p>
             <a:pPr marL="457200" lvl="0" indent="-368300" algn="l" rtl="0">
@@ -10935,10 +11461,70 @@
               <a:buChar char="●"/>
             </a:pPr>
             <a:r>
-              <a:rPr lang="en"/>
-              <a:t>Xử lý thêm dữ liệu đầu vào là video.</a:t>
-            </a:r>
-            <a:endParaRPr/>
+              <a:rPr lang="en" sz="1600" dirty="0" err="1"/>
+              <a:t>Xử</a:t>
+            </a:r>
+            <a:r>
+              <a:rPr lang="en" sz="1600" dirty="0"/>
+              <a:t> </a:t>
+            </a:r>
+            <a:r>
+              <a:rPr lang="en" sz="1600" dirty="0" err="1"/>
+              <a:t>lý</a:t>
+            </a:r>
+            <a:r>
+              <a:rPr lang="en" sz="1600" dirty="0"/>
+              <a:t> </a:t>
+            </a:r>
+            <a:r>
+              <a:rPr lang="en" sz="1600" dirty="0" err="1"/>
+              <a:t>thêm</a:t>
+            </a:r>
+            <a:r>
+              <a:rPr lang="en" sz="1600" dirty="0"/>
+              <a:t> </a:t>
+            </a:r>
+            <a:r>
+              <a:rPr lang="en" sz="1600" dirty="0" err="1"/>
+              <a:t>dữ</a:t>
+            </a:r>
+            <a:r>
+              <a:rPr lang="en" sz="1600" dirty="0"/>
+              <a:t> </a:t>
+            </a:r>
+            <a:r>
+              <a:rPr lang="en" sz="1600" dirty="0" err="1"/>
+              <a:t>liệu</a:t>
+            </a:r>
+            <a:r>
+              <a:rPr lang="en" sz="1600" dirty="0"/>
+              <a:t> </a:t>
+            </a:r>
+            <a:r>
+              <a:rPr lang="en" sz="1600" dirty="0" err="1"/>
+              <a:t>đầu</a:t>
+            </a:r>
+            <a:r>
+              <a:rPr lang="en" sz="1600" dirty="0"/>
+              <a:t> </a:t>
+            </a:r>
+            <a:r>
+              <a:rPr lang="en" sz="1600" dirty="0" err="1"/>
+              <a:t>vào</a:t>
+            </a:r>
+            <a:r>
+              <a:rPr lang="en" sz="1600" dirty="0"/>
+              <a:t> </a:t>
+            </a:r>
+            <a:r>
+              <a:rPr lang="en" sz="1600" dirty="0" err="1"/>
+              <a:t>là</a:t>
+            </a:r>
+            <a:r>
+              <a:rPr lang="en" sz="1600" dirty="0"/>
+              <a:t> video.</a:t>
+            </a:r>
+            <a:endParaRPr sz="1600" dirty="0"/>
           </a:p>
           <a:p>
             <a:pPr marL="457200" lvl="0" indent="-368300" algn="l" rtl="0">
@@ -10952,10 +11538,94 @@
               <a:buChar char="●"/>
             </a:pPr>
             <a:r>
-              <a:rPr lang="en"/>
-              <a:t>Đánh giá với nhiều model và phương pháp khác đang hiện có.</a:t>
-            </a:r>
-            <a:endParaRPr/>
+              <a:rPr lang="en" sz="1600" dirty="0" err="1"/>
+              <a:t>Đánh</a:t>
+            </a:r>
+            <a:r>
+              <a:rPr lang="en" sz="1600" dirty="0"/>
+              <a:t> </a:t>
+            </a:r>
+            <a:r>
+              <a:rPr lang="en" sz="1600" dirty="0" err="1"/>
+              <a:t>giá</a:t>
+            </a:r>
+            <a:r>
+              <a:rPr lang="en" sz="1600" dirty="0"/>
+              <a:t> </a:t>
+            </a:r>
+            <a:r>
+              <a:rPr lang="en" sz="1600" dirty="0" err="1"/>
+              <a:t>với</a:t>
+            </a:r>
+            <a:r>
+              <a:rPr lang="en" sz="1600" dirty="0"/>
+              <a:t> </a:t>
+            </a:r>
+            <a:r>
+              <a:rPr lang="en" sz="1600" dirty="0" err="1"/>
+              <a:t>nhiều</a:t>
+            </a:r>
+            <a:r>
+              <a:rPr lang="en" sz="1600" dirty="0"/>
+              <a:t> model </a:t>
+            </a:r>
+            <a:r>
+              <a:rPr lang="en" sz="1600" dirty="0" err="1"/>
+              <a:t>và</a:t>
+            </a:r>
+            <a:r>
+              <a:rPr lang="en" sz="1600" dirty="0"/>
+              <a:t> </a:t>
+            </a:r>
+            <a:r>
+              <a:rPr lang="en" sz="1600" dirty="0" err="1"/>
+              <a:t>phương</a:t>
+            </a:r>
+            <a:r>
+              <a:rPr lang="en" sz="1600" dirty="0"/>
+              <a:t> </a:t>
+            </a:r>
+            <a:r>
+              <a:rPr lang="en" sz="1600" dirty="0" err="1"/>
+              <a:t>pháp</a:t>
+            </a:r>
+            <a:r>
+              <a:rPr lang="en" sz="1600" dirty="0"/>
+              <a:t> </a:t>
+            </a:r>
+            <a:r>
+              <a:rPr lang="en" sz="1600" dirty="0" err="1"/>
+              <a:t>khác</a:t>
+            </a:r>
+            <a:r>
+              <a:rPr lang="en" sz="1600" dirty="0"/>
+              <a:t> </a:t>
+            </a:r>
+            <a:r>
+              <a:rPr lang="en" sz="1600" dirty="0" err="1"/>
+              <a:t>đang</a:t>
+            </a:r>
+            <a:r>
+              <a:rPr lang="en" sz="1600" dirty="0"/>
+              <a:t> </a:t>
+            </a:r>
+            <a:r>
+              <a:rPr lang="en" sz="1600" dirty="0" err="1"/>
+              <a:t>hiện</a:t>
+            </a:r>
+            <a:r>
+              <a:rPr lang="en" sz="1600" dirty="0"/>
+              <a:t> </a:t>
+            </a:r>
+            <a:r>
+              <a:rPr lang="en" sz="1600" dirty="0" err="1"/>
+              <a:t>có</a:t>
+            </a:r>
+            <a:r>
+              <a:rPr lang="en" sz="1600" dirty="0"/>
+              <a:t>.</a:t>
+            </a:r>
+            <a:endParaRPr sz="1600" dirty="0"/>
           </a:p>
           <a:p>
             <a:pPr marL="0" lvl="0" indent="0" algn="l" rtl="0">
@@ -10967,7 +11637,7 @@
               </a:spcAft>
               <a:buNone/>
             </a:pPr>
-            <a:endParaRPr/>
+            <a:endParaRPr sz="1600" dirty="0"/>
           </a:p>
         </p:txBody>
       </p:sp>
@@ -10979,7 +11649,7 @@
 </p:sld>
 </file>
 
-<file path=ppt/slides/slide11.xml><?xml version="1.0" encoding="utf-8"?>
+<file path=ppt/slides/slide12.xml><?xml version="1.0" encoding="utf-8"?>
 <p:sld xmlns:a="http://schemas.openxmlformats.org/drawingml/2006/main" xmlns:r="http://schemas.openxmlformats.org/officeDocument/2006/relationships" xmlns:p="http://schemas.openxmlformats.org/presentationml/2006/main">
   <p:cSld>
     <p:spTree>
@@ -11107,6 +11777,231 @@
           </a:p>
         </p:txBody>
       </p:sp>
+      <p:pic>
+        <p:nvPicPr>
+          <p:cNvPr id="4" name="Picture 3" descr="A picture containing text, screenshot, stationary, writing implement&#10;&#10;Description automatically generated">
+            <a:extLst>
+              <a:ext uri="{FF2B5EF4-FFF2-40B4-BE49-F238E27FC236}">
+                <a16:creationId xmlns:a16="http://schemas.microsoft.com/office/drawing/2014/main" id="{656E1860-C840-1D4B-ACC0-4B2E76F27A07}"/>
+              </a:ext>
+            </a:extLst>
+          </p:cNvPr>
+          <p:cNvPicPr>
+            <a:picLocks noChangeAspect="1"/>
+          </p:cNvPicPr>
+          <p:nvPr/>
+        </p:nvPicPr>
+        <p:blipFill>
+          <a:blip r:embed="rId3"/>
+          <a:stretch>
+            <a:fillRect/>
+          </a:stretch>
+        </p:blipFill>
+        <p:spPr>
+          <a:xfrm>
+            <a:off x="0" y="683315"/>
+            <a:ext cx="9144000" cy="3776870"/>
+          </a:xfrm>
+          <a:prstGeom prst="rect">
+            <a:avLst/>
+          </a:prstGeom>
+        </p:spPr>
+      </p:pic>
+    </p:spTree>
+    <p:extLst>
+      <p:ext uri="{BB962C8B-B14F-4D97-AF65-F5344CB8AC3E}">
+        <p14:creationId xmlns:p14="http://schemas.microsoft.com/office/powerpoint/2010/main" val="1607805153"/>
+      </p:ext>
+    </p:extLst>
+  </p:cSld>
+  <p:clrMapOvr>
+    <a:masterClrMapping/>
+  </p:clrMapOvr>
+</p:sld>
+</file>
+
+<file path=ppt/slides/slide13.xml><?xml version="1.0" encoding="utf-8"?>
+<p:sld xmlns:a="http://schemas.openxmlformats.org/drawingml/2006/main" xmlns:r="http://schemas.openxmlformats.org/officeDocument/2006/relationships" xmlns:p="http://schemas.openxmlformats.org/presentationml/2006/main">
+  <p:cSld>
+    <p:spTree>
+      <p:nvGrpSpPr>
+        <p:cNvPr id="1" name="Shape 127"/>
+        <p:cNvGrpSpPr/>
+        <p:nvPr/>
+      </p:nvGrpSpPr>
+      <p:grpSpPr>
+        <a:xfrm>
+          <a:off x="0" y="0"/>
+          <a:ext cx="0" cy="0"/>
+          <a:chOff x="0" y="0"/>
+          <a:chExt cx="0" cy="0"/>
+        </a:xfrm>
+      </p:grpSpPr>
+      <p:sp>
+        <p:nvSpPr>
+          <p:cNvPr id="128" name="Google Shape;128;gb23b97c7f9_0_16"/>
+          <p:cNvSpPr txBox="1">
+            <a:spLocks noGrp="1"/>
+          </p:cNvSpPr>
+          <p:nvPr>
+            <p:ph type="title"/>
+          </p:nvPr>
+        </p:nvSpPr>
+        <p:spPr>
+          <a:xfrm>
+            <a:off x="471900" y="57875"/>
+            <a:ext cx="8222100" cy="670500"/>
+          </a:xfrm>
+          <a:prstGeom prst="rect">
+            <a:avLst/>
+          </a:prstGeom>
+          <a:noFill/>
+          <a:ln>
+            <a:noFill/>
+          </a:ln>
+        </p:spPr>
+        <p:txBody>
+          <a:bodyPr spcFirstLastPara="1" wrap="square" lIns="91425" tIns="91425" rIns="91425" bIns="91425" anchor="ctr" anchorCtr="0">
+            <a:noAutofit/>
+          </a:bodyPr>
+          <a:lstStyle/>
+          <a:p>
+            <a:pPr marL="0" lvl="0" indent="0" algn="l" rtl="0">
+              <a:lnSpc>
+                <a:spcPct val="100000"/>
+              </a:lnSpc>
+              <a:spcBef>
+                <a:spcPts val="0"/>
+              </a:spcBef>
+              <a:spcAft>
+                <a:spcPts val="0"/>
+              </a:spcAft>
+              <a:buSzPts val="3200"/>
+              <a:buNone/>
+            </a:pPr>
+            <a:r>
+              <a:rPr lang="en" b="1" dirty="0" err="1"/>
+              <a:t>Đánh</a:t>
+            </a:r>
+            <a:r>
+              <a:rPr lang="en" b="1" dirty="0"/>
+              <a:t> </a:t>
+            </a:r>
+            <a:r>
+              <a:rPr lang="en" b="1" dirty="0" err="1"/>
+              <a:t>giá</a:t>
+            </a:r>
+            <a:r>
+              <a:rPr lang="en" b="1" dirty="0"/>
+              <a:t> </a:t>
+            </a:r>
+            <a:r>
+              <a:rPr lang="en" b="1" dirty="0" err="1"/>
+              <a:t>kết</a:t>
+            </a:r>
+            <a:r>
+              <a:rPr lang="en" b="1" dirty="0"/>
+              <a:t> </a:t>
+            </a:r>
+            <a:r>
+              <a:rPr lang="en" b="1" dirty="0" err="1"/>
+              <a:t>quả</a:t>
+            </a:r>
+            <a:endParaRPr dirty="0"/>
+          </a:p>
+        </p:txBody>
+      </p:sp>
+      <p:sp>
+        <p:nvSpPr>
+          <p:cNvPr id="129" name="Google Shape;129;gb23b97c7f9_0_16"/>
+          <p:cNvSpPr txBox="1">
+            <a:spLocks noGrp="1"/>
+          </p:cNvSpPr>
+          <p:nvPr>
+            <p:ph type="body" idx="1"/>
+          </p:nvPr>
+        </p:nvSpPr>
+        <p:spPr>
+          <a:xfrm>
+            <a:off x="471900" y="820500"/>
+            <a:ext cx="8222100" cy="3908400"/>
+          </a:xfrm>
+          <a:prstGeom prst="rect">
+            <a:avLst/>
+          </a:prstGeom>
+          <a:noFill/>
+          <a:ln>
+            <a:noFill/>
+          </a:ln>
+        </p:spPr>
+        <p:txBody>
+          <a:bodyPr spcFirstLastPara="1" wrap="square" lIns="91425" tIns="91425" rIns="91425" bIns="91425" anchor="t" anchorCtr="0">
+            <a:noAutofit/>
+          </a:bodyPr>
+          <a:lstStyle/>
+          <a:p>
+            <a:pPr marL="457200" lvl="0" indent="0" algn="l" rtl="0">
+              <a:lnSpc>
+                <a:spcPct val="115000"/>
+              </a:lnSpc>
+              <a:spcBef>
+                <a:spcPts val="1600"/>
+              </a:spcBef>
+              <a:spcAft>
+                <a:spcPts val="0"/>
+              </a:spcAft>
+              <a:buNone/>
+            </a:pPr>
+            <a:endParaRPr/>
+          </a:p>
+          <a:p>
+            <a:pPr marL="914400" lvl="0" indent="0" algn="l" rtl="0">
+              <a:lnSpc>
+                <a:spcPct val="115000"/>
+              </a:lnSpc>
+              <a:spcBef>
+                <a:spcPts val="1600"/>
+              </a:spcBef>
+              <a:spcAft>
+                <a:spcPts val="1600"/>
+              </a:spcAft>
+              <a:buSzPts val="2200"/>
+              <a:buNone/>
+            </a:pPr>
+            <a:endParaRPr sz="1800"/>
+          </a:p>
+        </p:txBody>
+      </p:sp>
+      <p:pic>
+        <p:nvPicPr>
+          <p:cNvPr id="3" name="Picture 2" descr="Chart, bar chart&#10;&#10;Description automatically generated">
+            <a:extLst>
+              <a:ext uri="{FF2B5EF4-FFF2-40B4-BE49-F238E27FC236}">
+                <a16:creationId xmlns:a16="http://schemas.microsoft.com/office/drawing/2014/main" id="{EA50487A-7D54-AF47-9B4A-2273B5EA77AE}"/>
+              </a:ext>
+            </a:extLst>
+          </p:cNvPr>
+          <p:cNvPicPr>
+            <a:picLocks noChangeAspect="1"/>
+          </p:cNvPicPr>
+          <p:nvPr/>
+        </p:nvPicPr>
+        <p:blipFill>
+          <a:blip r:embed="rId3"/>
+          <a:stretch>
+            <a:fillRect/>
+          </a:stretch>
+        </p:blipFill>
+        <p:spPr>
+          <a:xfrm>
+            <a:off x="0" y="683315"/>
+            <a:ext cx="9144000" cy="3776870"/>
+          </a:xfrm>
+          <a:prstGeom prst="rect">
+            <a:avLst/>
+          </a:prstGeom>
+        </p:spPr>
+      </p:pic>
     </p:spTree>
   </p:cSld>
   <p:clrMapOvr>
@@ -11115,7 +12010,118 @@
 </p:sld>
 </file>
 
-<file path=ppt/slides/slide12.xml><?xml version="1.0" encoding="utf-8"?>
+<file path=ppt/slides/slide14.xml><?xml version="1.0" encoding="utf-8"?>
+<p:sld xmlns:a="http://schemas.openxmlformats.org/drawingml/2006/main" xmlns:r="http://schemas.openxmlformats.org/officeDocument/2006/relationships" xmlns:p="http://schemas.openxmlformats.org/presentationml/2006/main">
+  <p:cSld>
+    <p:spTree>
+      <p:nvGrpSpPr>
+        <p:cNvPr id="1" name=""/>
+        <p:cNvGrpSpPr/>
+        <p:nvPr/>
+      </p:nvGrpSpPr>
+      <p:grpSpPr>
+        <a:xfrm>
+          <a:off x="0" y="0"/>
+          <a:ext cx="0" cy="0"/>
+          <a:chOff x="0" y="0"/>
+          <a:chExt cx="0" cy="0"/>
+        </a:xfrm>
+      </p:grpSpPr>
+      <p:sp>
+        <p:nvSpPr>
+          <p:cNvPr id="2" name="Title 1">
+            <a:extLst>
+              <a:ext uri="{FF2B5EF4-FFF2-40B4-BE49-F238E27FC236}">
+                <a16:creationId xmlns:a16="http://schemas.microsoft.com/office/drawing/2014/main" id="{AE67D863-0F0E-A34A-834D-70743D4BE76A}"/>
+              </a:ext>
+            </a:extLst>
+          </p:cNvPr>
+          <p:cNvSpPr>
+            <a:spLocks noGrp="1"/>
+          </p:cNvSpPr>
+          <p:nvPr>
+            <p:ph type="title"/>
+          </p:nvPr>
+        </p:nvSpPr>
+        <p:spPr/>
+        <p:txBody>
+          <a:bodyPr/>
+          <a:lstStyle/>
+          <a:p>
+            <a:r>
+              <a:rPr lang="en" b="1" dirty="0" err="1"/>
+              <a:t>Đánh</a:t>
+            </a:r>
+            <a:r>
+              <a:rPr lang="en" b="1" dirty="0"/>
+              <a:t> </a:t>
+            </a:r>
+            <a:r>
+              <a:rPr lang="en" b="1" dirty="0" err="1"/>
+              <a:t>giá</a:t>
+            </a:r>
+            <a:r>
+              <a:rPr lang="en" b="1" dirty="0"/>
+              <a:t> </a:t>
+            </a:r>
+            <a:r>
+              <a:rPr lang="en" b="1" dirty="0" err="1"/>
+              <a:t>kết</a:t>
+            </a:r>
+            <a:r>
+              <a:rPr lang="en" b="1" dirty="0"/>
+              <a:t> </a:t>
+            </a:r>
+            <a:r>
+              <a:rPr lang="en" b="1" dirty="0" err="1"/>
+              <a:t>quả</a:t>
+            </a:r>
+            <a:endParaRPr lang="en-VN" dirty="0"/>
+          </a:p>
+        </p:txBody>
+      </p:sp>
+      <p:sp>
+        <p:nvSpPr>
+          <p:cNvPr id="3" name="Text Placeholder 2">
+            <a:extLst>
+              <a:ext uri="{FF2B5EF4-FFF2-40B4-BE49-F238E27FC236}">
+                <a16:creationId xmlns:a16="http://schemas.microsoft.com/office/drawing/2014/main" id="{05A20B97-C2EC-E443-B644-341B7FBCA26A}"/>
+              </a:ext>
+            </a:extLst>
+          </p:cNvPr>
+          <p:cNvSpPr>
+            <a:spLocks noGrp="1"/>
+          </p:cNvSpPr>
+          <p:nvPr>
+            <p:ph type="body" idx="1"/>
+          </p:nvPr>
+        </p:nvSpPr>
+        <p:spPr/>
+        <p:txBody>
+          <a:bodyPr/>
+          <a:lstStyle/>
+          <a:p>
+            <a:r>
+              <a:rPr lang="en-VN" sz="1600" dirty="0"/>
+              <a:t>Theo như biểu đồ model được train với ảnh có kích thước 416x416 (1) có độ chính xác kém hơn những ảnh 150x150 (2) và 226x226 (3) tuy nhiên khi sử dụng thực tế thì model (1) lại có kết quả tốt hơn (2) và (3).</a:t>
+            </a:r>
+          </a:p>
+        </p:txBody>
+      </p:sp>
+    </p:spTree>
+    <p:extLst>
+      <p:ext uri="{BB962C8B-B14F-4D97-AF65-F5344CB8AC3E}">
+        <p14:creationId xmlns:p14="http://schemas.microsoft.com/office/powerpoint/2010/main" val="995897128"/>
+      </p:ext>
+    </p:extLst>
+  </p:cSld>
+  <p:clrMapOvr>
+    <a:masterClrMapping/>
+  </p:clrMapOvr>
+</p:sld>
+</file>
+
+<file path=ppt/slides/slide15.xml><?xml version="1.0" encoding="utf-8"?>
 <p:sld xmlns:a="http://schemas.openxmlformats.org/drawingml/2006/main" xmlns:r="http://schemas.openxmlformats.org/officeDocument/2006/relationships" xmlns:p="http://schemas.openxmlformats.org/presentationml/2006/main">
   <p:cSld>
     <p:spTree>
@@ -11210,7 +12216,7 @@
               <a:buChar char="●"/>
             </a:pPr>
             <a:r>
-              <a:rPr lang="en" sz="1600" u="sng">
+              <a:rPr lang="en" sz="1600" u="sng" dirty="0">
                 <a:solidFill>
                   <a:schemeClr val="hlink"/>
                 </a:solidFill>
@@ -11218,7 +12224,7 @@
               </a:rPr>
               <a:t>https://blog.roboflow.com/breaking-down-efficientdet</a:t>
             </a:r>
-            <a:endParaRPr sz="1600"/>
+            <a:endParaRPr sz="1600" dirty="0"/>
           </a:p>
           <a:p>
             <a:pPr marL="457200" lvl="0" indent="-330200" algn="l" rtl="0">
@@ -11232,7 +12238,7 @@
               <a:buChar char="●"/>
             </a:pPr>
             <a:r>
-              <a:rPr lang="en" sz="1600" u="sng">
+              <a:rPr lang="en" sz="1600" u="sng" dirty="0">
                 <a:solidFill>
                   <a:schemeClr val="hlink"/>
                 </a:solidFill>
@@ -11244,7 +12250,7 @@
               </a:rPr>
               <a:t>https://blog.tensorflow.org/2020/07/tensorflow-2-meets-object-detection-api</a:t>
             </a:r>
-            <a:endParaRPr sz="1600">
+            <a:endParaRPr sz="1600" dirty="0">
               <a:latin typeface="Arial"/>
               <a:ea typeface="Arial"/>
               <a:cs typeface="Arial"/>
@@ -11264,7 +12270,7 @@
               <a:buChar char="●"/>
             </a:pPr>
             <a:r>
-              <a:rPr lang="en" sz="1600" u="sng">
+              <a:rPr lang="en" sz="1600" u="sng" dirty="0">
                 <a:solidFill>
                   <a:schemeClr val="hlink"/>
                 </a:solidFill>
@@ -11276,7 +12282,7 @@
               </a:rPr>
               <a:t>https://blog.roboflow.com/train-a-tensorflow2-object-detection-model/</a:t>
             </a:r>
-            <a:endParaRPr sz="1600">
+            <a:endParaRPr sz="1600" dirty="0">
               <a:latin typeface="Arial"/>
               <a:ea typeface="Arial"/>
               <a:cs typeface="Arial"/>
@@ -11293,7 +12299,7 @@
               </a:spcAft>
               <a:buNone/>
             </a:pPr>
-            <a:endParaRPr sz="1600">
+            <a:endParaRPr sz="1600" dirty="0">
               <a:latin typeface="Arial"/>
               <a:ea typeface="Arial"/>
               <a:cs typeface="Arial"/>
@@ -12138,135 +13144,7 @@
             </a:r>
             <a:r>
               <a:rPr lang="en" sz="1600" dirty="0"/>
-              <a:t> EfficientDet-d0 model</a:t>
-            </a:r>
-            <a:endParaRPr sz="1600" dirty="0"/>
-          </a:p>
-          <a:p>
-            <a:pPr marL="914400" lvl="1" indent="-330200" algn="l" rtl="0">
-              <a:lnSpc>
-                <a:spcPct val="115000"/>
-              </a:lnSpc>
-              <a:spcBef>
-                <a:spcPts val="0"/>
-              </a:spcBef>
-              <a:spcAft>
-                <a:spcPts val="0"/>
-              </a:spcAft>
-              <a:buSzPts val="1600"/>
-              <a:buChar char="○"/>
-            </a:pPr>
-            <a:r>
-              <a:rPr lang="en" sz="1600" dirty="0" err="1"/>
-              <a:t>Kết</a:t>
-            </a:r>
-            <a:r>
-              <a:rPr lang="en" sz="1600" dirty="0"/>
-              <a:t> </a:t>
-            </a:r>
-            <a:r>
-              <a:rPr lang="en" sz="1600" dirty="0" err="1"/>
-              <a:t>quả</a:t>
-            </a:r>
-            <a:r>
-              <a:rPr lang="en" sz="1600" dirty="0"/>
-              <a:t>: </a:t>
-            </a:r>
-            <a:r>
-              <a:rPr lang="en" sz="1600" dirty="0" err="1"/>
-              <a:t>độ</a:t>
-            </a:r>
-            <a:r>
-              <a:rPr lang="en" sz="1600" dirty="0"/>
-              <a:t> </a:t>
-            </a:r>
-            <a:r>
-              <a:rPr lang="en" sz="1600" dirty="0" err="1"/>
-              <a:t>chính</a:t>
-            </a:r>
-            <a:r>
-              <a:rPr lang="en" sz="1600" dirty="0"/>
-              <a:t> </a:t>
-            </a:r>
-            <a:r>
-              <a:rPr lang="en" sz="1600" dirty="0" err="1"/>
-              <a:t>xác</a:t>
-            </a:r>
-            <a:r>
-              <a:rPr lang="en" sz="1600" dirty="0"/>
-              <a:t> </a:t>
-            </a:r>
-            <a:r>
-              <a:rPr lang="en" sz="1600" dirty="0" err="1"/>
-              <a:t>đạt</a:t>
-            </a:r>
-            <a:r>
-              <a:rPr lang="en" sz="1600" dirty="0"/>
-              <a:t> </a:t>
-            </a:r>
-            <a:r>
-              <a:rPr lang="en" sz="1600" dirty="0" err="1"/>
-              <a:t>được</a:t>
-            </a:r>
-            <a:r>
-              <a:rPr lang="en" sz="1600" dirty="0"/>
-              <a:t> </a:t>
-            </a:r>
-            <a:r>
-              <a:rPr lang="en" sz="1600" dirty="0" err="1"/>
-              <a:t>trong</a:t>
-            </a:r>
-            <a:r>
-              <a:rPr lang="en" sz="1600" dirty="0"/>
-              <a:t> </a:t>
-            </a:r>
-            <a:r>
-              <a:rPr lang="en" sz="1600" dirty="0" err="1"/>
-              <a:t>quá</a:t>
-            </a:r>
-            <a:r>
-              <a:rPr lang="en" sz="1600" dirty="0"/>
-              <a:t> </a:t>
-            </a:r>
-            <a:r>
-              <a:rPr lang="en" sz="1600" dirty="0" err="1"/>
-              <a:t>trình</a:t>
-            </a:r>
-            <a:r>
-              <a:rPr lang="en" sz="1600" dirty="0"/>
-              <a:t> training </a:t>
-            </a:r>
-            <a:r>
-              <a:rPr lang="en" sz="1600" dirty="0" err="1"/>
-              <a:t>và</a:t>
-            </a:r>
-            <a:r>
-              <a:rPr lang="en" sz="1600" dirty="0"/>
-              <a:t> testing </a:t>
-            </a:r>
-            <a:r>
-              <a:rPr lang="en" sz="1600" dirty="0" err="1"/>
-              <a:t>lần</a:t>
-            </a:r>
-            <a:r>
-              <a:rPr lang="en" sz="1600" dirty="0"/>
-              <a:t> </a:t>
-            </a:r>
-            <a:r>
-              <a:rPr lang="en" sz="1600" dirty="0" err="1"/>
-              <a:t>lượt</a:t>
-            </a:r>
-            <a:r>
-              <a:rPr lang="en" sz="1600" dirty="0"/>
-              <a:t> </a:t>
-            </a:r>
-            <a:r>
-              <a:rPr lang="en" sz="1600" dirty="0" err="1"/>
-              <a:t>là</a:t>
-            </a:r>
-            <a:r>
-              <a:rPr lang="en" sz="1600" dirty="0"/>
-              <a:t> _________.</a:t>
+              <a:t> EfficientDet-d0 model.</a:t>
             </a:r>
             <a:endParaRPr sz="1600" dirty="0"/>
           </a:p>
@@ -13421,19 +14299,19 @@
           <a:lstStyle/>
           <a:p>
             <a:r>
-              <a:rPr lang="en-VN" dirty="0"/>
+              <a:rPr lang="en-VN" sz="1600" dirty="0"/>
               <a:t>Demo: </a:t>
             </a:r>
             <a:r>
-              <a:rPr lang="en-US" dirty="0">
+              <a:rPr lang="en-US" sz="1600" dirty="0">
                 <a:hlinkClick r:id="rId2"/>
               </a:rPr>
               <a:t>https://www.youtube.com/watch?v=hhwftzrl_CQ</a:t>
             </a:r>
-            <a:endParaRPr lang="en-US" dirty="0"/>
+            <a:endParaRPr lang="en-US" sz="1600" dirty="0"/>
           </a:p>
           <a:p>
-            <a:endParaRPr lang="en-VN" dirty="0"/>
+            <a:endParaRPr lang="en-VN" sz="1600" dirty="0"/>
           </a:p>
         </p:txBody>
       </p:sp>
@@ -13510,10 +14388,18 @@
               <a:buNone/>
             </a:pPr>
             <a:r>
-              <a:rPr lang="en" b="1"/>
-              <a:t>Dữ liệu</a:t>
-            </a:r>
-            <a:endParaRPr/>
+              <a:rPr lang="en" b="1" dirty="0" err="1"/>
+              <a:t>Dữ</a:t>
+            </a:r>
+            <a:r>
+              <a:rPr lang="en" b="1" dirty="0"/>
+              <a:t> </a:t>
+            </a:r>
+            <a:r>
+              <a:rPr lang="en" b="1" dirty="0" err="1"/>
+              <a:t>liệu</a:t>
+            </a:r>
+            <a:endParaRPr dirty="0"/>
           </a:p>
         </p:txBody>
       </p:sp>
@@ -13560,10 +14446,346 @@
               <a:buChar char="●"/>
             </a:pPr>
             <a:r>
-              <a:rPr lang="en"/>
-              <a:t>Tổng số mẫu: 624</a:t>
-            </a:r>
-            <a:endParaRPr/>
+              <a:rPr lang="en" sz="1600" dirty="0" err="1"/>
+              <a:t>Tổng</a:t>
+            </a:r>
+            <a:r>
+              <a:rPr lang="en" sz="1600" dirty="0"/>
+              <a:t> </a:t>
+            </a:r>
+            <a:r>
+              <a:rPr lang="en" sz="1600" dirty="0" err="1"/>
+              <a:t>số</a:t>
+            </a:r>
+            <a:r>
+              <a:rPr lang="en" sz="1600" dirty="0"/>
+              <a:t> </a:t>
+            </a:r>
+            <a:r>
+              <a:rPr lang="en" sz="1600" dirty="0" err="1"/>
+              <a:t>ảnh</a:t>
+            </a:r>
+            <a:r>
+              <a:rPr lang="en" sz="1600" dirty="0"/>
+              <a:t>: 1706 </a:t>
+            </a:r>
+            <a:r>
+              <a:rPr lang="en" sz="1600" dirty="0" err="1"/>
+              <a:t>ảnh</a:t>
+            </a:r>
+            <a:endParaRPr sz="1600" dirty="0"/>
+          </a:p>
+          <a:p>
+            <a:pPr lvl="1">
+              <a:spcBef>
+                <a:spcPts val="0"/>
+              </a:spcBef>
+            </a:pPr>
+            <a:r>
+              <a:rPr lang="en" sz="1600" dirty="0"/>
+              <a:t>Training: 1566 </a:t>
+            </a:r>
+            <a:r>
+              <a:rPr lang="en" sz="1600" dirty="0" err="1"/>
+              <a:t>ảnh</a:t>
+            </a:r>
+            <a:r>
+              <a:rPr lang="en" sz="1600" dirty="0"/>
+              <a:t> </a:t>
+            </a:r>
+            <a:r>
+              <a:rPr lang="en" sz="1600" dirty="0" err="1"/>
+              <a:t>trong</a:t>
+            </a:r>
+            <a:r>
+              <a:rPr lang="en" sz="1600" dirty="0"/>
+              <a:t> </a:t>
+            </a:r>
+            <a:r>
+              <a:rPr lang="en" sz="1600" dirty="0" err="1"/>
+              <a:t>đó</a:t>
+            </a:r>
+            <a:r>
+              <a:rPr lang="en" sz="1600" dirty="0"/>
+              <a:t> 1054 </a:t>
+            </a:r>
+            <a:r>
+              <a:rPr lang="en" sz="1600" dirty="0" err="1"/>
+              <a:t>ảnh</a:t>
+            </a:r>
+            <a:r>
+              <a:rPr lang="en" sz="1600" dirty="0"/>
+              <a:t> </a:t>
+            </a:r>
+            <a:r>
+              <a:rPr lang="en" sz="1600" dirty="0" err="1"/>
+              <a:t>được</a:t>
+            </a:r>
+            <a:r>
+              <a:rPr lang="en" sz="1600" dirty="0"/>
+              <a:t> </a:t>
+            </a:r>
+            <a:r>
+              <a:rPr lang="en" sz="1600" dirty="0" err="1"/>
+              <a:t>tạo</a:t>
+            </a:r>
+            <a:r>
+              <a:rPr lang="en" sz="1600" dirty="0"/>
+              <a:t> ra </a:t>
+            </a:r>
+            <a:r>
+              <a:rPr lang="en" sz="1600" dirty="0" err="1"/>
+              <a:t>sau</a:t>
+            </a:r>
+            <a:r>
+              <a:rPr lang="en" sz="1600" dirty="0"/>
+              <a:t> </a:t>
+            </a:r>
+            <a:r>
+              <a:rPr lang="en" sz="1600" dirty="0" err="1"/>
+              <a:t>khi</a:t>
+            </a:r>
+            <a:r>
+              <a:rPr lang="en" sz="1600" dirty="0"/>
+              <a:t> </a:t>
+            </a:r>
+            <a:r>
+              <a:rPr lang="en" sz="1600" dirty="0" err="1"/>
+              <a:t>sử</a:t>
+            </a:r>
+            <a:r>
+              <a:rPr lang="en" sz="1600" dirty="0"/>
+              <a:t> d</a:t>
+            </a:r>
+            <a:r>
+              <a:rPr lang="en-US" sz="1600" dirty="0" err="1"/>
+              <a:t>ụng</a:t>
+            </a:r>
+            <a:r>
+              <a:rPr lang="en-US" sz="1600" dirty="0"/>
+              <a:t> </a:t>
+            </a:r>
+            <a:r>
+              <a:rPr lang="en-US" sz="1600" dirty="0" err="1"/>
+              <a:t>augumented</a:t>
+            </a:r>
+            <a:r>
+              <a:rPr lang="en-US" sz="1600" dirty="0"/>
+              <a:t> </a:t>
+            </a:r>
+            <a:r>
+              <a:rPr lang="en-US" sz="1600" dirty="0" err="1"/>
+              <a:t>trên</a:t>
+            </a:r>
+            <a:r>
+              <a:rPr lang="en-US" sz="1600" dirty="0"/>
+              <a:t> 512 </a:t>
+            </a:r>
+            <a:r>
+              <a:rPr lang="en-US" sz="1600" dirty="0" err="1"/>
+              <a:t>ảnh</a:t>
+            </a:r>
+            <a:r>
+              <a:rPr lang="en-US" sz="1600" dirty="0"/>
+              <a:t> </a:t>
+            </a:r>
+            <a:r>
+              <a:rPr lang="en-US" sz="1600" dirty="0" err="1"/>
+              <a:t>gốc</a:t>
+            </a:r>
+            <a:r>
+              <a:rPr lang="en" sz="1600" dirty="0"/>
+              <a:t> </a:t>
+            </a:r>
+            <a:r>
+              <a:rPr lang="en-US" sz="1600" dirty="0" err="1"/>
+              <a:t>theo</a:t>
+            </a:r>
+            <a:r>
+              <a:rPr lang="en-US" sz="1600" dirty="0"/>
+              <a:t> </a:t>
+            </a:r>
+            <a:r>
+              <a:rPr lang="en-US" sz="1600" dirty="0" err="1"/>
+              <a:t>cấu</a:t>
+            </a:r>
+            <a:r>
+              <a:rPr lang="en-US" sz="1600" dirty="0"/>
+              <a:t> </a:t>
+            </a:r>
+            <a:r>
+              <a:rPr lang="en-US" sz="1600" dirty="0" err="1"/>
+              <a:t>hình</a:t>
+            </a:r>
+            <a:r>
+              <a:rPr lang="en-US" sz="1600" dirty="0"/>
+              <a:t> </a:t>
+            </a:r>
+            <a:r>
+              <a:rPr lang="en-US" sz="1600" dirty="0" err="1"/>
+              <a:t>như</a:t>
+            </a:r>
+            <a:r>
+              <a:rPr lang="en-US" sz="1600" dirty="0"/>
+              <a:t> </a:t>
+            </a:r>
+            <a:r>
+              <a:rPr lang="en-US" sz="1600" dirty="0" err="1"/>
+              <a:t>sau</a:t>
+            </a:r>
+            <a:r>
+              <a:rPr lang="en-US" sz="1600" dirty="0"/>
+              <a:t>:</a:t>
+            </a:r>
+          </a:p>
+          <a:p>
+            <a:pPr lvl="2">
+              <a:spcBef>
+                <a:spcPts val="0"/>
+              </a:spcBef>
+            </a:pPr>
+            <a:r>
+              <a:rPr lang="en-US" sz="1600" dirty="0"/>
+              <a:t>Size: 416 x 416</a:t>
+            </a:r>
+          </a:p>
+          <a:p>
+            <a:pPr lvl="2">
+              <a:spcBef>
+                <a:spcPts val="0"/>
+              </a:spcBef>
+            </a:pPr>
+            <a:r>
+              <a:rPr lang="en-US" sz="1600" dirty="0"/>
+              <a:t>Rotation: </a:t>
+            </a:r>
+            <a:r>
+              <a:rPr lang="en-US" sz="1600" dirty="0" err="1"/>
+              <a:t>từ</a:t>
+            </a:r>
+            <a:r>
+              <a:rPr lang="en-US" sz="1600" dirty="0"/>
+              <a:t> -45 </a:t>
+            </a:r>
+            <a:r>
+              <a:rPr lang="en-US" sz="1600" dirty="0" err="1"/>
+              <a:t>độ</a:t>
+            </a:r>
+            <a:r>
+              <a:rPr lang="en-US" sz="1600" dirty="0"/>
+              <a:t> </a:t>
+            </a:r>
+            <a:r>
+              <a:rPr lang="en-US" sz="1600" dirty="0" err="1"/>
+              <a:t>đến</a:t>
+            </a:r>
+            <a:r>
+              <a:rPr lang="en-US" sz="1600" dirty="0"/>
+              <a:t> 45 </a:t>
+            </a:r>
+            <a:r>
+              <a:rPr lang="en-US" sz="1600" dirty="0" err="1"/>
+              <a:t>độ</a:t>
+            </a:r>
+            <a:endParaRPr lang="en-US" sz="1600" dirty="0"/>
+          </a:p>
+          <a:p>
+            <a:pPr lvl="2">
+              <a:spcBef>
+                <a:spcPts val="0"/>
+              </a:spcBef>
+            </a:pPr>
+            <a:r>
+              <a:rPr lang="en-US" sz="1600" dirty="0"/>
+              <a:t>Shear: horizontal </a:t>
+            </a:r>
+            <a:r>
+              <a:rPr lang="en-US" sz="1600" dirty="0" err="1"/>
+              <a:t>và</a:t>
+            </a:r>
+            <a:r>
+              <a:rPr lang="en-US" sz="1600" dirty="0"/>
+              <a:t> vertical </a:t>
+            </a:r>
+            <a:r>
+              <a:rPr lang="en-US" sz="1600" dirty="0" err="1"/>
+              <a:t>từ</a:t>
+            </a:r>
+            <a:r>
+              <a:rPr lang="en-US" sz="1600" dirty="0"/>
+              <a:t> -15 </a:t>
+            </a:r>
+            <a:r>
+              <a:rPr lang="en-US" sz="1600" dirty="0" err="1"/>
+              <a:t>độ</a:t>
+            </a:r>
+            <a:r>
+              <a:rPr lang="en-US" sz="1600" dirty="0"/>
+              <a:t> </a:t>
+            </a:r>
+            <a:r>
+              <a:rPr lang="en-US" sz="1600" dirty="0" err="1"/>
+              <a:t>đến</a:t>
+            </a:r>
+            <a:r>
+              <a:rPr lang="en-US" sz="1600" dirty="0"/>
+              <a:t> 15 </a:t>
+            </a:r>
+            <a:r>
+              <a:rPr lang="en-US" sz="1600" dirty="0" err="1"/>
+              <a:t>độ</a:t>
+            </a:r>
+            <a:endParaRPr lang="en-US" sz="1600" dirty="0"/>
+          </a:p>
+          <a:p>
+            <a:pPr lvl="2">
+              <a:spcBef>
+                <a:spcPts val="0"/>
+              </a:spcBef>
+            </a:pPr>
+            <a:r>
+              <a:rPr lang="en-US" sz="1600" dirty="0"/>
+              <a:t>Brightness: </a:t>
+            </a:r>
+            <a:r>
+              <a:rPr lang="en-US" sz="1600" dirty="0" err="1"/>
+              <a:t>từ</a:t>
+            </a:r>
+            <a:r>
+              <a:rPr lang="en-US" sz="1600" dirty="0"/>
+              <a:t> -20% </a:t>
+            </a:r>
+            <a:r>
+              <a:rPr lang="en-US" sz="1600" dirty="0" err="1"/>
+              <a:t>đến</a:t>
+            </a:r>
+            <a:r>
+              <a:rPr lang="en-US" sz="1600" dirty="0"/>
+              <a:t> 20%</a:t>
+            </a:r>
+          </a:p>
+          <a:p>
+            <a:pPr lvl="2">
+              <a:spcBef>
+                <a:spcPts val="0"/>
+              </a:spcBef>
+            </a:pPr>
+            <a:r>
+              <a:rPr lang="vi-VN" sz="1600" dirty="0"/>
+              <a:t>Blur: từ 0px đến 5px</a:t>
+            </a:r>
+          </a:p>
+          <a:p>
+            <a:pPr lvl="2">
+              <a:spcBef>
+                <a:spcPts val="0"/>
+              </a:spcBef>
+            </a:pPr>
+            <a:r>
+              <a:rPr lang="vi-VN" sz="1600" dirty="0"/>
+              <a:t>Noise: từ 0% đến 5%</a:t>
+            </a:r>
+            <a:endParaRPr sz="1600" dirty="0"/>
           </a:p>
           <a:p>
             <a:pPr marL="914400" lvl="1" indent="-355600" algn="l" rtl="0">
@@ -13580,179 +14802,74 @@
               <a:buChar char="○"/>
             </a:pPr>
             <a:r>
-              <a:rPr lang="en"/>
-              <a:t>Training:</a:t>
-            </a:r>
-            <a:endParaRPr/>
+              <a:rPr lang="en" sz="1600" dirty="0"/>
+              <a:t>Testing: 130 </a:t>
+            </a:r>
+            <a:r>
+              <a:rPr lang="en" sz="1600" dirty="0" err="1"/>
+              <a:t>ảnh</a:t>
+            </a:r>
+            <a:endParaRPr lang="en" sz="1600" dirty="0"/>
           </a:p>
           <a:p>
-            <a:pPr marL="914400" lvl="1" indent="-355600" algn="l" rtl="0">
-              <a:lnSpc>
-                <a:spcPct val="115000"/>
-              </a:lnSpc>
-              <a:spcBef>
-                <a:spcPts val="0"/>
-              </a:spcBef>
-              <a:spcAft>
-                <a:spcPts val="0"/>
-              </a:spcAft>
-              <a:buSzPts val="2000"/>
-              <a:buChar char="○"/>
+            <a:pPr lvl="1">
+              <a:spcBef>
+                <a:spcPts val="0"/>
+              </a:spcBef>
             </a:pPr>
             <a:r>
-              <a:rPr lang="en"/>
-              <a:t>Testing:</a:t>
-            </a:r>
-            <a:endParaRPr/>
+              <a:rPr lang="en" sz="1600" dirty="0"/>
+              <a:t>Dataset: </a:t>
+            </a:r>
+            <a:r>
+              <a:rPr lang="en-US" sz="1600" dirty="0">
+                <a:hlinkClick r:id="rId3"/>
+              </a:rPr>
+              <a:t>https://github.com/MaiNga-uit/CS2225.CH1507/tree/master/dataset</a:t>
+            </a:r>
+            <a:endParaRPr lang="en-US" sz="1600" dirty="0"/>
           </a:p>
           <a:p>
-            <a:pPr marL="914400" lvl="1" indent="-355600" algn="l" rtl="0">
-              <a:lnSpc>
-                <a:spcPct val="115000"/>
-              </a:lnSpc>
-              <a:spcBef>
-                <a:spcPts val="0"/>
-              </a:spcBef>
-              <a:spcAft>
-                <a:spcPts val="0"/>
-              </a:spcAft>
-              <a:buSzPts val="2000"/>
-              <a:buChar char="○"/>
+            <a:pPr lvl="1">
+              <a:spcBef>
+                <a:spcPts val="0"/>
+              </a:spcBef>
             </a:pPr>
             <a:r>
-              <a:rPr lang="en"/>
-              <a:t>Evaluating</a:t>
-            </a:r>
-            <a:endParaRPr/>
+              <a:rPr lang="en-US" sz="1600" dirty="0"/>
+              <a:t>TF-record </a:t>
+            </a:r>
+            <a:r>
+              <a:rPr lang="en-US" sz="1600" dirty="0" err="1"/>
+              <a:t>từ</a:t>
+            </a:r>
+            <a:r>
+              <a:rPr lang="en-US" sz="1600" dirty="0"/>
+              <a:t> dataset: </a:t>
+            </a:r>
+            <a:r>
+              <a:rPr lang="en-US" sz="1600" dirty="0">
+                <a:hlinkClick r:id="rId4"/>
+              </a:rPr>
+              <a:t>https://app.roboflow.com/ds/6kyOg1KHvY?key=9NoENEKLqj</a:t>
+            </a:r>
+            <a:endParaRPr lang="en-US" sz="1600" dirty="0"/>
           </a:p>
           <a:p>
-            <a:pPr marL="457200" lvl="0" indent="-368300" algn="l" rtl="0">
-              <a:lnSpc>
-                <a:spcPct val="115000"/>
-              </a:lnSpc>
-              <a:spcBef>
-                <a:spcPts val="0"/>
-              </a:spcBef>
-              <a:spcAft>
-                <a:spcPts val="0"/>
-              </a:spcAft>
-              <a:buSzPts val="2200"/>
-              <a:buChar char="●"/>
+            <a:pPr lvl="1">
+              <a:spcBef>
+                <a:spcPts val="0"/>
+              </a:spcBef>
             </a:pPr>
-            <a:r>
-              <a:rPr lang="en"/>
-              <a:t>Cách thu thập</a:t>
-            </a:r>
-            <a:endParaRPr/>
+            <a:endParaRPr lang="en-US" sz="1600" dirty="0"/>
           </a:p>
           <a:p>
-            <a:pPr marL="914400" lvl="1" indent="-355600" algn="l" rtl="0">
-              <a:lnSpc>
-                <a:spcPct val="115000"/>
-              </a:lnSpc>
-              <a:spcBef>
-                <a:spcPts val="0"/>
-              </a:spcBef>
-              <a:spcAft>
-                <a:spcPts val="0"/>
-              </a:spcAft>
-              <a:buSzPts val="2000"/>
-              <a:buChar char="○"/>
+            <a:pPr lvl="1">
+              <a:spcBef>
+                <a:spcPts val="0"/>
+              </a:spcBef>
             </a:pPr>
-            <a:r>
-              <a:rPr lang="en"/>
-              <a:t>Nguồn dữ liệu: ảnh tự chụp được, tìm kiếm bằng Google.</a:t>
-            </a:r>
-            <a:endParaRPr/>
-          </a:p>
-          <a:p>
-            <a:pPr marL="914400" lvl="1" indent="-355600" algn="l" rtl="0">
-              <a:lnSpc>
-                <a:spcPct val="115000"/>
-              </a:lnSpc>
-              <a:spcBef>
-                <a:spcPts val="0"/>
-              </a:spcBef>
-              <a:spcAft>
-                <a:spcPts val="0"/>
-              </a:spcAft>
-              <a:buSzPts val="2000"/>
-              <a:buChar char="○"/>
-            </a:pPr>
-            <a:r>
-              <a:rPr lang="en"/>
-              <a:t>Gán nhãn: thủ công bằng roboflow.</a:t>
-            </a:r>
-            <a:endParaRPr/>
-          </a:p>
-          <a:p>
-            <a:pPr marL="914400" lvl="1" indent="-355600" algn="l" rtl="0">
-              <a:lnSpc>
-                <a:spcPct val="115000"/>
-              </a:lnSpc>
-              <a:spcBef>
-                <a:spcPts val="0"/>
-              </a:spcBef>
-              <a:spcAft>
-                <a:spcPts val="0"/>
-              </a:spcAft>
-              <a:buSzPts val="2000"/>
-              <a:buChar char="○"/>
-            </a:pPr>
-            <a:r>
-              <a:rPr lang="en"/>
-              <a:t>Sử dụng phương pháp </a:t>
-            </a:r>
-            <a:r>
-              <a:rPr lang="en">
-                <a:latin typeface="Arial"/>
-                <a:ea typeface="Arial"/>
-                <a:cs typeface="Arial"/>
-                <a:sym typeface="Arial"/>
-              </a:rPr>
-              <a:t>augmented trên tập dữ liệu đã thu thập để tạo sự đa dạng cho dữ liệu</a:t>
-            </a:r>
-            <a:r>
-              <a:rPr lang="en"/>
-              <a:t>.</a:t>
-            </a:r>
-            <a:endParaRPr/>
-          </a:p>
-          <a:p>
-            <a:pPr marL="914400" lvl="1" indent="-355600" algn="l" rtl="0">
-              <a:lnSpc>
-                <a:spcPct val="115000"/>
-              </a:lnSpc>
-              <a:spcBef>
-                <a:spcPts val="0"/>
-              </a:spcBef>
-              <a:spcAft>
-                <a:spcPts val="0"/>
-              </a:spcAft>
-              <a:buSzPts val="2000"/>
-              <a:buChar char="○"/>
-            </a:pPr>
-            <a:r>
-              <a:rPr lang="en"/>
-              <a:t>Số nhãn: 6 (loại trái cây).</a:t>
-            </a:r>
-            <a:endParaRPr/>
-          </a:p>
-          <a:p>
-            <a:pPr marL="914400" lvl="0" indent="0" algn="l" rtl="0">
-              <a:lnSpc>
-                <a:spcPct val="115000"/>
-              </a:lnSpc>
-              <a:spcBef>
-                <a:spcPts val="1600"/>
-              </a:spcBef>
-              <a:spcAft>
-                <a:spcPts val="1600"/>
-              </a:spcAft>
-              <a:buSzPts val="2200"/>
-              <a:buNone/>
-            </a:pPr>
-            <a:endParaRPr sz="1800"/>
+            <a:endParaRPr lang="en" sz="1600" dirty="0"/>
           </a:p>
         </p:txBody>
       </p:sp>
@@ -13765,6 +14882,688 @@
 </file>
 
 <file path=ppt/slides/slide8.xml><?xml version="1.0" encoding="utf-8"?>
+<p:sld xmlns:a="http://schemas.openxmlformats.org/drawingml/2006/main" xmlns:r="http://schemas.openxmlformats.org/officeDocument/2006/relationships" xmlns:p="http://schemas.openxmlformats.org/presentationml/2006/main">
+  <p:cSld>
+    <p:spTree>
+      <p:nvGrpSpPr>
+        <p:cNvPr id="1" name="Shape 103"/>
+        <p:cNvGrpSpPr/>
+        <p:nvPr/>
+      </p:nvGrpSpPr>
+      <p:grpSpPr>
+        <a:xfrm>
+          <a:off x="0" y="0"/>
+          <a:ext cx="0" cy="0"/>
+          <a:chOff x="0" y="0"/>
+          <a:chExt cx="0" cy="0"/>
+        </a:xfrm>
+      </p:grpSpPr>
+      <p:sp>
+        <p:nvSpPr>
+          <p:cNvPr id="104" name="Google Shape;104;p9"/>
+          <p:cNvSpPr txBox="1">
+            <a:spLocks noGrp="1"/>
+          </p:cNvSpPr>
+          <p:nvPr>
+            <p:ph type="title"/>
+          </p:nvPr>
+        </p:nvSpPr>
+        <p:spPr>
+          <a:xfrm>
+            <a:off x="471900" y="57875"/>
+            <a:ext cx="8222100" cy="670500"/>
+          </a:xfrm>
+          <a:prstGeom prst="rect">
+            <a:avLst/>
+          </a:prstGeom>
+          <a:noFill/>
+          <a:ln>
+            <a:noFill/>
+          </a:ln>
+        </p:spPr>
+        <p:txBody>
+          <a:bodyPr spcFirstLastPara="1" wrap="square" lIns="91425" tIns="91425" rIns="91425" bIns="91425" anchor="ctr" anchorCtr="0">
+            <a:noAutofit/>
+          </a:bodyPr>
+          <a:lstStyle/>
+          <a:p>
+            <a:pPr marL="0" lvl="0" indent="0" algn="l" rtl="0">
+              <a:lnSpc>
+                <a:spcPct val="100000"/>
+              </a:lnSpc>
+              <a:spcBef>
+                <a:spcPts val="0"/>
+              </a:spcBef>
+              <a:spcAft>
+                <a:spcPts val="0"/>
+              </a:spcAft>
+              <a:buSzPts val="3200"/>
+              <a:buNone/>
+            </a:pPr>
+            <a:r>
+              <a:rPr lang="en" b="1" dirty="0" err="1"/>
+              <a:t>Dữ</a:t>
+            </a:r>
+            <a:r>
+              <a:rPr lang="en" b="1" dirty="0"/>
+              <a:t> </a:t>
+            </a:r>
+            <a:r>
+              <a:rPr lang="en" b="1" dirty="0" err="1"/>
+              <a:t>liệu</a:t>
+            </a:r>
+            <a:endParaRPr dirty="0"/>
+          </a:p>
+        </p:txBody>
+      </p:sp>
+      <p:sp>
+        <p:nvSpPr>
+          <p:cNvPr id="105" name="Google Shape;105;p9"/>
+          <p:cNvSpPr txBox="1">
+            <a:spLocks noGrp="1"/>
+          </p:cNvSpPr>
+          <p:nvPr>
+            <p:ph type="body" idx="1"/>
+          </p:nvPr>
+        </p:nvSpPr>
+        <p:spPr>
+          <a:xfrm>
+            <a:off x="471900" y="820500"/>
+            <a:ext cx="8222100" cy="3908400"/>
+          </a:xfrm>
+          <a:prstGeom prst="rect">
+            <a:avLst/>
+          </a:prstGeom>
+          <a:noFill/>
+          <a:ln>
+            <a:noFill/>
+          </a:ln>
+        </p:spPr>
+        <p:txBody>
+          <a:bodyPr spcFirstLastPara="1" wrap="square" lIns="91425" tIns="91425" rIns="91425" bIns="91425" anchor="t" anchorCtr="0">
+            <a:noAutofit/>
+          </a:bodyPr>
+          <a:lstStyle/>
+          <a:p>
+            <a:r>
+              <a:rPr lang="en" sz="1600" dirty="0" err="1"/>
+              <a:t>Cách</a:t>
+            </a:r>
+            <a:r>
+              <a:rPr lang="en" sz="1600" dirty="0"/>
+              <a:t> </a:t>
+            </a:r>
+            <a:r>
+              <a:rPr lang="en" sz="1600" dirty="0" err="1"/>
+              <a:t>thu</a:t>
+            </a:r>
+            <a:r>
+              <a:rPr lang="en" sz="1600" dirty="0"/>
+              <a:t> </a:t>
+            </a:r>
+            <a:r>
+              <a:rPr lang="en" sz="1600" dirty="0" err="1"/>
+              <a:t>thập</a:t>
+            </a:r>
+            <a:r>
+              <a:rPr lang="en" sz="1600" dirty="0"/>
+              <a:t>:</a:t>
+            </a:r>
+            <a:endParaRPr sz="1600" dirty="0"/>
+          </a:p>
+          <a:p>
+            <a:pPr marL="914400" lvl="1" indent="-355600" algn="l" rtl="0">
+              <a:lnSpc>
+                <a:spcPct val="115000"/>
+              </a:lnSpc>
+              <a:spcBef>
+                <a:spcPts val="0"/>
+              </a:spcBef>
+              <a:spcAft>
+                <a:spcPts val="0"/>
+              </a:spcAft>
+              <a:buSzPts val="2000"/>
+              <a:buChar char="○"/>
+            </a:pPr>
+            <a:r>
+              <a:rPr lang="en" sz="1600" dirty="0" err="1"/>
+              <a:t>Nguồn</a:t>
+            </a:r>
+            <a:r>
+              <a:rPr lang="en" sz="1600" dirty="0"/>
+              <a:t> </a:t>
+            </a:r>
+            <a:r>
+              <a:rPr lang="en" sz="1600" dirty="0" err="1"/>
+              <a:t>dữ</a:t>
+            </a:r>
+            <a:r>
+              <a:rPr lang="en" sz="1600" dirty="0"/>
+              <a:t> </a:t>
+            </a:r>
+            <a:r>
+              <a:rPr lang="en" sz="1600" dirty="0" err="1"/>
+              <a:t>liệu</a:t>
+            </a:r>
+            <a:r>
+              <a:rPr lang="en" sz="1600" dirty="0"/>
+              <a:t>: </a:t>
+            </a:r>
+            <a:r>
+              <a:rPr lang="en" sz="1600" dirty="0" err="1"/>
+              <a:t>ảnh</a:t>
+            </a:r>
+            <a:r>
+              <a:rPr lang="en" sz="1600" dirty="0"/>
+              <a:t> </a:t>
+            </a:r>
+            <a:r>
+              <a:rPr lang="en" sz="1600" dirty="0" err="1"/>
+              <a:t>tự</a:t>
+            </a:r>
+            <a:r>
+              <a:rPr lang="en" sz="1600" dirty="0"/>
+              <a:t> </a:t>
+            </a:r>
+            <a:r>
+              <a:rPr lang="en" sz="1600" dirty="0" err="1"/>
+              <a:t>chụp</a:t>
+            </a:r>
+            <a:r>
+              <a:rPr lang="en" sz="1600" dirty="0"/>
+              <a:t> </a:t>
+            </a:r>
+            <a:r>
+              <a:rPr lang="en" sz="1600" dirty="0" err="1"/>
+              <a:t>được</a:t>
+            </a:r>
+            <a:r>
+              <a:rPr lang="en" sz="1600" dirty="0"/>
+              <a:t>, </a:t>
+            </a:r>
+            <a:r>
+              <a:rPr lang="en" sz="1600" dirty="0" err="1"/>
+              <a:t>tìm</a:t>
+            </a:r>
+            <a:r>
+              <a:rPr lang="en" sz="1600" dirty="0"/>
+              <a:t> </a:t>
+            </a:r>
+            <a:r>
+              <a:rPr lang="en" sz="1600" dirty="0" err="1"/>
+              <a:t>kiếm</a:t>
+            </a:r>
+            <a:r>
+              <a:rPr lang="en" sz="1600" dirty="0"/>
+              <a:t> </a:t>
+            </a:r>
+            <a:r>
+              <a:rPr lang="en" sz="1600" dirty="0" err="1"/>
+              <a:t>bằng</a:t>
+            </a:r>
+            <a:r>
+              <a:rPr lang="en" sz="1600" dirty="0"/>
+              <a:t> Google.</a:t>
+            </a:r>
+            <a:endParaRPr sz="1600" dirty="0"/>
+          </a:p>
+          <a:p>
+            <a:pPr marL="914400" lvl="1" indent="-355600" algn="l" rtl="0">
+              <a:lnSpc>
+                <a:spcPct val="115000"/>
+              </a:lnSpc>
+              <a:spcBef>
+                <a:spcPts val="0"/>
+              </a:spcBef>
+              <a:spcAft>
+                <a:spcPts val="0"/>
+              </a:spcAft>
+              <a:buSzPts val="2000"/>
+              <a:buChar char="○"/>
+            </a:pPr>
+            <a:r>
+              <a:rPr lang="en" sz="1600" dirty="0" err="1"/>
+              <a:t>Gán</a:t>
+            </a:r>
+            <a:r>
+              <a:rPr lang="en" sz="1600" dirty="0"/>
+              <a:t> </a:t>
+            </a:r>
+            <a:r>
+              <a:rPr lang="en" sz="1600" dirty="0" err="1"/>
+              <a:t>nhãn</a:t>
+            </a:r>
+            <a:r>
+              <a:rPr lang="en" sz="1600" dirty="0"/>
+              <a:t>: </a:t>
+            </a:r>
+            <a:r>
+              <a:rPr lang="en" sz="1600" dirty="0" err="1"/>
+              <a:t>thủ</a:t>
+            </a:r>
+            <a:r>
+              <a:rPr lang="en" sz="1600" dirty="0"/>
+              <a:t> </a:t>
+            </a:r>
+            <a:r>
+              <a:rPr lang="en" sz="1600" dirty="0" err="1"/>
+              <a:t>công</a:t>
+            </a:r>
+            <a:r>
+              <a:rPr lang="en" sz="1600" dirty="0"/>
+              <a:t> </a:t>
+            </a:r>
+            <a:r>
+              <a:rPr lang="en" sz="1600" dirty="0" err="1"/>
+              <a:t>bằng</a:t>
+            </a:r>
+            <a:r>
+              <a:rPr lang="en" sz="1600" dirty="0"/>
+              <a:t> </a:t>
+            </a:r>
+            <a:r>
+              <a:rPr lang="en" sz="1600" dirty="0" err="1"/>
+              <a:t>roboflow</a:t>
+            </a:r>
+            <a:r>
+              <a:rPr lang="en" sz="1600" dirty="0"/>
+              <a:t>.</a:t>
+            </a:r>
+            <a:endParaRPr sz="1600" dirty="0"/>
+          </a:p>
+          <a:p>
+            <a:pPr marL="914400" lvl="1" indent="-355600" algn="l" rtl="0">
+              <a:lnSpc>
+                <a:spcPct val="115000"/>
+              </a:lnSpc>
+              <a:spcBef>
+                <a:spcPts val="0"/>
+              </a:spcBef>
+              <a:spcAft>
+                <a:spcPts val="0"/>
+              </a:spcAft>
+              <a:buSzPts val="2000"/>
+              <a:buChar char="○"/>
+            </a:pPr>
+            <a:r>
+              <a:rPr lang="en" sz="1600" dirty="0" err="1"/>
+              <a:t>Sử</a:t>
+            </a:r>
+            <a:r>
+              <a:rPr lang="en" sz="1600" dirty="0"/>
+              <a:t> </a:t>
+            </a:r>
+            <a:r>
+              <a:rPr lang="en" sz="1600" dirty="0" err="1"/>
+              <a:t>dụng</a:t>
+            </a:r>
+            <a:r>
+              <a:rPr lang="en" sz="1600" dirty="0"/>
+              <a:t> </a:t>
+            </a:r>
+            <a:r>
+              <a:rPr lang="en" sz="1600" dirty="0" err="1"/>
+              <a:t>phương</a:t>
+            </a:r>
+            <a:r>
+              <a:rPr lang="en" sz="1600" dirty="0"/>
+              <a:t> </a:t>
+            </a:r>
+            <a:r>
+              <a:rPr lang="en" sz="1600" dirty="0" err="1"/>
+              <a:t>pháp</a:t>
+            </a:r>
+            <a:r>
+              <a:rPr lang="en" sz="1600" dirty="0"/>
+              <a:t> </a:t>
+            </a:r>
+            <a:r>
+              <a:rPr lang="en" sz="1600" dirty="0">
+                <a:latin typeface="Arial"/>
+                <a:ea typeface="Arial"/>
+                <a:cs typeface="Arial"/>
+                <a:sym typeface="Arial"/>
+              </a:rPr>
+              <a:t>augmented </a:t>
+            </a:r>
+            <a:r>
+              <a:rPr lang="en" sz="1600" dirty="0" err="1">
+                <a:latin typeface="Arial"/>
+                <a:ea typeface="Arial"/>
+                <a:cs typeface="Arial"/>
+                <a:sym typeface="Arial"/>
+              </a:rPr>
+              <a:t>trên</a:t>
+            </a:r>
+            <a:r>
+              <a:rPr lang="en" sz="1600" dirty="0">
+                <a:latin typeface="Arial"/>
+                <a:ea typeface="Arial"/>
+                <a:cs typeface="Arial"/>
+                <a:sym typeface="Arial"/>
+              </a:rPr>
+              <a:t> </a:t>
+            </a:r>
+            <a:r>
+              <a:rPr lang="en" sz="1600" dirty="0" err="1">
+                <a:latin typeface="Arial"/>
+                <a:ea typeface="Arial"/>
+                <a:cs typeface="Arial"/>
+                <a:sym typeface="Arial"/>
+              </a:rPr>
+              <a:t>tập</a:t>
+            </a:r>
+            <a:r>
+              <a:rPr lang="en" sz="1600" dirty="0">
+                <a:latin typeface="Arial"/>
+                <a:ea typeface="Arial"/>
+                <a:cs typeface="Arial"/>
+                <a:sym typeface="Arial"/>
+              </a:rPr>
+              <a:t> </a:t>
+            </a:r>
+            <a:r>
+              <a:rPr lang="en" sz="1600" dirty="0" err="1">
+                <a:latin typeface="Arial"/>
+                <a:ea typeface="Arial"/>
+                <a:cs typeface="Arial"/>
+                <a:sym typeface="Arial"/>
+              </a:rPr>
+              <a:t>dữ</a:t>
+            </a:r>
+            <a:r>
+              <a:rPr lang="en" sz="1600" dirty="0">
+                <a:latin typeface="Arial"/>
+                <a:ea typeface="Arial"/>
+                <a:cs typeface="Arial"/>
+                <a:sym typeface="Arial"/>
+              </a:rPr>
+              <a:t> </a:t>
+            </a:r>
+            <a:r>
+              <a:rPr lang="en" sz="1600" dirty="0" err="1">
+                <a:latin typeface="Arial"/>
+                <a:ea typeface="Arial"/>
+                <a:cs typeface="Arial"/>
+                <a:sym typeface="Arial"/>
+              </a:rPr>
+              <a:t>liệu</a:t>
+            </a:r>
+            <a:r>
+              <a:rPr lang="en" sz="1600" dirty="0">
+                <a:latin typeface="Arial"/>
+                <a:ea typeface="Arial"/>
+                <a:cs typeface="Arial"/>
+                <a:sym typeface="Arial"/>
+              </a:rPr>
+              <a:t> </a:t>
+            </a:r>
+            <a:r>
+              <a:rPr lang="en" sz="1600" dirty="0" err="1">
+                <a:latin typeface="Arial"/>
+                <a:ea typeface="Arial"/>
+                <a:cs typeface="Arial"/>
+                <a:sym typeface="Arial"/>
+              </a:rPr>
+              <a:t>đã</a:t>
+            </a:r>
+            <a:r>
+              <a:rPr lang="en" sz="1600" dirty="0">
+                <a:latin typeface="Arial"/>
+                <a:ea typeface="Arial"/>
+                <a:cs typeface="Arial"/>
+                <a:sym typeface="Arial"/>
+              </a:rPr>
+              <a:t> </a:t>
+            </a:r>
+            <a:r>
+              <a:rPr lang="en" sz="1600" dirty="0" err="1">
+                <a:latin typeface="Arial"/>
+                <a:ea typeface="Arial"/>
+                <a:cs typeface="Arial"/>
+                <a:sym typeface="Arial"/>
+              </a:rPr>
+              <a:t>thu</a:t>
+            </a:r>
+            <a:r>
+              <a:rPr lang="en" sz="1600" dirty="0">
+                <a:latin typeface="Arial"/>
+                <a:ea typeface="Arial"/>
+                <a:cs typeface="Arial"/>
+                <a:sym typeface="Arial"/>
+              </a:rPr>
+              <a:t> </a:t>
+            </a:r>
+            <a:r>
+              <a:rPr lang="en" sz="1600" dirty="0" err="1">
+                <a:latin typeface="Arial"/>
+                <a:ea typeface="Arial"/>
+                <a:cs typeface="Arial"/>
+                <a:sym typeface="Arial"/>
+              </a:rPr>
+              <a:t>thập</a:t>
+            </a:r>
+            <a:r>
+              <a:rPr lang="en" sz="1600" dirty="0">
+                <a:latin typeface="Arial"/>
+                <a:ea typeface="Arial"/>
+                <a:cs typeface="Arial"/>
+                <a:sym typeface="Arial"/>
+              </a:rPr>
+              <a:t> </a:t>
+            </a:r>
+            <a:r>
+              <a:rPr lang="en" sz="1600" dirty="0" err="1">
+                <a:latin typeface="Arial"/>
+                <a:ea typeface="Arial"/>
+                <a:cs typeface="Arial"/>
+                <a:sym typeface="Arial"/>
+              </a:rPr>
+              <a:t>để</a:t>
+            </a:r>
+            <a:r>
+              <a:rPr lang="en" sz="1600" dirty="0">
+                <a:latin typeface="Arial"/>
+                <a:ea typeface="Arial"/>
+                <a:cs typeface="Arial"/>
+                <a:sym typeface="Arial"/>
+              </a:rPr>
+              <a:t> </a:t>
+            </a:r>
+            <a:r>
+              <a:rPr lang="en" sz="1600" dirty="0" err="1">
+                <a:latin typeface="Arial"/>
+                <a:ea typeface="Arial"/>
+                <a:cs typeface="Arial"/>
+                <a:sym typeface="Arial"/>
+              </a:rPr>
+              <a:t>tạo</a:t>
+            </a:r>
+            <a:r>
+              <a:rPr lang="en" sz="1600" dirty="0">
+                <a:latin typeface="Arial"/>
+                <a:ea typeface="Arial"/>
+                <a:cs typeface="Arial"/>
+                <a:sym typeface="Arial"/>
+              </a:rPr>
+              <a:t> </a:t>
+            </a:r>
+            <a:r>
+              <a:rPr lang="en" sz="1600" dirty="0" err="1">
+                <a:latin typeface="Arial"/>
+                <a:ea typeface="Arial"/>
+                <a:cs typeface="Arial"/>
+                <a:sym typeface="Arial"/>
+              </a:rPr>
+              <a:t>sự</a:t>
+            </a:r>
+            <a:r>
+              <a:rPr lang="en" sz="1600" dirty="0">
+                <a:latin typeface="Arial"/>
+                <a:ea typeface="Arial"/>
+                <a:cs typeface="Arial"/>
+                <a:sym typeface="Arial"/>
+              </a:rPr>
+              <a:t> </a:t>
+            </a:r>
+            <a:r>
+              <a:rPr lang="en" sz="1600" dirty="0" err="1">
+                <a:latin typeface="Arial"/>
+                <a:ea typeface="Arial"/>
+                <a:cs typeface="Arial"/>
+                <a:sym typeface="Arial"/>
+              </a:rPr>
+              <a:t>đa</a:t>
+            </a:r>
+            <a:r>
+              <a:rPr lang="en" sz="1600" dirty="0">
+                <a:latin typeface="Arial"/>
+                <a:ea typeface="Arial"/>
+                <a:cs typeface="Arial"/>
+                <a:sym typeface="Arial"/>
+              </a:rPr>
+              <a:t> </a:t>
+            </a:r>
+            <a:r>
+              <a:rPr lang="en" sz="1600" dirty="0" err="1">
+                <a:latin typeface="Arial"/>
+                <a:ea typeface="Arial"/>
+                <a:cs typeface="Arial"/>
+                <a:sym typeface="Arial"/>
+              </a:rPr>
+              <a:t>dạng</a:t>
+            </a:r>
+            <a:r>
+              <a:rPr lang="en" sz="1600" dirty="0">
+                <a:latin typeface="Arial"/>
+                <a:ea typeface="Arial"/>
+                <a:cs typeface="Arial"/>
+                <a:sym typeface="Arial"/>
+              </a:rPr>
+              <a:t> </a:t>
+            </a:r>
+            <a:r>
+              <a:rPr lang="en" sz="1600" dirty="0" err="1">
+                <a:latin typeface="Arial"/>
+                <a:ea typeface="Arial"/>
+                <a:cs typeface="Arial"/>
+                <a:sym typeface="Arial"/>
+              </a:rPr>
+              <a:t>cho</a:t>
+            </a:r>
+            <a:r>
+              <a:rPr lang="en" sz="1600" dirty="0">
+                <a:latin typeface="Arial"/>
+                <a:ea typeface="Arial"/>
+                <a:cs typeface="Arial"/>
+                <a:sym typeface="Arial"/>
+              </a:rPr>
+              <a:t> </a:t>
+            </a:r>
+            <a:r>
+              <a:rPr lang="en" sz="1600" dirty="0" err="1">
+                <a:latin typeface="Arial"/>
+                <a:ea typeface="Arial"/>
+                <a:cs typeface="Arial"/>
+                <a:sym typeface="Arial"/>
+              </a:rPr>
+              <a:t>dữ</a:t>
+            </a:r>
+            <a:r>
+              <a:rPr lang="en" sz="1600" dirty="0">
+                <a:latin typeface="Arial"/>
+                <a:ea typeface="Arial"/>
+                <a:cs typeface="Arial"/>
+                <a:sym typeface="Arial"/>
+              </a:rPr>
+              <a:t> </a:t>
+            </a:r>
+            <a:r>
+              <a:rPr lang="en" sz="1600" dirty="0" err="1">
+                <a:latin typeface="Arial"/>
+                <a:ea typeface="Arial"/>
+                <a:cs typeface="Arial"/>
+                <a:sym typeface="Arial"/>
+              </a:rPr>
+              <a:t>liệu</a:t>
+            </a:r>
+            <a:r>
+              <a:rPr lang="en" sz="1600" dirty="0"/>
+              <a:t>.</a:t>
+            </a:r>
+            <a:endParaRPr sz="1600" dirty="0"/>
+          </a:p>
+          <a:p>
+            <a:pPr marL="914400" lvl="1" indent="-355600" algn="l" rtl="0">
+              <a:lnSpc>
+                <a:spcPct val="115000"/>
+              </a:lnSpc>
+              <a:spcBef>
+                <a:spcPts val="0"/>
+              </a:spcBef>
+              <a:spcAft>
+                <a:spcPts val="0"/>
+              </a:spcAft>
+              <a:buSzPts val="2000"/>
+              <a:buChar char="○"/>
+            </a:pPr>
+            <a:r>
+              <a:rPr lang="en" sz="1600" dirty="0" err="1"/>
+              <a:t>Số</a:t>
+            </a:r>
+            <a:r>
+              <a:rPr lang="en" sz="1600" dirty="0"/>
+              <a:t> </a:t>
+            </a:r>
+            <a:r>
+              <a:rPr lang="en" sz="1600" dirty="0" err="1"/>
+              <a:t>nhãn</a:t>
+            </a:r>
+            <a:r>
+              <a:rPr lang="en" sz="1600" dirty="0"/>
+              <a:t>: 6 (</a:t>
+            </a:r>
+            <a:r>
+              <a:rPr lang="en" sz="1600" dirty="0" err="1"/>
+              <a:t>loại</a:t>
+            </a:r>
+            <a:r>
+              <a:rPr lang="en" sz="1600" dirty="0"/>
+              <a:t> </a:t>
+            </a:r>
+            <a:r>
+              <a:rPr lang="en" sz="1600" dirty="0" err="1"/>
+              <a:t>trái</a:t>
+            </a:r>
+            <a:r>
+              <a:rPr lang="en" sz="1600" dirty="0"/>
+              <a:t> </a:t>
+            </a:r>
+            <a:r>
+              <a:rPr lang="en" sz="1600" dirty="0" err="1"/>
+              <a:t>cây</a:t>
+            </a:r>
+            <a:r>
+              <a:rPr lang="en" sz="1600" dirty="0"/>
+              <a:t>).</a:t>
+            </a:r>
+          </a:p>
+        </p:txBody>
+      </p:sp>
+    </p:spTree>
+    <p:extLst>
+      <p:ext uri="{BB962C8B-B14F-4D97-AF65-F5344CB8AC3E}">
+        <p14:creationId xmlns:p14="http://schemas.microsoft.com/office/powerpoint/2010/main" val="573065521"/>
+      </p:ext>
+    </p:extLst>
+  </p:cSld>
+  <p:clrMapOvr>
+    <a:masterClrMapping/>
+  </p:clrMapOvr>
+</p:sld>
+</file>
+
+<file path=ppt/slides/slide9.xml><?xml version="1.0" encoding="utf-8"?>
 <p:sld xmlns:a="http://schemas.openxmlformats.org/drawingml/2006/main" xmlns:r="http://schemas.openxmlformats.org/officeDocument/2006/relationships" xmlns:p="http://schemas.openxmlformats.org/presentationml/2006/main">
   <p:cSld>
     <p:spTree>
@@ -14401,151 +16200,6 @@
               <a:t>.</a:t>
             </a:r>
             <a:endParaRPr sz="1800" dirty="0"/>
-          </a:p>
-        </p:txBody>
-      </p:sp>
-    </p:spTree>
-  </p:cSld>
-  <p:clrMapOvr>
-    <a:masterClrMapping/>
-  </p:clrMapOvr>
-</p:sld>
-</file>
-
-<file path=ppt/slides/slide9.xml><?xml version="1.0" encoding="utf-8"?>
-<p:sld xmlns:a="http://schemas.openxmlformats.org/drawingml/2006/main" xmlns:r="http://schemas.openxmlformats.org/officeDocument/2006/relationships" xmlns:p="http://schemas.openxmlformats.org/presentationml/2006/main">
-  <p:cSld>
-    <p:spTree>
-      <p:nvGrpSpPr>
-        <p:cNvPr id="1" name="Shape 115"/>
-        <p:cNvGrpSpPr/>
-        <p:nvPr/>
-      </p:nvGrpSpPr>
-      <p:grpSpPr>
-        <a:xfrm>
-          <a:off x="0" y="0"/>
-          <a:ext cx="0" cy="0"/>
-          <a:chOff x="0" y="0"/>
-          <a:chExt cx="0" cy="0"/>
-        </a:xfrm>
-      </p:grpSpPr>
-      <p:sp>
-        <p:nvSpPr>
-          <p:cNvPr id="116" name="Google Shape;116;p8"/>
-          <p:cNvSpPr txBox="1">
-            <a:spLocks noGrp="1"/>
-          </p:cNvSpPr>
-          <p:nvPr>
-            <p:ph type="title"/>
-          </p:nvPr>
-        </p:nvSpPr>
-        <p:spPr>
-          <a:xfrm>
-            <a:off x="471900" y="57875"/>
-            <a:ext cx="8222100" cy="670500"/>
-          </a:xfrm>
-          <a:prstGeom prst="rect">
-            <a:avLst/>
-          </a:prstGeom>
-          <a:noFill/>
-          <a:ln>
-            <a:noFill/>
-          </a:ln>
-        </p:spPr>
-        <p:txBody>
-          <a:bodyPr spcFirstLastPara="1" wrap="square" lIns="91425" tIns="91425" rIns="91425" bIns="91425" anchor="ctr" anchorCtr="0">
-            <a:noAutofit/>
-          </a:bodyPr>
-          <a:lstStyle/>
-          <a:p>
-            <a:pPr marL="0" lvl="0" indent="0" algn="l" rtl="0">
-              <a:lnSpc>
-                <a:spcPct val="100000"/>
-              </a:lnSpc>
-              <a:spcBef>
-                <a:spcPts val="0"/>
-              </a:spcBef>
-              <a:spcAft>
-                <a:spcPts val="0"/>
-              </a:spcAft>
-              <a:buSzPts val="3200"/>
-              <a:buNone/>
-            </a:pPr>
-            <a:r>
-              <a:rPr lang="en" b="1"/>
-              <a:t>Loại bài toán ML</a:t>
-            </a:r>
-            <a:r>
-              <a:rPr lang="en"/>
-              <a:t> </a:t>
-            </a:r>
-            <a:endParaRPr/>
-          </a:p>
-        </p:txBody>
-      </p:sp>
-      <p:sp>
-        <p:nvSpPr>
-          <p:cNvPr id="117" name="Google Shape;117;p8"/>
-          <p:cNvSpPr txBox="1">
-            <a:spLocks noGrp="1"/>
-          </p:cNvSpPr>
-          <p:nvPr>
-            <p:ph type="body" idx="1"/>
-          </p:nvPr>
-        </p:nvSpPr>
-        <p:spPr>
-          <a:xfrm>
-            <a:off x="471900" y="820500"/>
-            <a:ext cx="8222100" cy="3908400"/>
-          </a:xfrm>
-          <a:prstGeom prst="rect">
-            <a:avLst/>
-          </a:prstGeom>
-          <a:noFill/>
-          <a:ln>
-            <a:noFill/>
-          </a:ln>
-        </p:spPr>
-        <p:txBody>
-          <a:bodyPr spcFirstLastPara="1" wrap="square" lIns="91425" tIns="91425" rIns="91425" bIns="91425" anchor="t" anchorCtr="0">
-            <a:noAutofit/>
-          </a:bodyPr>
-          <a:lstStyle/>
-          <a:p>
-            <a:pPr marL="457200" lvl="0" indent="-368300" algn="l" rtl="0">
-              <a:lnSpc>
-                <a:spcPct val="115000"/>
-              </a:lnSpc>
-              <a:spcBef>
-                <a:spcPts val="0"/>
-              </a:spcBef>
-              <a:spcAft>
-                <a:spcPts val="0"/>
-              </a:spcAft>
-              <a:buSzPts val="2200"/>
-              <a:buChar char="●"/>
-            </a:pPr>
-            <a:r>
-              <a:rPr lang="en"/>
-              <a:t>Object Detection</a:t>
-            </a:r>
-            <a:endParaRPr/>
-          </a:p>
-          <a:p>
-            <a:pPr marL="914400" lvl="0" indent="0" algn="l" rtl="0">
-              <a:lnSpc>
-                <a:spcPct val="115000"/>
-              </a:lnSpc>
-              <a:spcBef>
-                <a:spcPts val="1600"/>
-              </a:spcBef>
-              <a:spcAft>
-                <a:spcPts val="1600"/>
-              </a:spcAft>
-              <a:buSzPts val="2200"/>
-              <a:buNone/>
-            </a:pPr>
-            <a:endParaRPr sz="1800"/>
           </a:p>
         </p:txBody>
       </p:sp>

</xml_diff>

<commit_message>
update members' profile images
</commit_message>
<xml_diff>
--- a/CS2225.BaoCaoCuoiKy.pptx
+++ b/CS2225.BaoCaoCuoiKy.pptx
@@ -5,24 +5,25 @@
     <p:sldMasterId id="2147483648" r:id="rId1"/>
   </p:sldMasterIdLst>
   <p:notesMasterIdLst>
-    <p:notesMasterId r:id="rId17"/>
+    <p:notesMasterId r:id="rId18"/>
   </p:notesMasterIdLst>
   <p:sldIdLst>
     <p:sldId id="256" r:id="rId2"/>
     <p:sldId id="257" r:id="rId3"/>
     <p:sldId id="258" r:id="rId4"/>
-    <p:sldId id="260" r:id="rId5"/>
-    <p:sldId id="261" r:id="rId6"/>
-    <p:sldId id="268" r:id="rId7"/>
-    <p:sldId id="262" r:id="rId8"/>
-    <p:sldId id="269" r:id="rId9"/>
-    <p:sldId id="263" r:id="rId10"/>
-    <p:sldId id="264" r:id="rId11"/>
-    <p:sldId id="265" r:id="rId12"/>
-    <p:sldId id="270" r:id="rId13"/>
-    <p:sldId id="266" r:id="rId14"/>
-    <p:sldId id="271" r:id="rId15"/>
-    <p:sldId id="267" r:id="rId16"/>
+    <p:sldId id="272" r:id="rId5"/>
+    <p:sldId id="260" r:id="rId6"/>
+    <p:sldId id="261" r:id="rId7"/>
+    <p:sldId id="268" r:id="rId8"/>
+    <p:sldId id="262" r:id="rId9"/>
+    <p:sldId id="269" r:id="rId10"/>
+    <p:sldId id="263" r:id="rId11"/>
+    <p:sldId id="264" r:id="rId12"/>
+    <p:sldId id="265" r:id="rId13"/>
+    <p:sldId id="270" r:id="rId14"/>
+    <p:sldId id="266" r:id="rId15"/>
+    <p:sldId id="271" r:id="rId16"/>
+    <p:sldId id="267" r:id="rId17"/>
   </p:sldIdLst>
   <p:sldSz cx="9144000" cy="5143500" type="screen16x9"/>
   <p:notesSz cx="6858000" cy="9144000"/>
@@ -276,7 +277,7 @@
       </p15:sldGuideLst>
     </p:ext>
     <p:ext uri="http://customooxmlschemas.google.com/">
-      <go:slidesCustomData xmlns="" xmlns:mc="http://schemas.openxmlformats.org/markup-compatibility/2006" xmlns:mv="urn:schemas-microsoft-com:mac:vml" xmlns:c="http://schemas.openxmlformats.org/drawingml/2006/chart" xmlns:dgm="http://schemas.openxmlformats.org/drawingml/2006/diagram" xmlns:o="urn:schemas-microsoft-com:office:office" xmlns:v="urn:schemas-microsoft-com:vml" xmlns:pvml="urn:schemas-microsoft-com:office:powerpoint" xmlns:com="http://schemas.openxmlformats.org/drawingml/2006/compatibility" xmlns:p14="http://schemas.microsoft.com/office/powerpoint/2010/main" xmlns:p15="http://schemas.microsoft.com/office/powerpoint/2012/main" xmlns:ahyp="http://schemas.microsoft.com/office/drawing/2018/hyperlinkcolor" xmlns:go="http://customooxmlschemas.google.com/" r:id="rId18" roundtripDataSignature="AMtx7mgr+2s9Qem9sYdsXEFZxyB27Gtptw=="/>
+      <go:slidesCustomData xmlns:go="http://customooxmlschemas.google.com/" xmlns:ahyp="http://schemas.microsoft.com/office/drawing/2018/hyperlinkcolor" xmlns:p15="http://schemas.microsoft.com/office/powerpoint/2012/main" xmlns:p14="http://schemas.microsoft.com/office/powerpoint/2010/main" xmlns:com="http://schemas.openxmlformats.org/drawingml/2006/compatibility" xmlns:pvml="urn:schemas-microsoft-com:office:powerpoint" xmlns:v="urn:schemas-microsoft-com:vml" xmlns:o="urn:schemas-microsoft-com:office:office" xmlns:dgm="http://schemas.openxmlformats.org/drawingml/2006/diagram" xmlns:c="http://schemas.openxmlformats.org/drawingml/2006/chart" xmlns:mv="urn:schemas-microsoft-com:mac:vml" xmlns:mc="http://schemas.openxmlformats.org/markup-compatibility/2006" xmlns="" r:id="rId19" roundtripDataSignature="AMtx7mgr+2s9Qem9sYdsXEFZxyB27Gtptw=="/>
     </p:ext>
   </p:extLst>
 </p:presentation>
@@ -11085,6 +11086,654 @@
   <p:cSld>
     <p:spTree>
       <p:nvGrpSpPr>
+        <p:cNvPr id="1" name="Shape 109"/>
+        <p:cNvGrpSpPr/>
+        <p:nvPr/>
+      </p:nvGrpSpPr>
+      <p:grpSpPr>
+        <a:xfrm>
+          <a:off x="0" y="0"/>
+          <a:ext cx="0" cy="0"/>
+          <a:chOff x="0" y="0"/>
+          <a:chExt cx="0" cy="0"/>
+        </a:xfrm>
+      </p:grpSpPr>
+      <p:sp>
+        <p:nvSpPr>
+          <p:cNvPr id="110" name="Google Shape;110;gb23b97c7f9_0_22"/>
+          <p:cNvSpPr txBox="1">
+            <a:spLocks noGrp="1"/>
+          </p:cNvSpPr>
+          <p:nvPr>
+            <p:ph type="title"/>
+          </p:nvPr>
+        </p:nvSpPr>
+        <p:spPr>
+          <a:xfrm>
+            <a:off x="471900" y="57875"/>
+            <a:ext cx="8222100" cy="670500"/>
+          </a:xfrm>
+          <a:prstGeom prst="rect">
+            <a:avLst/>
+          </a:prstGeom>
+          <a:noFill/>
+          <a:ln>
+            <a:noFill/>
+          </a:ln>
+        </p:spPr>
+        <p:txBody>
+          <a:bodyPr spcFirstLastPara="1" wrap="square" lIns="91425" tIns="91425" rIns="91425" bIns="91425" anchor="ctr" anchorCtr="0">
+            <a:noAutofit/>
+          </a:bodyPr>
+          <a:lstStyle/>
+          <a:p>
+            <a:pPr marL="0" lvl="0" indent="0" algn="l" rtl="0">
+              <a:lnSpc>
+                <a:spcPct val="100000"/>
+              </a:lnSpc>
+              <a:spcBef>
+                <a:spcPts val="0"/>
+              </a:spcBef>
+              <a:spcAft>
+                <a:spcPts val="0"/>
+              </a:spcAft>
+              <a:buSzPts val="3200"/>
+              <a:buNone/>
+            </a:pPr>
+            <a:r>
+              <a:rPr lang="en" b="1"/>
+              <a:t>Quy trình thực hiện</a:t>
+            </a:r>
+            <a:endParaRPr/>
+          </a:p>
+        </p:txBody>
+      </p:sp>
+      <p:sp>
+        <p:nvSpPr>
+          <p:cNvPr id="111" name="Google Shape;111;gb23b97c7f9_0_22"/>
+          <p:cNvSpPr txBox="1">
+            <a:spLocks noGrp="1"/>
+          </p:cNvSpPr>
+          <p:nvPr>
+            <p:ph type="body" idx="1"/>
+          </p:nvPr>
+        </p:nvSpPr>
+        <p:spPr>
+          <a:xfrm>
+            <a:off x="471900" y="820500"/>
+            <a:ext cx="8222100" cy="3908400"/>
+          </a:xfrm>
+          <a:prstGeom prst="rect">
+            <a:avLst/>
+          </a:prstGeom>
+          <a:noFill/>
+          <a:ln>
+            <a:noFill/>
+          </a:ln>
+        </p:spPr>
+        <p:txBody>
+          <a:bodyPr spcFirstLastPara="1" wrap="square" lIns="91425" tIns="91425" rIns="91425" bIns="91425" anchor="t" anchorCtr="0">
+            <a:noAutofit/>
+          </a:bodyPr>
+          <a:lstStyle/>
+          <a:p>
+            <a:pPr marL="457200" lvl="0" indent="-330200" algn="l" rtl="0">
+              <a:lnSpc>
+                <a:spcPct val="115000"/>
+              </a:lnSpc>
+              <a:spcBef>
+                <a:spcPts val="0"/>
+              </a:spcBef>
+              <a:spcAft>
+                <a:spcPts val="0"/>
+              </a:spcAft>
+              <a:buSzPts val="1600"/>
+              <a:buChar char="●"/>
+            </a:pPr>
+            <a:r>
+              <a:rPr lang="en" sz="1600" dirty="0" err="1"/>
+              <a:t>Bước</a:t>
+            </a:r>
+            <a:r>
+              <a:rPr lang="en" sz="1600" dirty="0"/>
+              <a:t> 1: </a:t>
+            </a:r>
+            <a:r>
+              <a:rPr lang="en" sz="1600" dirty="0" err="1"/>
+              <a:t>thu</a:t>
+            </a:r>
+            <a:r>
+              <a:rPr lang="en" sz="1600" dirty="0"/>
+              <a:t> </a:t>
+            </a:r>
+            <a:r>
+              <a:rPr lang="en" sz="1600" dirty="0" err="1"/>
+              <a:t>thập</a:t>
+            </a:r>
+            <a:r>
+              <a:rPr lang="en" sz="1600" dirty="0"/>
+              <a:t> </a:t>
+            </a:r>
+            <a:r>
+              <a:rPr lang="en" sz="1600" dirty="0" err="1"/>
+              <a:t>dữ</a:t>
+            </a:r>
+            <a:r>
+              <a:rPr lang="en" sz="1600" dirty="0"/>
+              <a:t> </a:t>
+            </a:r>
+            <a:r>
+              <a:rPr lang="en" sz="1600" dirty="0" err="1"/>
+              <a:t>liệu</a:t>
+            </a:r>
+            <a:r>
+              <a:rPr lang="en" sz="1600" dirty="0"/>
+              <a:t> </a:t>
+            </a:r>
+            <a:r>
+              <a:rPr lang="en" sz="1600" dirty="0" err="1"/>
+              <a:t>ảnh</a:t>
+            </a:r>
+            <a:r>
+              <a:rPr lang="en" sz="1600" dirty="0"/>
+              <a:t>.</a:t>
+            </a:r>
+            <a:endParaRPr sz="1600" dirty="0"/>
+          </a:p>
+          <a:p>
+            <a:pPr marL="457200" lvl="0" indent="-330200" algn="l" rtl="0">
+              <a:spcBef>
+                <a:spcPts val="0"/>
+              </a:spcBef>
+              <a:spcAft>
+                <a:spcPts val="0"/>
+              </a:spcAft>
+              <a:buSzPts val="1600"/>
+              <a:buChar char="●"/>
+            </a:pPr>
+            <a:r>
+              <a:rPr lang="en" sz="1600" dirty="0" err="1"/>
+              <a:t>Bước</a:t>
+            </a:r>
+            <a:r>
+              <a:rPr lang="en" sz="1600" dirty="0"/>
+              <a:t> 2: </a:t>
+            </a:r>
+            <a:r>
+              <a:rPr lang="en" sz="1600" dirty="0" err="1"/>
+              <a:t>gán</a:t>
+            </a:r>
+            <a:r>
+              <a:rPr lang="en" sz="1600" dirty="0"/>
+              <a:t> </a:t>
+            </a:r>
+            <a:r>
+              <a:rPr lang="en" sz="1600" dirty="0" err="1"/>
+              <a:t>nhãn</a:t>
+            </a:r>
+            <a:r>
+              <a:rPr lang="en" sz="1600" dirty="0"/>
+              <a:t> </a:t>
+            </a:r>
+            <a:r>
+              <a:rPr lang="en" sz="1600" dirty="0" err="1"/>
+              <a:t>thủ</a:t>
+            </a:r>
+            <a:r>
+              <a:rPr lang="en" sz="1600" dirty="0"/>
+              <a:t> </a:t>
+            </a:r>
+            <a:r>
+              <a:rPr lang="en" sz="1600" dirty="0" err="1"/>
+              <a:t>công</a:t>
+            </a:r>
+            <a:r>
+              <a:rPr lang="en" sz="1600" dirty="0"/>
+              <a:t> </a:t>
+            </a:r>
+            <a:r>
+              <a:rPr lang="en" sz="1600" dirty="0" err="1"/>
+              <a:t>cho</a:t>
+            </a:r>
+            <a:r>
+              <a:rPr lang="en" sz="1600" dirty="0"/>
+              <a:t> </a:t>
+            </a:r>
+            <a:r>
+              <a:rPr lang="en" sz="1600" dirty="0" err="1"/>
+              <a:t>dữ</a:t>
+            </a:r>
+            <a:r>
+              <a:rPr lang="en" sz="1600" dirty="0"/>
+              <a:t> </a:t>
+            </a:r>
+            <a:r>
+              <a:rPr lang="en" sz="1600" dirty="0" err="1"/>
+              <a:t>liệu</a:t>
+            </a:r>
+            <a:r>
+              <a:rPr lang="en" sz="1600" dirty="0"/>
+              <a:t> </a:t>
+            </a:r>
+            <a:r>
+              <a:rPr lang="en" sz="1600" dirty="0" err="1"/>
+              <a:t>đã</a:t>
+            </a:r>
+            <a:r>
+              <a:rPr lang="en" sz="1600" dirty="0"/>
+              <a:t> </a:t>
+            </a:r>
+            <a:r>
+              <a:rPr lang="en" sz="1600" dirty="0" err="1"/>
+              <a:t>thu</a:t>
+            </a:r>
+            <a:r>
+              <a:rPr lang="en" sz="1600" dirty="0"/>
+              <a:t> </a:t>
+            </a:r>
+            <a:r>
+              <a:rPr lang="en" sz="1600" dirty="0" err="1"/>
+              <a:t>thập</a:t>
+            </a:r>
+            <a:r>
+              <a:rPr lang="en" sz="1600" dirty="0"/>
+              <a:t> </a:t>
+            </a:r>
+            <a:r>
+              <a:rPr lang="en" sz="1600" dirty="0" err="1"/>
+              <a:t>bằng</a:t>
+            </a:r>
+            <a:r>
+              <a:rPr lang="en" sz="1600" dirty="0"/>
+              <a:t> </a:t>
+            </a:r>
+            <a:r>
+              <a:rPr lang="en" sz="1600" dirty="0" err="1"/>
+              <a:t>roboflow</a:t>
+            </a:r>
+            <a:r>
+              <a:rPr lang="en" sz="1600" dirty="0"/>
+              <a:t>.</a:t>
+            </a:r>
+            <a:endParaRPr sz="1600" dirty="0"/>
+          </a:p>
+          <a:p>
+            <a:pPr marL="457200" lvl="0" indent="-330200" algn="l" rtl="0">
+              <a:spcBef>
+                <a:spcPts val="0"/>
+              </a:spcBef>
+              <a:spcAft>
+                <a:spcPts val="0"/>
+              </a:spcAft>
+              <a:buSzPts val="1600"/>
+              <a:buChar char="●"/>
+            </a:pPr>
+            <a:r>
+              <a:rPr lang="en" sz="1600" dirty="0" err="1"/>
+              <a:t>Bước</a:t>
+            </a:r>
+            <a:r>
+              <a:rPr lang="en" sz="1600" dirty="0"/>
+              <a:t> 3: </a:t>
+            </a:r>
+            <a:r>
+              <a:rPr lang="en" sz="1600" dirty="0" err="1"/>
+              <a:t>sử</a:t>
+            </a:r>
+            <a:r>
+              <a:rPr lang="en" sz="1600" dirty="0"/>
+              <a:t> </a:t>
+            </a:r>
+            <a:r>
+              <a:rPr lang="en" sz="1600" dirty="0" err="1"/>
+              <a:t>dụng</a:t>
+            </a:r>
+            <a:r>
+              <a:rPr lang="en" sz="1600" dirty="0"/>
+              <a:t> </a:t>
+            </a:r>
+            <a:r>
+              <a:rPr lang="en" sz="1600" dirty="0" err="1"/>
+              <a:t>trang</a:t>
+            </a:r>
+            <a:r>
+              <a:rPr lang="en" sz="1600" dirty="0"/>
+              <a:t> </a:t>
+            </a:r>
+            <a:r>
+              <a:rPr lang="en" sz="1600" dirty="0" err="1"/>
+              <a:t>roboflow</a:t>
+            </a:r>
+            <a:r>
+              <a:rPr lang="en" sz="1600" dirty="0"/>
+              <a:t> </a:t>
+            </a:r>
+            <a:r>
+              <a:rPr lang="en" sz="1600" dirty="0" err="1"/>
+              <a:t>tăng</a:t>
+            </a:r>
+            <a:r>
+              <a:rPr lang="en" sz="1600" dirty="0"/>
+              <a:t> </a:t>
+            </a:r>
+            <a:r>
+              <a:rPr lang="en" sz="1600" dirty="0" err="1"/>
+              <a:t>cường</a:t>
+            </a:r>
+            <a:r>
+              <a:rPr lang="en" sz="1600" dirty="0"/>
+              <a:t> </a:t>
+            </a:r>
+            <a:r>
+              <a:rPr lang="en" sz="1600" dirty="0" err="1"/>
+              <a:t>thêm</a:t>
+            </a:r>
+            <a:r>
+              <a:rPr lang="en" sz="1600" dirty="0"/>
+              <a:t> </a:t>
+            </a:r>
+            <a:r>
+              <a:rPr lang="en" sz="1600" dirty="0" err="1"/>
+              <a:t>dữ</a:t>
+            </a:r>
+            <a:r>
+              <a:rPr lang="en" sz="1600" dirty="0"/>
+              <a:t> </a:t>
+            </a:r>
+            <a:r>
+              <a:rPr lang="en" sz="1600" dirty="0" err="1"/>
+              <a:t>liệu</a:t>
+            </a:r>
+            <a:r>
+              <a:rPr lang="en" sz="1600" dirty="0"/>
+              <a:t> </a:t>
+            </a:r>
+            <a:r>
+              <a:rPr lang="en" sz="1600" dirty="0" err="1"/>
+              <a:t>trên</a:t>
+            </a:r>
+            <a:r>
+              <a:rPr lang="en" sz="1600" dirty="0"/>
+              <a:t> </a:t>
+            </a:r>
+            <a:r>
+              <a:rPr lang="en" sz="1600" dirty="0" err="1"/>
+              <a:t>và</a:t>
+            </a:r>
+            <a:r>
+              <a:rPr lang="en" sz="1600" dirty="0"/>
+              <a:t> </a:t>
+            </a:r>
+            <a:r>
+              <a:rPr lang="en" sz="1600" dirty="0" err="1"/>
+              <a:t>trích</a:t>
+            </a:r>
+            <a:r>
+              <a:rPr lang="en" sz="1600" dirty="0"/>
+              <a:t> </a:t>
+            </a:r>
+            <a:r>
+              <a:rPr lang="en" sz="1600" dirty="0" err="1"/>
+              <a:t>xuất</a:t>
+            </a:r>
+            <a:r>
+              <a:rPr lang="en" sz="1600" dirty="0"/>
+              <a:t> file TF-Record.</a:t>
+            </a:r>
+            <a:endParaRPr sz="1600" dirty="0"/>
+          </a:p>
+          <a:p>
+            <a:pPr marL="457200" lvl="0" indent="-330200" algn="l" rtl="0">
+              <a:lnSpc>
+                <a:spcPct val="115000"/>
+              </a:lnSpc>
+              <a:spcBef>
+                <a:spcPts val="0"/>
+              </a:spcBef>
+              <a:spcAft>
+                <a:spcPts val="0"/>
+              </a:spcAft>
+              <a:buSzPts val="1600"/>
+              <a:buChar char="●"/>
+            </a:pPr>
+            <a:r>
+              <a:rPr lang="en" sz="1600" dirty="0" err="1"/>
+              <a:t>Bước</a:t>
+            </a:r>
+            <a:r>
+              <a:rPr lang="en" sz="1600" dirty="0"/>
+              <a:t> 4: </a:t>
+            </a:r>
+            <a:r>
+              <a:rPr lang="en" sz="1600" dirty="0" err="1"/>
+              <a:t>thiết</a:t>
+            </a:r>
+            <a:r>
+              <a:rPr lang="en" sz="1600" dirty="0"/>
+              <a:t> </a:t>
+            </a:r>
+            <a:r>
+              <a:rPr lang="en" sz="1600" dirty="0" err="1"/>
+              <a:t>lập</a:t>
+            </a:r>
+            <a:r>
+              <a:rPr lang="en" sz="1600" dirty="0"/>
+              <a:t> </a:t>
+            </a:r>
+            <a:r>
+              <a:rPr lang="en" sz="1600" dirty="0" err="1"/>
+              <a:t>môi</a:t>
+            </a:r>
+            <a:r>
+              <a:rPr lang="en" sz="1600" dirty="0"/>
+              <a:t> </a:t>
+            </a:r>
+            <a:r>
+              <a:rPr lang="en" sz="1600" dirty="0" err="1"/>
+              <a:t>trường</a:t>
+            </a:r>
+            <a:r>
+              <a:rPr lang="en" sz="1600" dirty="0"/>
+              <a:t> </a:t>
+            </a:r>
+            <a:r>
+              <a:rPr lang="en" sz="1600" dirty="0" err="1"/>
+              <a:t>trong</a:t>
+            </a:r>
+            <a:r>
+              <a:rPr lang="en" sz="1600" dirty="0"/>
+              <a:t> Google </a:t>
+            </a:r>
+            <a:r>
+              <a:rPr lang="en" sz="1600" dirty="0" err="1"/>
+              <a:t>Colab</a:t>
+            </a:r>
+            <a:r>
+              <a:rPr lang="en" sz="1600" dirty="0"/>
+              <a:t>.</a:t>
+            </a:r>
+            <a:endParaRPr sz="1600" dirty="0"/>
+          </a:p>
+          <a:p>
+            <a:pPr marL="457200" lvl="0" indent="-330200" algn="l" rtl="0">
+              <a:spcBef>
+                <a:spcPts val="0"/>
+              </a:spcBef>
+              <a:spcAft>
+                <a:spcPts val="0"/>
+              </a:spcAft>
+              <a:buSzPts val="1600"/>
+              <a:buChar char="●"/>
+            </a:pPr>
+            <a:r>
+              <a:rPr lang="en" sz="1600" dirty="0" err="1"/>
+              <a:t>Bước</a:t>
+            </a:r>
+            <a:r>
+              <a:rPr lang="en" sz="1600" dirty="0"/>
+              <a:t> 5: </a:t>
+            </a:r>
+            <a:r>
+              <a:rPr lang="en" sz="1600" dirty="0" err="1"/>
+              <a:t>bắt</a:t>
+            </a:r>
+            <a:r>
+              <a:rPr lang="en" sz="1600" dirty="0"/>
+              <a:t> </a:t>
+            </a:r>
+            <a:r>
+              <a:rPr lang="en" sz="1600" dirty="0" err="1"/>
+              <a:t>đầu</a:t>
+            </a:r>
+            <a:r>
+              <a:rPr lang="en" sz="1600" dirty="0"/>
+              <a:t> train EfficientDet-d0 model </a:t>
+            </a:r>
+            <a:r>
+              <a:rPr lang="en" sz="1600" dirty="0" err="1"/>
+              <a:t>với</a:t>
+            </a:r>
+            <a:r>
+              <a:rPr lang="en" sz="1600" dirty="0"/>
+              <a:t> file </a:t>
+            </a:r>
+            <a:r>
+              <a:rPr lang="en" sz="1600" dirty="0" err="1"/>
+              <a:t>đã</a:t>
+            </a:r>
+            <a:r>
+              <a:rPr lang="en" sz="1600" dirty="0"/>
+              <a:t> </a:t>
+            </a:r>
+            <a:r>
+              <a:rPr lang="en" sz="1600" dirty="0" err="1"/>
+              <a:t>trích</a:t>
+            </a:r>
+            <a:r>
+              <a:rPr lang="en" sz="1600" dirty="0"/>
+              <a:t> </a:t>
+            </a:r>
+            <a:r>
+              <a:rPr lang="en" sz="1600" dirty="0" err="1"/>
+              <a:t>xuất</a:t>
+            </a:r>
+            <a:r>
+              <a:rPr lang="en" sz="1600" dirty="0"/>
+              <a:t> </a:t>
+            </a:r>
+            <a:r>
+              <a:rPr lang="en" sz="1600" dirty="0" err="1"/>
+              <a:t>ở</a:t>
+            </a:r>
+            <a:r>
+              <a:rPr lang="en" sz="1600" dirty="0"/>
+              <a:t> </a:t>
+            </a:r>
+            <a:r>
+              <a:rPr lang="en" sz="1600" dirty="0" err="1"/>
+              <a:t>bước</a:t>
+            </a:r>
+            <a:r>
+              <a:rPr lang="en" sz="1600" dirty="0"/>
+              <a:t> 3</a:t>
+            </a:r>
+            <a:endParaRPr sz="1600" dirty="0"/>
+          </a:p>
+          <a:p>
+            <a:pPr marL="457200" lvl="0" indent="-330200" algn="l" rtl="0">
+              <a:lnSpc>
+                <a:spcPct val="115000"/>
+              </a:lnSpc>
+              <a:spcBef>
+                <a:spcPts val="0"/>
+              </a:spcBef>
+              <a:spcAft>
+                <a:spcPts val="0"/>
+              </a:spcAft>
+              <a:buSzPts val="1600"/>
+              <a:buChar char="●"/>
+            </a:pPr>
+            <a:r>
+              <a:rPr lang="en" sz="1600" dirty="0" err="1"/>
+              <a:t>Bước</a:t>
+            </a:r>
+            <a:r>
+              <a:rPr lang="en" sz="1600" dirty="0"/>
+              <a:t> 6: </a:t>
+            </a:r>
+            <a:r>
+              <a:rPr lang="en" sz="1600" dirty="0" err="1"/>
+              <a:t>thử</a:t>
+            </a:r>
+            <a:r>
+              <a:rPr lang="en" sz="1600" dirty="0"/>
+              <a:t> </a:t>
+            </a:r>
+            <a:r>
+              <a:rPr lang="en" sz="1600" dirty="0" err="1"/>
+              <a:t>nghiệm</a:t>
+            </a:r>
+            <a:r>
+              <a:rPr lang="en" sz="1600" dirty="0"/>
+              <a:t> </a:t>
+            </a:r>
+            <a:r>
+              <a:rPr lang="en" sz="1600" dirty="0" err="1"/>
+              <a:t>trên</a:t>
+            </a:r>
+            <a:r>
+              <a:rPr lang="en" sz="1600" dirty="0"/>
+              <a:t> </a:t>
+            </a:r>
+            <a:r>
+              <a:rPr lang="en" sz="1600" dirty="0" err="1"/>
+              <a:t>ảnh</a:t>
+            </a:r>
+            <a:r>
+              <a:rPr lang="en" sz="1600" dirty="0"/>
+              <a:t> </a:t>
+            </a:r>
+            <a:r>
+              <a:rPr lang="en" sz="1600" dirty="0" err="1"/>
+              <a:t>ngoài</a:t>
+            </a:r>
+            <a:r>
+              <a:rPr lang="en" sz="1600" dirty="0"/>
+              <a:t> </a:t>
+            </a:r>
+            <a:r>
+              <a:rPr lang="en" sz="1600" dirty="0" err="1"/>
+              <a:t>thực</a:t>
+            </a:r>
+            <a:r>
+              <a:rPr lang="en" sz="1600" dirty="0"/>
+              <a:t> </a:t>
+            </a:r>
+            <a:r>
+              <a:rPr lang="en" sz="1600" dirty="0" err="1"/>
+              <a:t>tế</a:t>
+            </a:r>
+            <a:r>
+              <a:rPr lang="en" sz="1600" dirty="0"/>
+              <a:t>.</a:t>
+            </a:r>
+            <a:endParaRPr sz="1800" dirty="0"/>
+          </a:p>
+        </p:txBody>
+      </p:sp>
+    </p:spTree>
+  </p:cSld>
+  <p:clrMapOvr>
+    <a:masterClrMapping/>
+  </p:clrMapOvr>
+</p:sld>
+</file>
+
+<file path=ppt/slides/slide11.xml><?xml version="1.0" encoding="utf-8"?>
+<p:sld xmlns:a="http://schemas.openxmlformats.org/drawingml/2006/main" xmlns:r="http://schemas.openxmlformats.org/officeDocument/2006/relationships" xmlns:p="http://schemas.openxmlformats.org/presentationml/2006/main">
+  <p:cSld>
+    <p:spTree>
+      <p:nvGrpSpPr>
         <p:cNvPr id="1" name="Shape 115"/>
         <p:cNvGrpSpPr/>
         <p:nvPr/>
@@ -11225,7 +11874,7 @@
 </p:sld>
 </file>
 
-<file path=ppt/slides/slide11.xml><?xml version="1.0" encoding="utf-8"?>
+<file path=ppt/slides/slide12.xml><?xml version="1.0" encoding="utf-8"?>
 <p:sld xmlns:a="http://schemas.openxmlformats.org/drawingml/2006/main" xmlns:r="http://schemas.openxmlformats.org/officeDocument/2006/relationships" xmlns:p="http://schemas.openxmlformats.org/presentationml/2006/main">
   <p:cSld>
     <p:spTree>
@@ -11642,177 +12291,6 @@
         </p:txBody>
       </p:sp>
     </p:spTree>
-  </p:cSld>
-  <p:clrMapOvr>
-    <a:masterClrMapping/>
-  </p:clrMapOvr>
-</p:sld>
-</file>
-
-<file path=ppt/slides/slide12.xml><?xml version="1.0" encoding="utf-8"?>
-<p:sld xmlns:a="http://schemas.openxmlformats.org/drawingml/2006/main" xmlns:r="http://schemas.openxmlformats.org/officeDocument/2006/relationships" xmlns:p="http://schemas.openxmlformats.org/presentationml/2006/main">
-  <p:cSld>
-    <p:spTree>
-      <p:nvGrpSpPr>
-        <p:cNvPr id="1" name="Shape 127"/>
-        <p:cNvGrpSpPr/>
-        <p:nvPr/>
-      </p:nvGrpSpPr>
-      <p:grpSpPr>
-        <a:xfrm>
-          <a:off x="0" y="0"/>
-          <a:ext cx="0" cy="0"/>
-          <a:chOff x="0" y="0"/>
-          <a:chExt cx="0" cy="0"/>
-        </a:xfrm>
-      </p:grpSpPr>
-      <p:sp>
-        <p:nvSpPr>
-          <p:cNvPr id="128" name="Google Shape;128;gb23b97c7f9_0_16"/>
-          <p:cNvSpPr txBox="1">
-            <a:spLocks noGrp="1"/>
-          </p:cNvSpPr>
-          <p:nvPr>
-            <p:ph type="title"/>
-          </p:nvPr>
-        </p:nvSpPr>
-        <p:spPr>
-          <a:xfrm>
-            <a:off x="471900" y="57875"/>
-            <a:ext cx="8222100" cy="670500"/>
-          </a:xfrm>
-          <a:prstGeom prst="rect">
-            <a:avLst/>
-          </a:prstGeom>
-          <a:noFill/>
-          <a:ln>
-            <a:noFill/>
-          </a:ln>
-        </p:spPr>
-        <p:txBody>
-          <a:bodyPr spcFirstLastPara="1" wrap="square" lIns="91425" tIns="91425" rIns="91425" bIns="91425" anchor="ctr" anchorCtr="0">
-            <a:noAutofit/>
-          </a:bodyPr>
-          <a:lstStyle/>
-          <a:p>
-            <a:pPr marL="0" lvl="0" indent="0" algn="l" rtl="0">
-              <a:lnSpc>
-                <a:spcPct val="100000"/>
-              </a:lnSpc>
-              <a:spcBef>
-                <a:spcPts val="0"/>
-              </a:spcBef>
-              <a:spcAft>
-                <a:spcPts val="0"/>
-              </a:spcAft>
-              <a:buSzPts val="3200"/>
-              <a:buNone/>
-            </a:pPr>
-            <a:r>
-              <a:rPr lang="en" b="1"/>
-              <a:t>Đánh giá kết quả</a:t>
-            </a:r>
-            <a:endParaRPr/>
-          </a:p>
-        </p:txBody>
-      </p:sp>
-      <p:sp>
-        <p:nvSpPr>
-          <p:cNvPr id="129" name="Google Shape;129;gb23b97c7f9_0_16"/>
-          <p:cNvSpPr txBox="1">
-            <a:spLocks noGrp="1"/>
-          </p:cNvSpPr>
-          <p:nvPr>
-            <p:ph type="body" idx="1"/>
-          </p:nvPr>
-        </p:nvSpPr>
-        <p:spPr>
-          <a:xfrm>
-            <a:off x="471900" y="820500"/>
-            <a:ext cx="8222100" cy="3908400"/>
-          </a:xfrm>
-          <a:prstGeom prst="rect">
-            <a:avLst/>
-          </a:prstGeom>
-          <a:noFill/>
-          <a:ln>
-            <a:noFill/>
-          </a:ln>
-        </p:spPr>
-        <p:txBody>
-          <a:bodyPr spcFirstLastPara="1" wrap="square" lIns="91425" tIns="91425" rIns="91425" bIns="91425" anchor="t" anchorCtr="0">
-            <a:noAutofit/>
-          </a:bodyPr>
-          <a:lstStyle/>
-          <a:p>
-            <a:pPr marL="457200" lvl="0" indent="0" algn="l" rtl="0">
-              <a:lnSpc>
-                <a:spcPct val="115000"/>
-              </a:lnSpc>
-              <a:spcBef>
-                <a:spcPts val="1600"/>
-              </a:spcBef>
-              <a:spcAft>
-                <a:spcPts val="0"/>
-              </a:spcAft>
-              <a:buNone/>
-            </a:pPr>
-            <a:endParaRPr/>
-          </a:p>
-          <a:p>
-            <a:pPr marL="914400" lvl="0" indent="0" algn="l" rtl="0">
-              <a:lnSpc>
-                <a:spcPct val="115000"/>
-              </a:lnSpc>
-              <a:spcBef>
-                <a:spcPts val="1600"/>
-              </a:spcBef>
-              <a:spcAft>
-                <a:spcPts val="1600"/>
-              </a:spcAft>
-              <a:buSzPts val="2200"/>
-              <a:buNone/>
-            </a:pPr>
-            <a:endParaRPr sz="1800"/>
-          </a:p>
-        </p:txBody>
-      </p:sp>
-      <p:pic>
-        <p:nvPicPr>
-          <p:cNvPr id="6" name="Picture 5" descr="A screenshot of a website&#10;&#10;Description automatically generated with medium confidence">
-            <a:extLst>
-              <a:ext uri="{FF2B5EF4-FFF2-40B4-BE49-F238E27FC236}">
-                <a16:creationId xmlns:a16="http://schemas.microsoft.com/office/drawing/2014/main" id="{EFFF0CB1-D8CE-E244-858E-640638DFDEA0}"/>
-              </a:ext>
-            </a:extLst>
-          </p:cNvPr>
-          <p:cNvPicPr>
-            <a:picLocks noChangeAspect="1"/>
-          </p:cNvPicPr>
-          <p:nvPr/>
-        </p:nvPicPr>
-        <p:blipFill>
-          <a:blip r:embed="rId3"/>
-          <a:stretch>
-            <a:fillRect/>
-          </a:stretch>
-        </p:blipFill>
-        <p:spPr>
-          <a:xfrm>
-            <a:off x="0" y="683315"/>
-            <a:ext cx="9144000" cy="3776870"/>
-          </a:xfrm>
-          <a:prstGeom prst="rect">
-            <a:avLst/>
-          </a:prstGeom>
-        </p:spPr>
-      </p:pic>
-    </p:spTree>
-    <p:extLst>
-      <p:ext uri="{BB962C8B-B14F-4D97-AF65-F5344CB8AC3E}">
-        <p14:creationId xmlns:p14="http://schemas.microsoft.com/office/powerpoint/2010/main" val="1607805153"/>
-      </p:ext>
-    </p:extLst>
   </p:cSld>
   <p:clrMapOvr>
     <a:masterClrMapping/>
@@ -11880,6 +12358,177 @@
               <a:buNone/>
             </a:pPr>
             <a:r>
+              <a:rPr lang="en" b="1"/>
+              <a:t>Đánh giá kết quả</a:t>
+            </a:r>
+            <a:endParaRPr/>
+          </a:p>
+        </p:txBody>
+      </p:sp>
+      <p:sp>
+        <p:nvSpPr>
+          <p:cNvPr id="129" name="Google Shape;129;gb23b97c7f9_0_16"/>
+          <p:cNvSpPr txBox="1">
+            <a:spLocks noGrp="1"/>
+          </p:cNvSpPr>
+          <p:nvPr>
+            <p:ph type="body" idx="1"/>
+          </p:nvPr>
+        </p:nvSpPr>
+        <p:spPr>
+          <a:xfrm>
+            <a:off x="471900" y="820500"/>
+            <a:ext cx="8222100" cy="3908400"/>
+          </a:xfrm>
+          <a:prstGeom prst="rect">
+            <a:avLst/>
+          </a:prstGeom>
+          <a:noFill/>
+          <a:ln>
+            <a:noFill/>
+          </a:ln>
+        </p:spPr>
+        <p:txBody>
+          <a:bodyPr spcFirstLastPara="1" wrap="square" lIns="91425" tIns="91425" rIns="91425" bIns="91425" anchor="t" anchorCtr="0">
+            <a:noAutofit/>
+          </a:bodyPr>
+          <a:lstStyle/>
+          <a:p>
+            <a:pPr marL="457200" lvl="0" indent="0" algn="l" rtl="0">
+              <a:lnSpc>
+                <a:spcPct val="115000"/>
+              </a:lnSpc>
+              <a:spcBef>
+                <a:spcPts val="1600"/>
+              </a:spcBef>
+              <a:spcAft>
+                <a:spcPts val="0"/>
+              </a:spcAft>
+              <a:buNone/>
+            </a:pPr>
+            <a:endParaRPr/>
+          </a:p>
+          <a:p>
+            <a:pPr marL="914400" lvl="0" indent="0" algn="l" rtl="0">
+              <a:lnSpc>
+                <a:spcPct val="115000"/>
+              </a:lnSpc>
+              <a:spcBef>
+                <a:spcPts val="1600"/>
+              </a:spcBef>
+              <a:spcAft>
+                <a:spcPts val="1600"/>
+              </a:spcAft>
+              <a:buSzPts val="2200"/>
+              <a:buNone/>
+            </a:pPr>
+            <a:endParaRPr sz="1800"/>
+          </a:p>
+        </p:txBody>
+      </p:sp>
+      <p:pic>
+        <p:nvPicPr>
+          <p:cNvPr id="6" name="Picture 5" descr="A screenshot of a website&#10;&#10;Description automatically generated with medium confidence">
+            <a:extLst>
+              <a:ext uri="{FF2B5EF4-FFF2-40B4-BE49-F238E27FC236}">
+                <a16:creationId xmlns:a16="http://schemas.microsoft.com/office/drawing/2014/main" id="{EFFF0CB1-D8CE-E244-858E-640638DFDEA0}"/>
+              </a:ext>
+            </a:extLst>
+          </p:cNvPr>
+          <p:cNvPicPr>
+            <a:picLocks noChangeAspect="1"/>
+          </p:cNvPicPr>
+          <p:nvPr/>
+        </p:nvPicPr>
+        <p:blipFill>
+          <a:blip r:embed="rId3"/>
+          <a:stretch>
+            <a:fillRect/>
+          </a:stretch>
+        </p:blipFill>
+        <p:spPr>
+          <a:xfrm>
+            <a:off x="0" y="683315"/>
+            <a:ext cx="9144000" cy="3776870"/>
+          </a:xfrm>
+          <a:prstGeom prst="rect">
+            <a:avLst/>
+          </a:prstGeom>
+        </p:spPr>
+      </p:pic>
+    </p:spTree>
+    <p:extLst>
+      <p:ext uri="{BB962C8B-B14F-4D97-AF65-F5344CB8AC3E}">
+        <p14:creationId xmlns:p14="http://schemas.microsoft.com/office/powerpoint/2010/main" val="1607805153"/>
+      </p:ext>
+    </p:extLst>
+  </p:cSld>
+  <p:clrMapOvr>
+    <a:masterClrMapping/>
+  </p:clrMapOvr>
+</p:sld>
+</file>
+
+<file path=ppt/slides/slide14.xml><?xml version="1.0" encoding="utf-8"?>
+<p:sld xmlns:a="http://schemas.openxmlformats.org/drawingml/2006/main" xmlns:r="http://schemas.openxmlformats.org/officeDocument/2006/relationships" xmlns:p="http://schemas.openxmlformats.org/presentationml/2006/main">
+  <p:cSld>
+    <p:spTree>
+      <p:nvGrpSpPr>
+        <p:cNvPr id="1" name="Shape 127"/>
+        <p:cNvGrpSpPr/>
+        <p:nvPr/>
+      </p:nvGrpSpPr>
+      <p:grpSpPr>
+        <a:xfrm>
+          <a:off x="0" y="0"/>
+          <a:ext cx="0" cy="0"/>
+          <a:chOff x="0" y="0"/>
+          <a:chExt cx="0" cy="0"/>
+        </a:xfrm>
+      </p:grpSpPr>
+      <p:sp>
+        <p:nvSpPr>
+          <p:cNvPr id="128" name="Google Shape;128;gb23b97c7f9_0_16"/>
+          <p:cNvSpPr txBox="1">
+            <a:spLocks noGrp="1"/>
+          </p:cNvSpPr>
+          <p:nvPr>
+            <p:ph type="title"/>
+          </p:nvPr>
+        </p:nvSpPr>
+        <p:spPr>
+          <a:xfrm>
+            <a:off x="471900" y="57875"/>
+            <a:ext cx="8222100" cy="670500"/>
+          </a:xfrm>
+          <a:prstGeom prst="rect">
+            <a:avLst/>
+          </a:prstGeom>
+          <a:noFill/>
+          <a:ln>
+            <a:noFill/>
+          </a:ln>
+        </p:spPr>
+        <p:txBody>
+          <a:bodyPr spcFirstLastPara="1" wrap="square" lIns="91425" tIns="91425" rIns="91425" bIns="91425" anchor="ctr" anchorCtr="0">
+            <a:noAutofit/>
+          </a:bodyPr>
+          <a:lstStyle/>
+          <a:p>
+            <a:pPr marL="0" lvl="0" indent="0" algn="l" rtl="0">
+              <a:lnSpc>
+                <a:spcPct val="100000"/>
+              </a:lnSpc>
+              <a:spcBef>
+                <a:spcPts val="0"/>
+              </a:spcBef>
+              <a:spcAft>
+                <a:spcPts val="0"/>
+              </a:spcAft>
+              <a:buSzPts val="3200"/>
+              <a:buNone/>
+            </a:pPr>
+            <a:r>
               <a:rPr lang="en" b="1" dirty="0" err="1"/>
               <a:t>Đánh</a:t>
             </a:r>
@@ -12010,7 +12659,7 @@
 </p:sld>
 </file>
 
-<file path=ppt/slides/slide14.xml><?xml version="1.0" encoding="utf-8"?>
+<file path=ppt/slides/slide15.xml><?xml version="1.0" encoding="utf-8"?>
 <p:sld xmlns:a="http://schemas.openxmlformats.org/drawingml/2006/main" xmlns:r="http://schemas.openxmlformats.org/officeDocument/2006/relationships" xmlns:p="http://schemas.openxmlformats.org/presentationml/2006/main">
   <p:cSld>
     <p:spTree>
@@ -12121,7 +12770,7 @@
 </p:sld>
 </file>
 
-<file path=ppt/slides/slide15.xml><?xml version="1.0" encoding="utf-8"?>
+<file path=ppt/slides/slide16.xml><?xml version="1.0" encoding="utf-8"?>
 <p:sld xmlns:a="http://schemas.openxmlformats.org/drawingml/2006/main" xmlns:r="http://schemas.openxmlformats.org/officeDocument/2006/relationships" xmlns:p="http://schemas.openxmlformats.org/presentationml/2006/main">
   <p:cSld>
     <p:spTree>
@@ -13163,6 +13812,1253 @@
   <p:cSld>
     <p:spTree>
       <p:nvGrpSpPr>
+        <p:cNvPr id="1" name=""/>
+        <p:cNvGrpSpPr/>
+        <p:nvPr/>
+      </p:nvGrpSpPr>
+      <p:grpSpPr>
+        <a:xfrm>
+          <a:off x="0" y="0"/>
+          <a:ext cx="0" cy="0"/>
+          <a:chOff x="0" y="0"/>
+          <a:chExt cx="0" cy="0"/>
+        </a:xfrm>
+      </p:grpSpPr>
+      <p:sp>
+        <p:nvSpPr>
+          <p:cNvPr id="2" name="Title 1">
+            <a:extLst>
+              <a:ext uri="{FF2B5EF4-FFF2-40B4-BE49-F238E27FC236}">
+                <a16:creationId xmlns:a16="http://schemas.microsoft.com/office/drawing/2014/main" id="{A7396707-2D5D-914F-8E58-EA2CA7713AE9}"/>
+              </a:ext>
+            </a:extLst>
+          </p:cNvPr>
+          <p:cNvSpPr>
+            <a:spLocks noGrp="1"/>
+          </p:cNvSpPr>
+          <p:nvPr>
+            <p:ph type="title"/>
+          </p:nvPr>
+        </p:nvSpPr>
+        <p:spPr/>
+        <p:txBody>
+          <a:bodyPr/>
+          <a:lstStyle/>
+          <a:p>
+            <a:r>
+              <a:rPr lang="en-US" b="1" dirty="0" err="1"/>
+              <a:t>Ảnh</a:t>
+            </a:r>
+            <a:r>
+              <a:rPr lang="en-US" b="1" dirty="0"/>
+              <a:t> </a:t>
+            </a:r>
+            <a:r>
+              <a:rPr lang="en-US" b="1" dirty="0" err="1"/>
+              <a:t>của</a:t>
+            </a:r>
+            <a:r>
+              <a:rPr lang="en-US" b="1" dirty="0"/>
+              <a:t> </a:t>
+            </a:r>
+            <a:r>
+              <a:rPr lang="en-US" b="1" dirty="0" err="1"/>
+              <a:t>các</a:t>
+            </a:r>
+            <a:r>
+              <a:rPr lang="en-US" b="1" dirty="0"/>
+              <a:t> </a:t>
+            </a:r>
+            <a:r>
+              <a:rPr lang="en-US" b="1" dirty="0" err="1"/>
+              <a:t>thành</a:t>
+            </a:r>
+            <a:r>
+              <a:rPr lang="en-US" b="1" dirty="0"/>
+              <a:t> </a:t>
+            </a:r>
+            <a:r>
+              <a:rPr lang="en-US" b="1" dirty="0" err="1"/>
+              <a:t>viên</a:t>
+            </a:r>
+            <a:r>
+              <a:rPr lang="en-US" b="1" dirty="0"/>
+              <a:t> </a:t>
+            </a:r>
+            <a:r>
+              <a:rPr lang="en-US" b="1" dirty="0" err="1"/>
+              <a:t>của</a:t>
+            </a:r>
+            <a:r>
+              <a:rPr lang="en-US" b="1" dirty="0"/>
+              <a:t> </a:t>
+            </a:r>
+            <a:r>
+              <a:rPr lang="en-US" b="1" dirty="0" err="1"/>
+              <a:t>nhóm</a:t>
+            </a:r>
+            <a:r>
+              <a:rPr lang="en-US" b="1" dirty="0"/>
+              <a:t> </a:t>
+            </a:r>
+            <a:br>
+              <a:rPr lang="en-US" b="1" dirty="0"/>
+            </a:br>
+            <a:br>
+              <a:rPr lang="en-US" b="1" dirty="0"/>
+            </a:br>
+            <a:br>
+              <a:rPr lang="en-US" b="1" dirty="0"/>
+            </a:br>
+            <a:r>
+              <a:rPr lang="en-US" b="1" dirty="0" err="1"/>
+              <a:t>Ảnh</a:t>
+            </a:r>
+            <a:r>
+              <a:rPr lang="en-US" b="1" dirty="0"/>
+              <a:t> </a:t>
+            </a:r>
+            <a:r>
+              <a:rPr lang="en-US" b="1" dirty="0" err="1"/>
+              <a:t>của</a:t>
+            </a:r>
+            <a:r>
+              <a:rPr lang="en-US" b="1" dirty="0"/>
+              <a:t> </a:t>
+            </a:r>
+            <a:r>
+              <a:rPr lang="en-US" b="1" dirty="0" err="1"/>
+              <a:t>các</a:t>
+            </a:r>
+            <a:r>
+              <a:rPr lang="en-US" b="1" dirty="0"/>
+              <a:t> </a:t>
+            </a:r>
+            <a:r>
+              <a:rPr lang="en-US" b="1" dirty="0" err="1"/>
+              <a:t>thành</a:t>
+            </a:r>
+            <a:r>
+              <a:rPr lang="en-US" b="1" dirty="0"/>
+              <a:t> </a:t>
+            </a:r>
+            <a:r>
+              <a:rPr lang="en-US" b="1" dirty="0" err="1"/>
+              <a:t>viên</a:t>
+            </a:r>
+            <a:r>
+              <a:rPr lang="en-US" b="1" dirty="0"/>
+              <a:t> </a:t>
+            </a:r>
+            <a:r>
+              <a:rPr lang="en-US" b="1" dirty="0" err="1"/>
+              <a:t>của</a:t>
+            </a:r>
+            <a:r>
+              <a:rPr lang="en-US" b="1" dirty="0"/>
+              <a:t> </a:t>
+            </a:r>
+            <a:r>
+              <a:rPr lang="en-US" b="1" dirty="0" err="1"/>
+              <a:t>nhóm</a:t>
+            </a:r>
+            <a:r>
+              <a:rPr lang="en-US" b="1" dirty="0"/>
+              <a:t> </a:t>
+            </a:r>
+            <a:br>
+              <a:rPr lang="en-US" b="1" dirty="0"/>
+            </a:br>
+            <a:br>
+              <a:rPr lang="en-US" b="1" dirty="0"/>
+            </a:br>
+            <a:br>
+              <a:rPr lang="en-US" b="1" dirty="0"/>
+            </a:br>
+            <a:r>
+              <a:rPr lang="en-US" b="1" dirty="0" err="1"/>
+              <a:t>Ảnh</a:t>
+            </a:r>
+            <a:r>
+              <a:rPr lang="en-US" b="1" dirty="0"/>
+              <a:t> </a:t>
+            </a:r>
+            <a:r>
+              <a:rPr lang="en-US" b="1" dirty="0" err="1"/>
+              <a:t>của</a:t>
+            </a:r>
+            <a:r>
+              <a:rPr lang="en-US" b="1" dirty="0"/>
+              <a:t> </a:t>
+            </a:r>
+            <a:r>
+              <a:rPr lang="en-US" b="1" dirty="0" err="1"/>
+              <a:t>các</a:t>
+            </a:r>
+            <a:r>
+              <a:rPr lang="en-US" b="1" dirty="0"/>
+              <a:t> </a:t>
+            </a:r>
+            <a:r>
+              <a:rPr lang="en-US" b="1" dirty="0" err="1"/>
+              <a:t>thành</a:t>
+            </a:r>
+            <a:r>
+              <a:rPr lang="en-US" b="1" dirty="0"/>
+              <a:t> </a:t>
+            </a:r>
+            <a:r>
+              <a:rPr lang="en-US" b="1" dirty="0" err="1"/>
+              <a:t>viên</a:t>
+            </a:r>
+            <a:r>
+              <a:rPr lang="en-US" b="1" dirty="0"/>
+              <a:t> </a:t>
+            </a:r>
+            <a:r>
+              <a:rPr lang="en-US" b="1" dirty="0" err="1"/>
+              <a:t>của</a:t>
+            </a:r>
+            <a:r>
+              <a:rPr lang="en-US" b="1" dirty="0"/>
+              <a:t> </a:t>
+            </a:r>
+            <a:r>
+              <a:rPr lang="en-US" b="1" dirty="0" err="1"/>
+              <a:t>nhóm</a:t>
+            </a:r>
+            <a:r>
+              <a:rPr lang="en-US" b="1" dirty="0"/>
+              <a:t> </a:t>
+            </a:r>
+            <a:br>
+              <a:rPr lang="en-US" b="1" dirty="0"/>
+            </a:br>
+            <a:br>
+              <a:rPr lang="en-US" b="1" dirty="0"/>
+            </a:br>
+            <a:br>
+              <a:rPr lang="en-US" b="1" dirty="0"/>
+            </a:br>
+            <a:r>
+              <a:rPr lang="en-US" b="1" dirty="0" err="1"/>
+              <a:t>Ảnh</a:t>
+            </a:r>
+            <a:r>
+              <a:rPr lang="en-US" b="1" dirty="0"/>
+              <a:t> </a:t>
+            </a:r>
+            <a:r>
+              <a:rPr lang="en-US" b="1" dirty="0" err="1"/>
+              <a:t>của</a:t>
+            </a:r>
+            <a:r>
+              <a:rPr lang="en-US" b="1" dirty="0"/>
+              <a:t> </a:t>
+            </a:r>
+            <a:r>
+              <a:rPr lang="en-US" b="1" dirty="0" err="1"/>
+              <a:t>các</a:t>
+            </a:r>
+            <a:r>
+              <a:rPr lang="en-US" b="1" dirty="0"/>
+              <a:t> </a:t>
+            </a:r>
+            <a:r>
+              <a:rPr lang="en-US" b="1" dirty="0" err="1"/>
+              <a:t>thành</a:t>
+            </a:r>
+            <a:r>
+              <a:rPr lang="en-US" b="1" dirty="0"/>
+              <a:t> </a:t>
+            </a:r>
+            <a:r>
+              <a:rPr lang="en-US" b="1" dirty="0" err="1"/>
+              <a:t>viên</a:t>
+            </a:r>
+            <a:r>
+              <a:rPr lang="en-US" b="1" dirty="0"/>
+              <a:t> </a:t>
+            </a:r>
+            <a:r>
+              <a:rPr lang="en-US" b="1" dirty="0" err="1"/>
+              <a:t>của</a:t>
+            </a:r>
+            <a:r>
+              <a:rPr lang="en-US" b="1" dirty="0"/>
+              <a:t> </a:t>
+            </a:r>
+            <a:r>
+              <a:rPr lang="en-US" b="1" dirty="0" err="1"/>
+              <a:t>nhóm</a:t>
+            </a:r>
+            <a:r>
+              <a:rPr lang="en-US" b="1" dirty="0"/>
+              <a:t> </a:t>
+            </a:r>
+            <a:br>
+              <a:rPr lang="en-US" b="1" dirty="0"/>
+            </a:br>
+            <a:br>
+              <a:rPr lang="en-US" b="1" dirty="0"/>
+            </a:br>
+            <a:br>
+              <a:rPr lang="en-US" b="1" dirty="0"/>
+            </a:br>
+            <a:r>
+              <a:rPr lang="en-US" b="1" dirty="0" err="1"/>
+              <a:t>Ảnh</a:t>
+            </a:r>
+            <a:r>
+              <a:rPr lang="en-US" b="1" dirty="0"/>
+              <a:t> </a:t>
+            </a:r>
+            <a:r>
+              <a:rPr lang="en-US" b="1" dirty="0" err="1"/>
+              <a:t>của</a:t>
+            </a:r>
+            <a:r>
+              <a:rPr lang="en-US" b="1" dirty="0"/>
+              <a:t> </a:t>
+            </a:r>
+            <a:r>
+              <a:rPr lang="en-US" b="1" dirty="0" err="1"/>
+              <a:t>các</a:t>
+            </a:r>
+            <a:r>
+              <a:rPr lang="en-US" b="1" dirty="0"/>
+              <a:t> </a:t>
+            </a:r>
+            <a:r>
+              <a:rPr lang="en-US" b="1" dirty="0" err="1"/>
+              <a:t>thành</a:t>
+            </a:r>
+            <a:r>
+              <a:rPr lang="en-US" b="1" dirty="0"/>
+              <a:t> </a:t>
+            </a:r>
+            <a:r>
+              <a:rPr lang="en-US" b="1" dirty="0" err="1"/>
+              <a:t>viên</a:t>
+            </a:r>
+            <a:r>
+              <a:rPr lang="en-US" b="1" dirty="0"/>
+              <a:t> </a:t>
+            </a:r>
+            <a:r>
+              <a:rPr lang="en-US" b="1" dirty="0" err="1"/>
+              <a:t>của</a:t>
+            </a:r>
+            <a:r>
+              <a:rPr lang="en-US" b="1" dirty="0"/>
+              <a:t> </a:t>
+            </a:r>
+            <a:r>
+              <a:rPr lang="en-US" b="1" dirty="0" err="1"/>
+              <a:t>nhóm</a:t>
+            </a:r>
+            <a:r>
+              <a:rPr lang="en-US" b="1" dirty="0"/>
+              <a:t> </a:t>
+            </a:r>
+            <a:br>
+              <a:rPr lang="en-US" b="1" dirty="0"/>
+            </a:br>
+            <a:br>
+              <a:rPr lang="en-US" b="1" dirty="0"/>
+            </a:br>
+            <a:br>
+              <a:rPr lang="en-US" b="1" dirty="0"/>
+            </a:br>
+            <a:r>
+              <a:rPr lang="en-US" b="1" dirty="0" err="1"/>
+              <a:t>Ảnh</a:t>
+            </a:r>
+            <a:r>
+              <a:rPr lang="en-US" b="1" dirty="0"/>
+              <a:t> </a:t>
+            </a:r>
+            <a:r>
+              <a:rPr lang="en-US" b="1" dirty="0" err="1"/>
+              <a:t>của</a:t>
+            </a:r>
+            <a:r>
+              <a:rPr lang="en-US" b="1" dirty="0"/>
+              <a:t> </a:t>
+            </a:r>
+            <a:r>
+              <a:rPr lang="en-US" b="1" dirty="0" err="1"/>
+              <a:t>các</a:t>
+            </a:r>
+            <a:r>
+              <a:rPr lang="en-US" b="1" dirty="0"/>
+              <a:t> </a:t>
+            </a:r>
+            <a:r>
+              <a:rPr lang="en-US" b="1" dirty="0" err="1"/>
+              <a:t>thành</a:t>
+            </a:r>
+            <a:r>
+              <a:rPr lang="en-US" b="1" dirty="0"/>
+              <a:t> </a:t>
+            </a:r>
+            <a:r>
+              <a:rPr lang="en-US" b="1" dirty="0" err="1"/>
+              <a:t>viên</a:t>
+            </a:r>
+            <a:r>
+              <a:rPr lang="en-US" b="1" dirty="0"/>
+              <a:t> </a:t>
+            </a:r>
+            <a:r>
+              <a:rPr lang="en-US" b="1" dirty="0" err="1"/>
+              <a:t>của</a:t>
+            </a:r>
+            <a:r>
+              <a:rPr lang="en-US" b="1" dirty="0"/>
+              <a:t> </a:t>
+            </a:r>
+            <a:r>
+              <a:rPr lang="en-US" b="1" dirty="0" err="1"/>
+              <a:t>nhóm</a:t>
+            </a:r>
+            <a:r>
+              <a:rPr lang="en-US" b="1" dirty="0"/>
+              <a:t> </a:t>
+            </a:r>
+            <a:br>
+              <a:rPr lang="en-US" b="1" dirty="0"/>
+            </a:br>
+            <a:br>
+              <a:rPr lang="en-US" b="1" dirty="0"/>
+            </a:br>
+            <a:br>
+              <a:rPr lang="en-US" b="1" dirty="0"/>
+            </a:br>
+            <a:r>
+              <a:rPr lang="en-US" b="1" dirty="0" err="1"/>
+              <a:t>Ảnh</a:t>
+            </a:r>
+            <a:r>
+              <a:rPr lang="en-US" b="1" dirty="0"/>
+              <a:t> </a:t>
+            </a:r>
+            <a:r>
+              <a:rPr lang="en-US" b="1" dirty="0" err="1"/>
+              <a:t>của</a:t>
+            </a:r>
+            <a:r>
+              <a:rPr lang="en-US" b="1" dirty="0"/>
+              <a:t> </a:t>
+            </a:r>
+            <a:r>
+              <a:rPr lang="en-US" b="1" dirty="0" err="1"/>
+              <a:t>các</a:t>
+            </a:r>
+            <a:r>
+              <a:rPr lang="en-US" b="1" dirty="0"/>
+              <a:t> </a:t>
+            </a:r>
+            <a:r>
+              <a:rPr lang="en-US" b="1" dirty="0" err="1"/>
+              <a:t>thành</a:t>
+            </a:r>
+            <a:r>
+              <a:rPr lang="en-US" b="1" dirty="0"/>
+              <a:t> </a:t>
+            </a:r>
+            <a:r>
+              <a:rPr lang="en-US" b="1" dirty="0" err="1"/>
+              <a:t>viên</a:t>
+            </a:r>
+            <a:r>
+              <a:rPr lang="en-US" b="1" dirty="0"/>
+              <a:t> </a:t>
+            </a:r>
+            <a:r>
+              <a:rPr lang="en-US" b="1" dirty="0" err="1"/>
+              <a:t>của</a:t>
+            </a:r>
+            <a:r>
+              <a:rPr lang="en-US" b="1" dirty="0"/>
+              <a:t> </a:t>
+            </a:r>
+            <a:r>
+              <a:rPr lang="en-US" b="1" dirty="0" err="1"/>
+              <a:t>nhóm</a:t>
+            </a:r>
+            <a:r>
+              <a:rPr lang="en-US" b="1" dirty="0"/>
+              <a:t> </a:t>
+            </a:r>
+            <a:br>
+              <a:rPr lang="en-US" b="1" dirty="0"/>
+            </a:br>
+            <a:br>
+              <a:rPr lang="en-US" b="1" dirty="0"/>
+            </a:br>
+            <a:br>
+              <a:rPr lang="en-US" b="1" dirty="0"/>
+            </a:br>
+            <a:r>
+              <a:rPr lang="en-US" b="1" dirty="0" err="1"/>
+              <a:t>Ảnh</a:t>
+            </a:r>
+            <a:r>
+              <a:rPr lang="en-US" b="1" dirty="0"/>
+              <a:t> </a:t>
+            </a:r>
+            <a:r>
+              <a:rPr lang="en-US" b="1" dirty="0" err="1"/>
+              <a:t>của</a:t>
+            </a:r>
+            <a:r>
+              <a:rPr lang="en-US" b="1" dirty="0"/>
+              <a:t> </a:t>
+            </a:r>
+            <a:r>
+              <a:rPr lang="en-US" b="1" dirty="0" err="1"/>
+              <a:t>các</a:t>
+            </a:r>
+            <a:r>
+              <a:rPr lang="en-US" b="1" dirty="0"/>
+              <a:t> </a:t>
+            </a:r>
+            <a:r>
+              <a:rPr lang="en-US" b="1" dirty="0" err="1"/>
+              <a:t>thành</a:t>
+            </a:r>
+            <a:r>
+              <a:rPr lang="en-US" b="1" dirty="0"/>
+              <a:t> </a:t>
+            </a:r>
+            <a:r>
+              <a:rPr lang="en-US" b="1" dirty="0" err="1"/>
+              <a:t>viên</a:t>
+            </a:r>
+            <a:r>
+              <a:rPr lang="en-US" b="1" dirty="0"/>
+              <a:t> </a:t>
+            </a:r>
+            <a:r>
+              <a:rPr lang="en-US" b="1" dirty="0" err="1"/>
+              <a:t>của</a:t>
+            </a:r>
+            <a:r>
+              <a:rPr lang="en-US" b="1" dirty="0"/>
+              <a:t> </a:t>
+            </a:r>
+            <a:r>
+              <a:rPr lang="en-US" b="1" dirty="0" err="1"/>
+              <a:t>nhóm</a:t>
+            </a:r>
+            <a:r>
+              <a:rPr lang="en-US" b="1" dirty="0"/>
+              <a:t> </a:t>
+            </a:r>
+            <a:br>
+              <a:rPr lang="en-US" b="1" dirty="0"/>
+            </a:br>
+            <a:br>
+              <a:rPr lang="en-US" b="1" dirty="0"/>
+            </a:br>
+            <a:br>
+              <a:rPr lang="en-US" b="1" dirty="0"/>
+            </a:br>
+            <a:r>
+              <a:rPr lang="en-US" b="1" dirty="0" err="1"/>
+              <a:t>Ảnh</a:t>
+            </a:r>
+            <a:r>
+              <a:rPr lang="en-US" b="1" dirty="0"/>
+              <a:t> </a:t>
+            </a:r>
+            <a:r>
+              <a:rPr lang="en-US" b="1" dirty="0" err="1"/>
+              <a:t>của</a:t>
+            </a:r>
+            <a:r>
+              <a:rPr lang="en-US" b="1" dirty="0"/>
+              <a:t> </a:t>
+            </a:r>
+            <a:r>
+              <a:rPr lang="en-US" b="1" dirty="0" err="1"/>
+              <a:t>các</a:t>
+            </a:r>
+            <a:r>
+              <a:rPr lang="en-US" b="1" dirty="0"/>
+              <a:t> </a:t>
+            </a:r>
+            <a:r>
+              <a:rPr lang="en-US" b="1" dirty="0" err="1"/>
+              <a:t>thành</a:t>
+            </a:r>
+            <a:r>
+              <a:rPr lang="en-US" b="1" dirty="0"/>
+              <a:t> </a:t>
+            </a:r>
+            <a:r>
+              <a:rPr lang="en-US" b="1" dirty="0" err="1"/>
+              <a:t>viên</a:t>
+            </a:r>
+            <a:r>
+              <a:rPr lang="en-US" b="1" dirty="0"/>
+              <a:t> </a:t>
+            </a:r>
+            <a:r>
+              <a:rPr lang="en-US" b="1" dirty="0" err="1"/>
+              <a:t>của</a:t>
+            </a:r>
+            <a:r>
+              <a:rPr lang="en-US" b="1" dirty="0"/>
+              <a:t> </a:t>
+            </a:r>
+            <a:r>
+              <a:rPr lang="en-US" b="1" dirty="0" err="1"/>
+              <a:t>nhóm</a:t>
+            </a:r>
+            <a:r>
+              <a:rPr lang="en-US" b="1" dirty="0"/>
+              <a:t> </a:t>
+            </a:r>
+            <a:br>
+              <a:rPr lang="en-US" b="1" dirty="0"/>
+            </a:br>
+            <a:br>
+              <a:rPr lang="en-US" b="1" dirty="0"/>
+            </a:br>
+            <a:br>
+              <a:rPr lang="en-US" b="1" dirty="0"/>
+            </a:br>
+            <a:r>
+              <a:rPr lang="en-US" b="1" dirty="0" err="1"/>
+              <a:t>Ảnh</a:t>
+            </a:r>
+            <a:r>
+              <a:rPr lang="en-US" b="1" dirty="0"/>
+              <a:t> </a:t>
+            </a:r>
+            <a:r>
+              <a:rPr lang="en-US" b="1" dirty="0" err="1"/>
+              <a:t>của</a:t>
+            </a:r>
+            <a:r>
+              <a:rPr lang="en-US" b="1" dirty="0"/>
+              <a:t> </a:t>
+            </a:r>
+            <a:r>
+              <a:rPr lang="en-US" b="1" dirty="0" err="1"/>
+              <a:t>các</a:t>
+            </a:r>
+            <a:r>
+              <a:rPr lang="en-US" b="1" dirty="0"/>
+              <a:t> </a:t>
+            </a:r>
+            <a:r>
+              <a:rPr lang="en-US" b="1" dirty="0" err="1"/>
+              <a:t>thành</a:t>
+            </a:r>
+            <a:r>
+              <a:rPr lang="en-US" b="1" dirty="0"/>
+              <a:t> </a:t>
+            </a:r>
+            <a:r>
+              <a:rPr lang="en-US" b="1" dirty="0" err="1"/>
+              <a:t>viên</a:t>
+            </a:r>
+            <a:r>
+              <a:rPr lang="en-US" b="1" dirty="0"/>
+              <a:t> </a:t>
+            </a:r>
+            <a:r>
+              <a:rPr lang="en-US" b="1" dirty="0" err="1"/>
+              <a:t>của</a:t>
+            </a:r>
+            <a:r>
+              <a:rPr lang="en-US" b="1" dirty="0"/>
+              <a:t> </a:t>
+            </a:r>
+            <a:r>
+              <a:rPr lang="en-US" b="1" dirty="0" err="1"/>
+              <a:t>nhóm</a:t>
+            </a:r>
+            <a:r>
+              <a:rPr lang="en-US" b="1" dirty="0"/>
+              <a:t> </a:t>
+            </a:r>
+            <a:br>
+              <a:rPr lang="en-US" b="1" dirty="0"/>
+            </a:br>
+            <a:br>
+              <a:rPr lang="en-US" b="1" dirty="0"/>
+            </a:br>
+            <a:br>
+              <a:rPr lang="en-US" b="1" dirty="0"/>
+            </a:br>
+            <a:r>
+              <a:rPr lang="en-US" b="1" dirty="0" err="1"/>
+              <a:t>Ảnh</a:t>
+            </a:r>
+            <a:r>
+              <a:rPr lang="en-US" b="1" dirty="0"/>
+              <a:t> </a:t>
+            </a:r>
+            <a:r>
+              <a:rPr lang="en-US" b="1" dirty="0" err="1"/>
+              <a:t>của</a:t>
+            </a:r>
+            <a:r>
+              <a:rPr lang="en-US" b="1" dirty="0"/>
+              <a:t> </a:t>
+            </a:r>
+            <a:r>
+              <a:rPr lang="en-US" b="1" dirty="0" err="1"/>
+              <a:t>các</a:t>
+            </a:r>
+            <a:r>
+              <a:rPr lang="en-US" b="1" dirty="0"/>
+              <a:t> </a:t>
+            </a:r>
+            <a:r>
+              <a:rPr lang="en-US" b="1" dirty="0" err="1"/>
+              <a:t>thành</a:t>
+            </a:r>
+            <a:r>
+              <a:rPr lang="en-US" b="1" dirty="0"/>
+              <a:t> </a:t>
+            </a:r>
+            <a:r>
+              <a:rPr lang="en-US" b="1" dirty="0" err="1"/>
+              <a:t>viên</a:t>
+            </a:r>
+            <a:r>
+              <a:rPr lang="en-US" b="1" dirty="0"/>
+              <a:t> </a:t>
+            </a:r>
+            <a:r>
+              <a:rPr lang="en-US" b="1" dirty="0" err="1"/>
+              <a:t>của</a:t>
+            </a:r>
+            <a:r>
+              <a:rPr lang="en-US" b="1" dirty="0"/>
+              <a:t> </a:t>
+            </a:r>
+            <a:r>
+              <a:rPr lang="en-US" b="1" dirty="0" err="1"/>
+              <a:t>nhóm</a:t>
+            </a:r>
+            <a:r>
+              <a:rPr lang="en-US" b="1" dirty="0"/>
+              <a:t> </a:t>
+            </a:r>
+            <a:br>
+              <a:rPr lang="en-US" b="1" dirty="0"/>
+            </a:br>
+            <a:br>
+              <a:rPr lang="en-US" b="1" dirty="0"/>
+            </a:br>
+            <a:br>
+              <a:rPr lang="en-US" b="1" dirty="0"/>
+            </a:br>
+            <a:r>
+              <a:rPr lang="en-US" b="1" dirty="0" err="1"/>
+              <a:t>Ảnh</a:t>
+            </a:r>
+            <a:r>
+              <a:rPr lang="en-US" b="1" dirty="0"/>
+              <a:t> </a:t>
+            </a:r>
+            <a:r>
+              <a:rPr lang="en-US" b="1" dirty="0" err="1"/>
+              <a:t>của</a:t>
+            </a:r>
+            <a:r>
+              <a:rPr lang="en-US" b="1" dirty="0"/>
+              <a:t> </a:t>
+            </a:r>
+            <a:r>
+              <a:rPr lang="en-US" b="1" dirty="0" err="1"/>
+              <a:t>các</a:t>
+            </a:r>
+            <a:r>
+              <a:rPr lang="en-US" b="1" dirty="0"/>
+              <a:t> </a:t>
+            </a:r>
+            <a:r>
+              <a:rPr lang="en-US" b="1" dirty="0" err="1"/>
+              <a:t>thành</a:t>
+            </a:r>
+            <a:r>
+              <a:rPr lang="en-US" b="1" dirty="0"/>
+              <a:t> </a:t>
+            </a:r>
+            <a:r>
+              <a:rPr lang="en-US" b="1" dirty="0" err="1"/>
+              <a:t>viên</a:t>
+            </a:r>
+            <a:r>
+              <a:rPr lang="en-US" b="1" dirty="0"/>
+              <a:t> </a:t>
+            </a:r>
+            <a:r>
+              <a:rPr lang="en-US" b="1" dirty="0" err="1"/>
+              <a:t>của</a:t>
+            </a:r>
+            <a:r>
+              <a:rPr lang="en-US" b="1" dirty="0"/>
+              <a:t> </a:t>
+            </a:r>
+            <a:r>
+              <a:rPr lang="en-US" b="1" dirty="0" err="1"/>
+              <a:t>nhóm</a:t>
+            </a:r>
+            <a:r>
+              <a:rPr lang="en-US" b="1" dirty="0"/>
+              <a:t> </a:t>
+            </a:r>
+            <a:br>
+              <a:rPr lang="en-US" b="1" dirty="0"/>
+            </a:br>
+            <a:br>
+              <a:rPr lang="en-US" b="1" dirty="0"/>
+            </a:br>
+            <a:br>
+              <a:rPr lang="en-US" b="1" dirty="0"/>
+            </a:br>
+            <a:r>
+              <a:rPr lang="en-US" b="1" dirty="0" err="1">
+                <a:solidFill>
+                  <a:srgbClr val="FFFFFF"/>
+                </a:solidFill>
+              </a:rPr>
+              <a:t>Ảnh</a:t>
+            </a:r>
+            <a:r>
+              <a:rPr lang="en-US" b="1" dirty="0">
+                <a:solidFill>
+                  <a:srgbClr val="FFFFFF"/>
+                </a:solidFill>
+              </a:rPr>
+              <a:t> </a:t>
+            </a:r>
+            <a:r>
+              <a:rPr lang="en-US" b="1" dirty="0" err="1">
+                <a:solidFill>
+                  <a:srgbClr val="FFFFFF"/>
+                </a:solidFill>
+              </a:rPr>
+              <a:t>của</a:t>
+            </a:r>
+            <a:r>
+              <a:rPr lang="en-US" b="1" dirty="0">
+                <a:solidFill>
+                  <a:srgbClr val="FFFFFF"/>
+                </a:solidFill>
+              </a:rPr>
+              <a:t> </a:t>
+            </a:r>
+            <a:r>
+              <a:rPr lang="en-US" b="1" dirty="0" err="1">
+                <a:solidFill>
+                  <a:srgbClr val="FFFFFF"/>
+                </a:solidFill>
+              </a:rPr>
+              <a:t>các</a:t>
+            </a:r>
+            <a:r>
+              <a:rPr lang="en-US" b="1" dirty="0">
+                <a:solidFill>
+                  <a:srgbClr val="FFFFFF"/>
+                </a:solidFill>
+              </a:rPr>
+              <a:t> </a:t>
+            </a:r>
+            <a:r>
+              <a:rPr lang="en-US" b="1" dirty="0" err="1">
+                <a:solidFill>
+                  <a:srgbClr val="FFFFFF"/>
+                </a:solidFill>
+              </a:rPr>
+              <a:t>thành</a:t>
+            </a:r>
+            <a:r>
+              <a:rPr lang="en-US" b="1" dirty="0">
+                <a:solidFill>
+                  <a:srgbClr val="FFFFFF"/>
+                </a:solidFill>
+              </a:rPr>
+              <a:t> </a:t>
+            </a:r>
+            <a:r>
+              <a:rPr lang="en-US" b="1" dirty="0" err="1">
+                <a:solidFill>
+                  <a:srgbClr val="FFFFFF"/>
+                </a:solidFill>
+              </a:rPr>
+              <a:t>viên</a:t>
+            </a:r>
+            <a:r>
+              <a:rPr lang="en-US" b="1" dirty="0">
+                <a:solidFill>
+                  <a:srgbClr val="FFFFFF"/>
+                </a:solidFill>
+              </a:rPr>
+              <a:t> </a:t>
+            </a:r>
+            <a:r>
+              <a:rPr lang="en-US" b="1" dirty="0" err="1">
+                <a:solidFill>
+                  <a:srgbClr val="FFFFFF"/>
+                </a:solidFill>
+              </a:rPr>
+              <a:t>của</a:t>
+            </a:r>
+            <a:r>
+              <a:rPr lang="en-US" b="1" dirty="0">
+                <a:solidFill>
+                  <a:srgbClr val="FFFFFF"/>
+                </a:solidFill>
+              </a:rPr>
+              <a:t> </a:t>
+            </a:r>
+            <a:r>
+              <a:rPr lang="en-US" b="1" dirty="0" err="1">
+                <a:solidFill>
+                  <a:srgbClr val="FFFFFF"/>
+                </a:solidFill>
+              </a:rPr>
+              <a:t>nhóm</a:t>
+            </a:r>
+            <a:r>
+              <a:rPr lang="en-US" b="1" dirty="0">
+                <a:solidFill>
+                  <a:srgbClr val="FFFFFF"/>
+                </a:solidFill>
+              </a:rPr>
+              <a:t> </a:t>
+            </a:r>
+            <a:br>
+              <a:rPr lang="en-US" b="1" dirty="0">
+                <a:solidFill>
+                  <a:srgbClr val="000000"/>
+                </a:solidFill>
+              </a:rPr>
+            </a:br>
+            <a:br>
+              <a:rPr lang="en-US" b="1" dirty="0"/>
+            </a:br>
+            <a:br>
+              <a:rPr lang="en-US" b="1" dirty="0"/>
+            </a:br>
+            <a:r>
+              <a:rPr lang="en-US" b="1" dirty="0" err="1"/>
+              <a:t>Ảnh</a:t>
+            </a:r>
+            <a:r>
+              <a:rPr lang="en-US" b="1" dirty="0"/>
+              <a:t> </a:t>
+            </a:r>
+            <a:r>
+              <a:rPr lang="en-US" b="1" dirty="0" err="1"/>
+              <a:t>các</a:t>
+            </a:r>
+            <a:r>
+              <a:rPr lang="en-US" b="1" dirty="0"/>
+              <a:t> </a:t>
+            </a:r>
+            <a:r>
+              <a:rPr lang="en-US" b="1" dirty="0" err="1"/>
+              <a:t>thành</a:t>
+            </a:r>
+            <a:r>
+              <a:rPr lang="en-US" b="1" dirty="0"/>
+              <a:t> </a:t>
+            </a:r>
+            <a:r>
+              <a:rPr lang="en-US" b="1" dirty="0" err="1"/>
+              <a:t>viên</a:t>
+            </a:r>
+            <a:r>
+              <a:rPr lang="en-US" b="1" dirty="0"/>
+              <a:t> </a:t>
+            </a:r>
+            <a:r>
+              <a:rPr lang="en-US" b="1" dirty="0" err="1"/>
+              <a:t>nhóm</a:t>
+            </a:r>
+            <a:endParaRPr lang="en-VN" b="1" dirty="0"/>
+          </a:p>
+        </p:txBody>
+      </p:sp>
+      <p:pic>
+        <p:nvPicPr>
+          <p:cNvPr id="5" name="Picture 4" descr="A person standing in front of a window posing for the camera&#10;&#10;Description automatically generated with medium confidence">
+            <a:extLst>
+              <a:ext uri="{FF2B5EF4-FFF2-40B4-BE49-F238E27FC236}">
+                <a16:creationId xmlns:a16="http://schemas.microsoft.com/office/drawing/2014/main" id="{722ECD61-9C20-284A-9D68-4C2CFA32B7A6}"/>
+              </a:ext>
+            </a:extLst>
+          </p:cNvPr>
+          <p:cNvPicPr>
+            <a:picLocks noChangeAspect="1"/>
+          </p:cNvPicPr>
+          <p:nvPr/>
+        </p:nvPicPr>
+        <p:blipFill>
+          <a:blip r:embed="rId2"/>
+          <a:stretch>
+            <a:fillRect/>
+          </a:stretch>
+        </p:blipFill>
+        <p:spPr>
+          <a:xfrm>
+            <a:off x="3143829" y="1783080"/>
+            <a:ext cx="2145640" cy="2793492"/>
+          </a:xfrm>
+          <a:prstGeom prst="rect">
+            <a:avLst/>
+          </a:prstGeom>
+        </p:spPr>
+      </p:pic>
+      <p:pic>
+        <p:nvPicPr>
+          <p:cNvPr id="7" name="Picture 6" descr="A person wearing glasses&#10;&#10;Description automatically generated with medium confidence">
+            <a:extLst>
+              <a:ext uri="{FF2B5EF4-FFF2-40B4-BE49-F238E27FC236}">
+                <a16:creationId xmlns:a16="http://schemas.microsoft.com/office/drawing/2014/main" id="{2101786A-A2EB-554D-8277-9C1EE006E7BA}"/>
+              </a:ext>
+            </a:extLst>
+          </p:cNvPr>
+          <p:cNvPicPr>
+            <a:picLocks noChangeAspect="1"/>
+          </p:cNvPicPr>
+          <p:nvPr/>
+        </p:nvPicPr>
+        <p:blipFill>
+          <a:blip r:embed="rId3"/>
+          <a:stretch>
+            <a:fillRect/>
+          </a:stretch>
+        </p:blipFill>
+        <p:spPr>
+          <a:xfrm>
+            <a:off x="471900" y="1771182"/>
+            <a:ext cx="2082790" cy="2805390"/>
+          </a:xfrm>
+          <a:prstGeom prst="rect">
+            <a:avLst/>
+          </a:prstGeom>
+        </p:spPr>
+      </p:pic>
+      <p:pic>
+        <p:nvPicPr>
+          <p:cNvPr id="9" name="Picture 8" descr="A person standing on a balcony&#10;&#10;Description automatically generated with low confidence">
+            <a:extLst>
+              <a:ext uri="{FF2B5EF4-FFF2-40B4-BE49-F238E27FC236}">
+                <a16:creationId xmlns:a16="http://schemas.microsoft.com/office/drawing/2014/main" id="{34E4EA58-A374-CA49-922C-C7A0034A18A0}"/>
+              </a:ext>
+            </a:extLst>
+          </p:cNvPr>
+          <p:cNvPicPr>
+            <a:picLocks noChangeAspect="1"/>
+          </p:cNvPicPr>
+          <p:nvPr/>
+        </p:nvPicPr>
+        <p:blipFill>
+          <a:blip r:embed="rId4"/>
+          <a:stretch>
+            <a:fillRect/>
+          </a:stretch>
+        </p:blipFill>
+        <p:spPr>
+          <a:xfrm>
+            <a:off x="5878608" y="1783080"/>
+            <a:ext cx="2793492" cy="2793492"/>
+          </a:xfrm>
+          <a:prstGeom prst="rect">
+            <a:avLst/>
+          </a:prstGeom>
+        </p:spPr>
+      </p:pic>
+      <p:sp>
+        <p:nvSpPr>
+          <p:cNvPr id="10" name="TextBox 9">
+            <a:extLst>
+              <a:ext uri="{FF2B5EF4-FFF2-40B4-BE49-F238E27FC236}">
+                <a16:creationId xmlns:a16="http://schemas.microsoft.com/office/drawing/2014/main" id="{321C6B9A-0931-AE40-B193-9C154DD58924}"/>
+              </a:ext>
+            </a:extLst>
+          </p:cNvPr>
+          <p:cNvSpPr txBox="1"/>
+          <p:nvPr/>
+        </p:nvSpPr>
+        <p:spPr>
+          <a:xfrm>
+            <a:off x="386789" y="988168"/>
+            <a:ext cx="2253011" cy="634533"/>
+          </a:xfrm>
+          <a:prstGeom prst="rect">
+            <a:avLst/>
+          </a:prstGeom>
+          <a:noFill/>
+        </p:spPr>
+        <p:txBody>
+          <a:bodyPr wrap="square" rtlCol="0">
+            <a:spAutoFit/>
+          </a:bodyPr>
+          <a:lstStyle/>
+          <a:p>
+            <a:pPr marL="127000">
+              <a:lnSpc>
+                <a:spcPct val="115000"/>
+              </a:lnSpc>
+              <a:buSzPts val="1600"/>
+            </a:pPr>
+            <a:r>
+              <a:rPr lang="en-VN" sz="1600" dirty="0">
+                <a:latin typeface="Roboto"/>
+                <a:sym typeface="Roboto"/>
+              </a:rPr>
+              <a:t>Nguyễn Như Thanh</a:t>
+            </a:r>
+          </a:p>
+          <a:p>
+            <a:pPr marL="127000">
+              <a:lnSpc>
+                <a:spcPct val="115000"/>
+              </a:lnSpc>
+              <a:buSzPts val="1600"/>
+            </a:pPr>
+            <a:r>
+              <a:rPr lang="en-VN" sz="1600" dirty="0">
+                <a:latin typeface="Roboto"/>
+                <a:sym typeface="Roboto"/>
+              </a:rPr>
+              <a:t>CH2001015</a:t>
+            </a:r>
+          </a:p>
+        </p:txBody>
+      </p:sp>
+      <p:sp>
+        <p:nvSpPr>
+          <p:cNvPr id="11" name="TextBox 10">
+            <a:extLst>
+              <a:ext uri="{FF2B5EF4-FFF2-40B4-BE49-F238E27FC236}">
+                <a16:creationId xmlns:a16="http://schemas.microsoft.com/office/drawing/2014/main" id="{D2462910-469D-CF43-82E9-856F0AA20BB6}"/>
+              </a:ext>
+            </a:extLst>
+          </p:cNvPr>
+          <p:cNvSpPr txBox="1"/>
+          <p:nvPr/>
+        </p:nvSpPr>
+        <p:spPr>
+          <a:xfrm>
+            <a:off x="3175254" y="988784"/>
+            <a:ext cx="2082790" cy="634533"/>
+          </a:xfrm>
+          <a:prstGeom prst="rect">
+            <a:avLst/>
+          </a:prstGeom>
+          <a:noFill/>
+        </p:spPr>
+        <p:txBody>
+          <a:bodyPr wrap="square" rtlCol="0">
+            <a:spAutoFit/>
+          </a:bodyPr>
+          <a:lstStyle/>
+          <a:p>
+            <a:pPr marL="127000">
+              <a:lnSpc>
+                <a:spcPct val="115000"/>
+              </a:lnSpc>
+              <a:buSzPts val="1600"/>
+            </a:pPr>
+            <a:r>
+              <a:rPr lang="en-VN" sz="1600" dirty="0">
+                <a:latin typeface="Roboto"/>
+              </a:rPr>
+              <a:t>Mai Phương Nga</a:t>
+            </a:r>
+          </a:p>
+          <a:p>
+            <a:pPr marL="127000">
+              <a:lnSpc>
+                <a:spcPct val="115000"/>
+              </a:lnSpc>
+              <a:buSzPts val="1600"/>
+            </a:pPr>
+            <a:r>
+              <a:rPr lang="en-VN" sz="1600" dirty="0">
+                <a:latin typeface="Roboto"/>
+              </a:rPr>
+              <a:t>CH2001010</a:t>
+            </a:r>
+          </a:p>
+        </p:txBody>
+      </p:sp>
+      <p:sp>
+        <p:nvSpPr>
+          <p:cNvPr id="12" name="TextBox 11">
+            <a:extLst>
+              <a:ext uri="{FF2B5EF4-FFF2-40B4-BE49-F238E27FC236}">
+                <a16:creationId xmlns:a16="http://schemas.microsoft.com/office/drawing/2014/main" id="{98A07FA2-847D-FD48-96A5-2D816601D850}"/>
+              </a:ext>
+            </a:extLst>
+          </p:cNvPr>
+          <p:cNvSpPr txBox="1"/>
+          <p:nvPr/>
+        </p:nvSpPr>
+        <p:spPr>
+          <a:xfrm>
+            <a:off x="6543667" y="1013046"/>
+            <a:ext cx="1463373" cy="584775"/>
+          </a:xfrm>
+          <a:prstGeom prst="rect">
+            <a:avLst/>
+          </a:prstGeom>
+          <a:noFill/>
+        </p:spPr>
+        <p:txBody>
+          <a:bodyPr wrap="square" rtlCol="0">
+            <a:spAutoFit/>
+          </a:bodyPr>
+          <a:lstStyle/>
+          <a:p>
+            <a:r>
+              <a:rPr lang="en-VN" sz="1600" dirty="0">
+                <a:latin typeface="Roboto"/>
+              </a:rPr>
+              <a:t>Trần Hiếu Đại</a:t>
+            </a:r>
+          </a:p>
+          <a:p>
+            <a:r>
+              <a:rPr lang="en-VN" sz="1600" dirty="0">
+                <a:latin typeface="Roboto"/>
+              </a:rPr>
+              <a:t>CH2001001</a:t>
+            </a:r>
+          </a:p>
+        </p:txBody>
+      </p:sp>
+    </p:spTree>
+    <p:extLst>
+      <p:ext uri="{BB962C8B-B14F-4D97-AF65-F5344CB8AC3E}">
+        <p14:creationId xmlns:p14="http://schemas.microsoft.com/office/powerpoint/2010/main" val="632984330"/>
+      </p:ext>
+    </p:extLst>
+  </p:cSld>
+  <p:clrMapOvr>
+    <a:masterClrMapping/>
+  </p:clrMapOvr>
+</p:sld>
+</file>
+
+<file path=ppt/slides/slide5.xml><?xml version="1.0" encoding="utf-8"?>
+<p:sld xmlns:a="http://schemas.openxmlformats.org/drawingml/2006/main" xmlns:r="http://schemas.openxmlformats.org/officeDocument/2006/relationships" xmlns:p="http://schemas.openxmlformats.org/presentationml/2006/main">
+  <p:cSld>
+    <p:spTree>
+      <p:nvGrpSpPr>
         <p:cNvPr id="1" name="Shape 90"/>
         <p:cNvGrpSpPr/>
         <p:nvPr/>
@@ -13995,7 +15891,7 @@
 </p:sld>
 </file>
 
-<file path=ppt/slides/slide5.xml><?xml version="1.0" encoding="utf-8"?>
+<file path=ppt/slides/slide6.xml><?xml version="1.0" encoding="utf-8"?>
 <p:sld xmlns:a="http://schemas.openxmlformats.org/drawingml/2006/main" xmlns:r="http://schemas.openxmlformats.org/officeDocument/2006/relationships" xmlns:p="http://schemas.openxmlformats.org/presentationml/2006/main">
   <p:cSld>
     <p:spTree>
@@ -14232,7 +16128,7 @@
 </p:sld>
 </file>
 
-<file path=ppt/slides/slide6.xml><?xml version="1.0" encoding="utf-8"?>
+<file path=ppt/slides/slide7.xml><?xml version="1.0" encoding="utf-8"?>
 <p:sld xmlns:a="http://schemas.openxmlformats.org/drawingml/2006/main" xmlns:r="http://schemas.openxmlformats.org/officeDocument/2006/relationships" xmlns:p="http://schemas.openxmlformats.org/presentationml/2006/main">
   <p:cSld>
     <p:spTree>
@@ -14321,559 +16217,6 @@
         <p14:creationId xmlns:p14="http://schemas.microsoft.com/office/powerpoint/2010/main" val="1963280877"/>
       </p:ext>
     </p:extLst>
-  </p:cSld>
-  <p:clrMapOvr>
-    <a:masterClrMapping/>
-  </p:clrMapOvr>
-</p:sld>
-</file>
-
-<file path=ppt/slides/slide7.xml><?xml version="1.0" encoding="utf-8"?>
-<p:sld xmlns:a="http://schemas.openxmlformats.org/drawingml/2006/main" xmlns:r="http://schemas.openxmlformats.org/officeDocument/2006/relationships" xmlns:p="http://schemas.openxmlformats.org/presentationml/2006/main">
-  <p:cSld>
-    <p:spTree>
-      <p:nvGrpSpPr>
-        <p:cNvPr id="1" name="Shape 103"/>
-        <p:cNvGrpSpPr/>
-        <p:nvPr/>
-      </p:nvGrpSpPr>
-      <p:grpSpPr>
-        <a:xfrm>
-          <a:off x="0" y="0"/>
-          <a:ext cx="0" cy="0"/>
-          <a:chOff x="0" y="0"/>
-          <a:chExt cx="0" cy="0"/>
-        </a:xfrm>
-      </p:grpSpPr>
-      <p:sp>
-        <p:nvSpPr>
-          <p:cNvPr id="104" name="Google Shape;104;p9"/>
-          <p:cNvSpPr txBox="1">
-            <a:spLocks noGrp="1"/>
-          </p:cNvSpPr>
-          <p:nvPr>
-            <p:ph type="title"/>
-          </p:nvPr>
-        </p:nvSpPr>
-        <p:spPr>
-          <a:xfrm>
-            <a:off x="471900" y="57875"/>
-            <a:ext cx="8222100" cy="670500"/>
-          </a:xfrm>
-          <a:prstGeom prst="rect">
-            <a:avLst/>
-          </a:prstGeom>
-          <a:noFill/>
-          <a:ln>
-            <a:noFill/>
-          </a:ln>
-        </p:spPr>
-        <p:txBody>
-          <a:bodyPr spcFirstLastPara="1" wrap="square" lIns="91425" tIns="91425" rIns="91425" bIns="91425" anchor="ctr" anchorCtr="0">
-            <a:noAutofit/>
-          </a:bodyPr>
-          <a:lstStyle/>
-          <a:p>
-            <a:pPr marL="0" lvl="0" indent="0" algn="l" rtl="0">
-              <a:lnSpc>
-                <a:spcPct val="100000"/>
-              </a:lnSpc>
-              <a:spcBef>
-                <a:spcPts val="0"/>
-              </a:spcBef>
-              <a:spcAft>
-                <a:spcPts val="0"/>
-              </a:spcAft>
-              <a:buSzPts val="3200"/>
-              <a:buNone/>
-            </a:pPr>
-            <a:r>
-              <a:rPr lang="en" b="1" dirty="0" err="1"/>
-              <a:t>Dữ</a:t>
-            </a:r>
-            <a:r>
-              <a:rPr lang="en" b="1" dirty="0"/>
-              <a:t> </a:t>
-            </a:r>
-            <a:r>
-              <a:rPr lang="en" b="1" dirty="0" err="1"/>
-              <a:t>liệu</a:t>
-            </a:r>
-            <a:endParaRPr dirty="0"/>
-          </a:p>
-        </p:txBody>
-      </p:sp>
-      <p:sp>
-        <p:nvSpPr>
-          <p:cNvPr id="105" name="Google Shape;105;p9"/>
-          <p:cNvSpPr txBox="1">
-            <a:spLocks noGrp="1"/>
-          </p:cNvSpPr>
-          <p:nvPr>
-            <p:ph type="body" idx="1"/>
-          </p:nvPr>
-        </p:nvSpPr>
-        <p:spPr>
-          <a:xfrm>
-            <a:off x="471900" y="820500"/>
-            <a:ext cx="8222100" cy="3908400"/>
-          </a:xfrm>
-          <a:prstGeom prst="rect">
-            <a:avLst/>
-          </a:prstGeom>
-          <a:noFill/>
-          <a:ln>
-            <a:noFill/>
-          </a:ln>
-        </p:spPr>
-        <p:txBody>
-          <a:bodyPr spcFirstLastPara="1" wrap="square" lIns="91425" tIns="91425" rIns="91425" bIns="91425" anchor="t" anchorCtr="0">
-            <a:noAutofit/>
-          </a:bodyPr>
-          <a:lstStyle/>
-          <a:p>
-            <a:pPr marL="457200" lvl="0" indent="-368300" algn="l" rtl="0">
-              <a:lnSpc>
-                <a:spcPct val="115000"/>
-              </a:lnSpc>
-              <a:spcBef>
-                <a:spcPts val="0"/>
-              </a:spcBef>
-              <a:spcAft>
-                <a:spcPts val="0"/>
-              </a:spcAft>
-              <a:buSzPts val="2200"/>
-              <a:buChar char="●"/>
-            </a:pPr>
-            <a:r>
-              <a:rPr lang="en" sz="1600" dirty="0" err="1"/>
-              <a:t>Tổng</a:t>
-            </a:r>
-            <a:r>
-              <a:rPr lang="en" sz="1600" dirty="0"/>
-              <a:t> </a:t>
-            </a:r>
-            <a:r>
-              <a:rPr lang="en" sz="1600" dirty="0" err="1"/>
-              <a:t>số</a:t>
-            </a:r>
-            <a:r>
-              <a:rPr lang="en" sz="1600" dirty="0"/>
-              <a:t> </a:t>
-            </a:r>
-            <a:r>
-              <a:rPr lang="en" sz="1600" dirty="0" err="1"/>
-              <a:t>ảnh</a:t>
-            </a:r>
-            <a:r>
-              <a:rPr lang="en" sz="1600" dirty="0"/>
-              <a:t>: 1706 </a:t>
-            </a:r>
-            <a:r>
-              <a:rPr lang="en" sz="1600" dirty="0" err="1"/>
-              <a:t>ảnh</a:t>
-            </a:r>
-            <a:endParaRPr sz="1600" dirty="0"/>
-          </a:p>
-          <a:p>
-            <a:pPr lvl="1">
-              <a:spcBef>
-                <a:spcPts val="0"/>
-              </a:spcBef>
-            </a:pPr>
-            <a:r>
-              <a:rPr lang="en" sz="1600" dirty="0"/>
-              <a:t>Training: 1566 </a:t>
-            </a:r>
-            <a:r>
-              <a:rPr lang="en" sz="1600" dirty="0" err="1"/>
-              <a:t>ảnh</a:t>
-            </a:r>
-            <a:r>
-              <a:rPr lang="en" sz="1600" dirty="0"/>
-              <a:t> </a:t>
-            </a:r>
-            <a:r>
-              <a:rPr lang="en" sz="1600" dirty="0" err="1"/>
-              <a:t>trong</a:t>
-            </a:r>
-            <a:r>
-              <a:rPr lang="en" sz="1600" dirty="0"/>
-              <a:t> </a:t>
-            </a:r>
-            <a:r>
-              <a:rPr lang="en" sz="1600" dirty="0" err="1"/>
-              <a:t>đó</a:t>
-            </a:r>
-            <a:r>
-              <a:rPr lang="en" sz="1600" dirty="0"/>
-              <a:t> 1054 </a:t>
-            </a:r>
-            <a:r>
-              <a:rPr lang="en" sz="1600" dirty="0" err="1"/>
-              <a:t>ảnh</a:t>
-            </a:r>
-            <a:r>
-              <a:rPr lang="en" sz="1600" dirty="0"/>
-              <a:t> </a:t>
-            </a:r>
-            <a:r>
-              <a:rPr lang="en" sz="1600" dirty="0" err="1"/>
-              <a:t>được</a:t>
-            </a:r>
-            <a:r>
-              <a:rPr lang="en" sz="1600" dirty="0"/>
-              <a:t> </a:t>
-            </a:r>
-            <a:r>
-              <a:rPr lang="en" sz="1600" dirty="0" err="1"/>
-              <a:t>tạo</a:t>
-            </a:r>
-            <a:r>
-              <a:rPr lang="en" sz="1600" dirty="0"/>
-              <a:t> ra </a:t>
-            </a:r>
-            <a:r>
-              <a:rPr lang="en" sz="1600" dirty="0" err="1"/>
-              <a:t>sau</a:t>
-            </a:r>
-            <a:r>
-              <a:rPr lang="en" sz="1600" dirty="0"/>
-              <a:t> </a:t>
-            </a:r>
-            <a:r>
-              <a:rPr lang="en" sz="1600" dirty="0" err="1"/>
-              <a:t>khi</a:t>
-            </a:r>
-            <a:r>
-              <a:rPr lang="en" sz="1600" dirty="0"/>
-              <a:t> </a:t>
-            </a:r>
-            <a:r>
-              <a:rPr lang="en" sz="1600" dirty="0" err="1"/>
-              <a:t>sử</a:t>
-            </a:r>
-            <a:r>
-              <a:rPr lang="en" sz="1600" dirty="0"/>
-              <a:t> d</a:t>
-            </a:r>
-            <a:r>
-              <a:rPr lang="en-US" sz="1600" dirty="0" err="1"/>
-              <a:t>ụng</a:t>
-            </a:r>
-            <a:r>
-              <a:rPr lang="en-US" sz="1600" dirty="0"/>
-              <a:t> </a:t>
-            </a:r>
-            <a:r>
-              <a:rPr lang="en-US" sz="1600" dirty="0" err="1"/>
-              <a:t>augumented</a:t>
-            </a:r>
-            <a:r>
-              <a:rPr lang="en-US" sz="1600" dirty="0"/>
-              <a:t> </a:t>
-            </a:r>
-            <a:r>
-              <a:rPr lang="en-US" sz="1600" dirty="0" err="1"/>
-              <a:t>trên</a:t>
-            </a:r>
-            <a:r>
-              <a:rPr lang="en-US" sz="1600" dirty="0"/>
-              <a:t> 512 </a:t>
-            </a:r>
-            <a:r>
-              <a:rPr lang="en-US" sz="1600" dirty="0" err="1"/>
-              <a:t>ảnh</a:t>
-            </a:r>
-            <a:r>
-              <a:rPr lang="en-US" sz="1600" dirty="0"/>
-              <a:t> </a:t>
-            </a:r>
-            <a:r>
-              <a:rPr lang="en-US" sz="1600" dirty="0" err="1"/>
-              <a:t>gốc</a:t>
-            </a:r>
-            <a:r>
-              <a:rPr lang="en" sz="1600" dirty="0"/>
-              <a:t> </a:t>
-            </a:r>
-            <a:r>
-              <a:rPr lang="en-US" sz="1600" dirty="0" err="1"/>
-              <a:t>theo</a:t>
-            </a:r>
-            <a:r>
-              <a:rPr lang="en-US" sz="1600" dirty="0"/>
-              <a:t> </a:t>
-            </a:r>
-            <a:r>
-              <a:rPr lang="en-US" sz="1600" dirty="0" err="1"/>
-              <a:t>cấu</a:t>
-            </a:r>
-            <a:r>
-              <a:rPr lang="en-US" sz="1600" dirty="0"/>
-              <a:t> </a:t>
-            </a:r>
-            <a:r>
-              <a:rPr lang="en-US" sz="1600" dirty="0" err="1"/>
-              <a:t>hình</a:t>
-            </a:r>
-            <a:r>
-              <a:rPr lang="en-US" sz="1600" dirty="0"/>
-              <a:t> </a:t>
-            </a:r>
-            <a:r>
-              <a:rPr lang="en-US" sz="1600" dirty="0" err="1"/>
-              <a:t>như</a:t>
-            </a:r>
-            <a:r>
-              <a:rPr lang="en-US" sz="1600" dirty="0"/>
-              <a:t> </a:t>
-            </a:r>
-            <a:r>
-              <a:rPr lang="en-US" sz="1600" dirty="0" err="1"/>
-              <a:t>sau</a:t>
-            </a:r>
-            <a:r>
-              <a:rPr lang="en-US" sz="1600" dirty="0"/>
-              <a:t>:</a:t>
-            </a:r>
-          </a:p>
-          <a:p>
-            <a:pPr lvl="2">
-              <a:spcBef>
-                <a:spcPts val="0"/>
-              </a:spcBef>
-            </a:pPr>
-            <a:r>
-              <a:rPr lang="en-US" sz="1600" dirty="0"/>
-              <a:t>Size: 416 x 416</a:t>
-            </a:r>
-          </a:p>
-          <a:p>
-            <a:pPr lvl="2">
-              <a:spcBef>
-                <a:spcPts val="0"/>
-              </a:spcBef>
-            </a:pPr>
-            <a:r>
-              <a:rPr lang="en-US" sz="1600" dirty="0"/>
-              <a:t>Rotation: </a:t>
-            </a:r>
-            <a:r>
-              <a:rPr lang="en-US" sz="1600" dirty="0" err="1"/>
-              <a:t>từ</a:t>
-            </a:r>
-            <a:r>
-              <a:rPr lang="en-US" sz="1600" dirty="0"/>
-              <a:t> -45 </a:t>
-            </a:r>
-            <a:r>
-              <a:rPr lang="en-US" sz="1600" dirty="0" err="1"/>
-              <a:t>độ</a:t>
-            </a:r>
-            <a:r>
-              <a:rPr lang="en-US" sz="1600" dirty="0"/>
-              <a:t> </a:t>
-            </a:r>
-            <a:r>
-              <a:rPr lang="en-US" sz="1600" dirty="0" err="1"/>
-              <a:t>đến</a:t>
-            </a:r>
-            <a:r>
-              <a:rPr lang="en-US" sz="1600" dirty="0"/>
-              <a:t> 45 </a:t>
-            </a:r>
-            <a:r>
-              <a:rPr lang="en-US" sz="1600" dirty="0" err="1"/>
-              <a:t>độ</a:t>
-            </a:r>
-            <a:endParaRPr lang="en-US" sz="1600" dirty="0"/>
-          </a:p>
-          <a:p>
-            <a:pPr lvl="2">
-              <a:spcBef>
-                <a:spcPts val="0"/>
-              </a:spcBef>
-            </a:pPr>
-            <a:r>
-              <a:rPr lang="en-US" sz="1600" dirty="0"/>
-              <a:t>Shear: horizontal </a:t>
-            </a:r>
-            <a:r>
-              <a:rPr lang="en-US" sz="1600" dirty="0" err="1"/>
-              <a:t>và</a:t>
-            </a:r>
-            <a:r>
-              <a:rPr lang="en-US" sz="1600" dirty="0"/>
-              <a:t> vertical </a:t>
-            </a:r>
-            <a:r>
-              <a:rPr lang="en-US" sz="1600" dirty="0" err="1"/>
-              <a:t>từ</a:t>
-            </a:r>
-            <a:r>
-              <a:rPr lang="en-US" sz="1600" dirty="0"/>
-              <a:t> -15 </a:t>
-            </a:r>
-            <a:r>
-              <a:rPr lang="en-US" sz="1600" dirty="0" err="1"/>
-              <a:t>độ</a:t>
-            </a:r>
-            <a:r>
-              <a:rPr lang="en-US" sz="1600" dirty="0"/>
-              <a:t> </a:t>
-            </a:r>
-            <a:r>
-              <a:rPr lang="en-US" sz="1600" dirty="0" err="1"/>
-              <a:t>đến</a:t>
-            </a:r>
-            <a:r>
-              <a:rPr lang="en-US" sz="1600" dirty="0"/>
-              <a:t> 15 </a:t>
-            </a:r>
-            <a:r>
-              <a:rPr lang="en-US" sz="1600" dirty="0" err="1"/>
-              <a:t>độ</a:t>
-            </a:r>
-            <a:endParaRPr lang="en-US" sz="1600" dirty="0"/>
-          </a:p>
-          <a:p>
-            <a:pPr lvl="2">
-              <a:spcBef>
-                <a:spcPts val="0"/>
-              </a:spcBef>
-            </a:pPr>
-            <a:r>
-              <a:rPr lang="en-US" sz="1600" dirty="0"/>
-              <a:t>Brightness: </a:t>
-            </a:r>
-            <a:r>
-              <a:rPr lang="en-US" sz="1600" dirty="0" err="1"/>
-              <a:t>từ</a:t>
-            </a:r>
-            <a:r>
-              <a:rPr lang="en-US" sz="1600" dirty="0"/>
-              <a:t> -20% </a:t>
-            </a:r>
-            <a:r>
-              <a:rPr lang="en-US" sz="1600" dirty="0" err="1"/>
-              <a:t>đến</a:t>
-            </a:r>
-            <a:r>
-              <a:rPr lang="en-US" sz="1600" dirty="0"/>
-              <a:t> 20%</a:t>
-            </a:r>
-          </a:p>
-          <a:p>
-            <a:pPr lvl="2">
-              <a:spcBef>
-                <a:spcPts val="0"/>
-              </a:spcBef>
-            </a:pPr>
-            <a:r>
-              <a:rPr lang="vi-VN" sz="1600" dirty="0"/>
-              <a:t>Blur: từ 0px đến 5px</a:t>
-            </a:r>
-          </a:p>
-          <a:p>
-            <a:pPr lvl="2">
-              <a:spcBef>
-                <a:spcPts val="0"/>
-              </a:spcBef>
-            </a:pPr>
-            <a:r>
-              <a:rPr lang="vi-VN" sz="1600" dirty="0"/>
-              <a:t>Noise: từ 0% đến 5%</a:t>
-            </a:r>
-            <a:endParaRPr sz="1600" dirty="0"/>
-          </a:p>
-          <a:p>
-            <a:pPr marL="914400" lvl="1" indent="-355600" algn="l" rtl="0">
-              <a:lnSpc>
-                <a:spcPct val="115000"/>
-              </a:lnSpc>
-              <a:spcBef>
-                <a:spcPts val="0"/>
-              </a:spcBef>
-              <a:spcAft>
-                <a:spcPts val="0"/>
-              </a:spcAft>
-              <a:buSzPts val="2000"/>
-              <a:buChar char="○"/>
-            </a:pPr>
-            <a:r>
-              <a:rPr lang="en" sz="1600" dirty="0"/>
-              <a:t>Testing: 130 </a:t>
-            </a:r>
-            <a:r>
-              <a:rPr lang="en" sz="1600" dirty="0" err="1"/>
-              <a:t>ảnh</a:t>
-            </a:r>
-            <a:endParaRPr lang="en" sz="1600" dirty="0"/>
-          </a:p>
-          <a:p>
-            <a:pPr lvl="1">
-              <a:spcBef>
-                <a:spcPts val="0"/>
-              </a:spcBef>
-            </a:pPr>
-            <a:r>
-              <a:rPr lang="en" sz="1600" dirty="0"/>
-              <a:t>Dataset: </a:t>
-            </a:r>
-            <a:r>
-              <a:rPr lang="en-US" sz="1600" dirty="0">
-                <a:hlinkClick r:id="rId3"/>
-              </a:rPr>
-              <a:t>https://github.com/MaiNga-uit/CS2225.CH1507/tree/master/dataset</a:t>
-            </a:r>
-            <a:endParaRPr lang="en-US" sz="1600" dirty="0"/>
-          </a:p>
-          <a:p>
-            <a:pPr lvl="1">
-              <a:spcBef>
-                <a:spcPts val="0"/>
-              </a:spcBef>
-            </a:pPr>
-            <a:r>
-              <a:rPr lang="en-US" sz="1600" dirty="0"/>
-              <a:t>TF-record </a:t>
-            </a:r>
-            <a:r>
-              <a:rPr lang="en-US" sz="1600" dirty="0" err="1"/>
-              <a:t>từ</a:t>
-            </a:r>
-            <a:r>
-              <a:rPr lang="en-US" sz="1600" dirty="0"/>
-              <a:t> dataset: </a:t>
-            </a:r>
-            <a:r>
-              <a:rPr lang="en-US" sz="1600" dirty="0">
-                <a:hlinkClick r:id="rId4"/>
-              </a:rPr>
-              <a:t>https://app.roboflow.com/ds/6kyOg1KHvY?key=9NoENEKLqj</a:t>
-            </a:r>
-            <a:endParaRPr lang="en-US" sz="1600" dirty="0"/>
-          </a:p>
-          <a:p>
-            <a:pPr lvl="1">
-              <a:spcBef>
-                <a:spcPts val="0"/>
-              </a:spcBef>
-            </a:pPr>
-            <a:endParaRPr lang="en-US" sz="1600" dirty="0"/>
-          </a:p>
-          <a:p>
-            <a:pPr lvl="1">
-              <a:spcBef>
-                <a:spcPts val="0"/>
-              </a:spcBef>
-            </a:pPr>
-            <a:endParaRPr lang="en" sz="1600" dirty="0"/>
-          </a:p>
-        </p:txBody>
-      </p:sp>
-    </p:spTree>
   </p:cSld>
   <p:clrMapOvr>
     <a:masterClrMapping/>
@@ -14985,29 +16328,358 @@
           </a:bodyPr>
           <a:lstStyle/>
           <a:p>
-            <a:r>
-              <a:rPr lang="en" sz="1600" dirty="0" err="1"/>
-              <a:t>Cách</a:t>
-            </a:r>
-            <a:r>
-              <a:rPr lang="en" sz="1600" dirty="0"/>
-              <a:t> </a:t>
-            </a:r>
-            <a:r>
-              <a:rPr lang="en" sz="1600" dirty="0" err="1"/>
-              <a:t>thu</a:t>
-            </a:r>
-            <a:r>
-              <a:rPr lang="en" sz="1600" dirty="0"/>
-              <a:t> </a:t>
-            </a:r>
-            <a:r>
-              <a:rPr lang="en" sz="1600" dirty="0" err="1"/>
-              <a:t>thập</a:t>
-            </a:r>
-            <a:r>
-              <a:rPr lang="en" sz="1600" dirty="0"/>
+            <a:pPr marL="457200" lvl="0" indent="-368300" algn="l" rtl="0">
+              <a:lnSpc>
+                <a:spcPct val="115000"/>
+              </a:lnSpc>
+              <a:spcBef>
+                <a:spcPts val="0"/>
+              </a:spcBef>
+              <a:spcAft>
+                <a:spcPts val="0"/>
+              </a:spcAft>
+              <a:buSzPts val="2200"/>
+              <a:buChar char="●"/>
+            </a:pPr>
+            <a:r>
+              <a:rPr lang="en" sz="1600" dirty="0" err="1"/>
+              <a:t>Tổng</a:t>
+            </a:r>
+            <a:r>
+              <a:rPr lang="en" sz="1600" dirty="0"/>
+              <a:t> </a:t>
+            </a:r>
+            <a:r>
+              <a:rPr lang="en" sz="1600" dirty="0" err="1"/>
+              <a:t>số</a:t>
+            </a:r>
+            <a:r>
+              <a:rPr lang="en" sz="1600" dirty="0"/>
+              <a:t> </a:t>
+            </a:r>
+            <a:r>
+              <a:rPr lang="en" sz="1600" dirty="0" err="1"/>
+              <a:t>ảnh</a:t>
+            </a:r>
+            <a:r>
+              <a:rPr lang="en" sz="1600" dirty="0"/>
+              <a:t>: 1706 </a:t>
+            </a:r>
+            <a:r>
+              <a:rPr lang="en" sz="1600" dirty="0" err="1"/>
+              <a:t>ảnh</a:t>
+            </a:r>
+            <a:endParaRPr sz="1600" dirty="0"/>
+          </a:p>
+          <a:p>
+            <a:pPr lvl="1">
+              <a:spcBef>
+                <a:spcPts val="0"/>
+              </a:spcBef>
+            </a:pPr>
+            <a:r>
+              <a:rPr lang="en" sz="1600" dirty="0"/>
+              <a:t>Training: 1566 </a:t>
+            </a:r>
+            <a:r>
+              <a:rPr lang="en" sz="1600" dirty="0" err="1"/>
+              <a:t>ảnh</a:t>
+            </a:r>
+            <a:r>
+              <a:rPr lang="en" sz="1600" dirty="0"/>
+              <a:t> </a:t>
+            </a:r>
+            <a:r>
+              <a:rPr lang="en" sz="1600" dirty="0" err="1"/>
+              <a:t>trong</a:t>
+            </a:r>
+            <a:r>
+              <a:rPr lang="en" sz="1600" dirty="0"/>
+              <a:t> </a:t>
+            </a:r>
+            <a:r>
+              <a:rPr lang="en" sz="1600" dirty="0" err="1"/>
+              <a:t>đó</a:t>
+            </a:r>
+            <a:r>
+              <a:rPr lang="en" sz="1600" dirty="0"/>
+              <a:t> 1054 </a:t>
+            </a:r>
+            <a:r>
+              <a:rPr lang="en" sz="1600" dirty="0" err="1"/>
+              <a:t>ảnh</a:t>
+            </a:r>
+            <a:r>
+              <a:rPr lang="en" sz="1600" dirty="0"/>
+              <a:t> </a:t>
+            </a:r>
+            <a:r>
+              <a:rPr lang="en" sz="1600" dirty="0" err="1"/>
+              <a:t>được</a:t>
+            </a:r>
+            <a:r>
+              <a:rPr lang="en" sz="1600" dirty="0"/>
+              <a:t> </a:t>
+            </a:r>
+            <a:r>
+              <a:rPr lang="en" sz="1600" dirty="0" err="1"/>
+              <a:t>tạo</a:t>
+            </a:r>
+            <a:r>
+              <a:rPr lang="en" sz="1600" dirty="0"/>
+              <a:t> ra </a:t>
+            </a:r>
+            <a:r>
+              <a:rPr lang="en" sz="1600" dirty="0" err="1"/>
+              <a:t>sau</a:t>
+            </a:r>
+            <a:r>
+              <a:rPr lang="en" sz="1600" dirty="0"/>
+              <a:t> </a:t>
+            </a:r>
+            <a:r>
+              <a:rPr lang="en" sz="1600" dirty="0" err="1"/>
+              <a:t>khi</a:t>
+            </a:r>
+            <a:r>
+              <a:rPr lang="en" sz="1600" dirty="0"/>
+              <a:t> </a:t>
+            </a:r>
+            <a:r>
+              <a:rPr lang="en" sz="1600" dirty="0" err="1"/>
+              <a:t>sử</a:t>
+            </a:r>
+            <a:r>
+              <a:rPr lang="en" sz="1600" dirty="0"/>
+              <a:t> d</a:t>
+            </a:r>
+            <a:r>
+              <a:rPr lang="en-US" sz="1600" dirty="0" err="1"/>
+              <a:t>ụng</a:t>
+            </a:r>
+            <a:r>
+              <a:rPr lang="en-US" sz="1600" dirty="0"/>
+              <a:t> </a:t>
+            </a:r>
+            <a:r>
+              <a:rPr lang="en-US" sz="1600" dirty="0" err="1"/>
+              <a:t>augumented</a:t>
+            </a:r>
+            <a:r>
+              <a:rPr lang="en-US" sz="1600" dirty="0"/>
+              <a:t> </a:t>
+            </a:r>
+            <a:r>
+              <a:rPr lang="en-US" sz="1600" dirty="0" err="1"/>
+              <a:t>trên</a:t>
+            </a:r>
+            <a:r>
+              <a:rPr lang="en-US" sz="1600" dirty="0"/>
+              <a:t> 512 </a:t>
+            </a:r>
+            <a:r>
+              <a:rPr lang="en-US" sz="1600" dirty="0" err="1"/>
+              <a:t>ảnh</a:t>
+            </a:r>
+            <a:r>
+              <a:rPr lang="en-US" sz="1600" dirty="0"/>
+              <a:t> </a:t>
+            </a:r>
+            <a:r>
+              <a:rPr lang="en-US" sz="1600" dirty="0" err="1"/>
+              <a:t>gốc</a:t>
+            </a:r>
+            <a:r>
+              <a:rPr lang="en" sz="1600" dirty="0"/>
+              <a:t> </a:t>
+            </a:r>
+            <a:r>
+              <a:rPr lang="en-US" sz="1600" dirty="0" err="1"/>
+              <a:t>theo</a:t>
+            </a:r>
+            <a:r>
+              <a:rPr lang="en-US" sz="1600" dirty="0"/>
+              <a:t> </a:t>
+            </a:r>
+            <a:r>
+              <a:rPr lang="en-US" sz="1600" dirty="0" err="1"/>
+              <a:t>cấu</a:t>
+            </a:r>
+            <a:r>
+              <a:rPr lang="en-US" sz="1600" dirty="0"/>
+              <a:t> </a:t>
+            </a:r>
+            <a:r>
+              <a:rPr lang="en-US" sz="1600" dirty="0" err="1"/>
+              <a:t>hình</a:t>
+            </a:r>
+            <a:r>
+              <a:rPr lang="en-US" sz="1600" dirty="0"/>
+              <a:t> </a:t>
+            </a:r>
+            <a:r>
+              <a:rPr lang="en-US" sz="1600" dirty="0" err="1"/>
+              <a:t>như</a:t>
+            </a:r>
+            <a:r>
+              <a:rPr lang="en-US" sz="1600" dirty="0"/>
+              <a:t> </a:t>
+            </a:r>
+            <a:r>
+              <a:rPr lang="en-US" sz="1600" dirty="0" err="1"/>
+              <a:t>sau</a:t>
+            </a:r>
+            <a:r>
+              <a:rPr lang="en-US" sz="1600" dirty="0"/>
               <a:t>:</a:t>
+            </a:r>
+          </a:p>
+          <a:p>
+            <a:pPr lvl="2">
+              <a:spcBef>
+                <a:spcPts val="0"/>
+              </a:spcBef>
+            </a:pPr>
+            <a:r>
+              <a:rPr lang="en-US" sz="1600" dirty="0"/>
+              <a:t>Size: 416 x 416</a:t>
+            </a:r>
+          </a:p>
+          <a:p>
+            <a:pPr lvl="2">
+              <a:spcBef>
+                <a:spcPts val="0"/>
+              </a:spcBef>
+            </a:pPr>
+            <a:r>
+              <a:rPr lang="en-US" sz="1600" dirty="0"/>
+              <a:t>Rotation: </a:t>
+            </a:r>
+            <a:r>
+              <a:rPr lang="en-US" sz="1600" dirty="0" err="1"/>
+              <a:t>từ</a:t>
+            </a:r>
+            <a:r>
+              <a:rPr lang="en-US" sz="1600" dirty="0"/>
+              <a:t> -45 </a:t>
+            </a:r>
+            <a:r>
+              <a:rPr lang="en-US" sz="1600" dirty="0" err="1"/>
+              <a:t>độ</a:t>
+            </a:r>
+            <a:r>
+              <a:rPr lang="en-US" sz="1600" dirty="0"/>
+              <a:t> </a:t>
+            </a:r>
+            <a:r>
+              <a:rPr lang="en-US" sz="1600" dirty="0" err="1"/>
+              <a:t>đến</a:t>
+            </a:r>
+            <a:r>
+              <a:rPr lang="en-US" sz="1600" dirty="0"/>
+              <a:t> 45 </a:t>
+            </a:r>
+            <a:r>
+              <a:rPr lang="en-US" sz="1600" dirty="0" err="1"/>
+              <a:t>độ</a:t>
+            </a:r>
+            <a:endParaRPr lang="en-US" sz="1600" dirty="0"/>
+          </a:p>
+          <a:p>
+            <a:pPr lvl="2">
+              <a:spcBef>
+                <a:spcPts val="0"/>
+              </a:spcBef>
+            </a:pPr>
+            <a:r>
+              <a:rPr lang="en-US" sz="1600" dirty="0"/>
+              <a:t>Shear: horizontal </a:t>
+            </a:r>
+            <a:r>
+              <a:rPr lang="en-US" sz="1600" dirty="0" err="1"/>
+              <a:t>và</a:t>
+            </a:r>
+            <a:r>
+              <a:rPr lang="en-US" sz="1600" dirty="0"/>
+              <a:t> vertical </a:t>
+            </a:r>
+            <a:r>
+              <a:rPr lang="en-US" sz="1600" dirty="0" err="1"/>
+              <a:t>từ</a:t>
+            </a:r>
+            <a:r>
+              <a:rPr lang="en-US" sz="1600" dirty="0"/>
+              <a:t> -15 </a:t>
+            </a:r>
+            <a:r>
+              <a:rPr lang="en-US" sz="1600" dirty="0" err="1"/>
+              <a:t>độ</a:t>
+            </a:r>
+            <a:r>
+              <a:rPr lang="en-US" sz="1600" dirty="0"/>
+              <a:t> </a:t>
+            </a:r>
+            <a:r>
+              <a:rPr lang="en-US" sz="1600" dirty="0" err="1"/>
+              <a:t>đến</a:t>
+            </a:r>
+            <a:r>
+              <a:rPr lang="en-US" sz="1600" dirty="0"/>
+              <a:t> 15 </a:t>
+            </a:r>
+            <a:r>
+              <a:rPr lang="en-US" sz="1600" dirty="0" err="1"/>
+              <a:t>độ</a:t>
+            </a:r>
+            <a:endParaRPr lang="en-US" sz="1600" dirty="0"/>
+          </a:p>
+          <a:p>
+            <a:pPr lvl="2">
+              <a:spcBef>
+                <a:spcPts val="0"/>
+              </a:spcBef>
+            </a:pPr>
+            <a:r>
+              <a:rPr lang="en-US" sz="1600" dirty="0"/>
+              <a:t>Brightness: </a:t>
+            </a:r>
+            <a:r>
+              <a:rPr lang="en-US" sz="1600" dirty="0" err="1"/>
+              <a:t>từ</a:t>
+            </a:r>
+            <a:r>
+              <a:rPr lang="en-US" sz="1600" dirty="0"/>
+              <a:t> -20% </a:t>
+            </a:r>
+            <a:r>
+              <a:rPr lang="en-US" sz="1600" dirty="0" err="1"/>
+              <a:t>đến</a:t>
+            </a:r>
+            <a:r>
+              <a:rPr lang="en-US" sz="1600" dirty="0"/>
+              <a:t> 20%</a:t>
+            </a:r>
+          </a:p>
+          <a:p>
+            <a:pPr lvl="2">
+              <a:spcBef>
+                <a:spcPts val="0"/>
+              </a:spcBef>
+            </a:pPr>
+            <a:r>
+              <a:rPr lang="vi-VN" sz="1600" dirty="0"/>
+              <a:t>Blur: từ 0px đến 5px</a:t>
+            </a:r>
+          </a:p>
+          <a:p>
+            <a:pPr lvl="2">
+              <a:spcBef>
+                <a:spcPts val="0"/>
+              </a:spcBef>
+            </a:pPr>
+            <a:r>
+              <a:rPr lang="vi-VN" sz="1600" dirty="0"/>
+              <a:t>Noise: từ 0% đến 5%</a:t>
             </a:r>
             <a:endParaRPr sz="1600" dirty="0"/>
           </a:p>
@@ -15026,536 +16698,78 @@
               <a:buChar char="○"/>
             </a:pPr>
             <a:r>
-              <a:rPr lang="en" sz="1600" dirty="0" err="1"/>
-              <a:t>Nguồn</a:t>
-            </a:r>
-            <a:r>
-              <a:rPr lang="en" sz="1600" dirty="0"/>
-              <a:t> </a:t>
-            </a:r>
-            <a:r>
-              <a:rPr lang="en" sz="1600" dirty="0" err="1"/>
-              <a:t>dữ</a:t>
-            </a:r>
-            <a:r>
-              <a:rPr lang="en" sz="1600" dirty="0"/>
-              <a:t> </a:t>
-            </a:r>
-            <a:r>
-              <a:rPr lang="en" sz="1600" dirty="0" err="1"/>
-              <a:t>liệu</a:t>
-            </a:r>
-            <a:r>
-              <a:rPr lang="en" sz="1600" dirty="0"/>
-              <a:t>: </a:t>
+              <a:rPr lang="en" sz="1600" dirty="0"/>
+              <a:t>Testing: 130 </a:t>
             </a:r>
             <a:r>
               <a:rPr lang="en" sz="1600" dirty="0" err="1"/>
               <a:t>ảnh</a:t>
             </a:r>
-            <a:r>
-              <a:rPr lang="en" sz="1600" dirty="0"/>
-              <a:t> </a:t>
-            </a:r>
-            <a:r>
-              <a:rPr lang="en" sz="1600" dirty="0" err="1"/>
-              <a:t>tự</a:t>
-            </a:r>
-            <a:r>
-              <a:rPr lang="en" sz="1600" dirty="0"/>
-              <a:t> </a:t>
-            </a:r>
-            <a:r>
-              <a:rPr lang="en" sz="1600" dirty="0" err="1"/>
-              <a:t>chụp</a:t>
-            </a:r>
-            <a:r>
-              <a:rPr lang="en" sz="1600" dirty="0"/>
-              <a:t> </a:t>
-            </a:r>
-            <a:r>
-              <a:rPr lang="en" sz="1600" dirty="0" err="1"/>
-              <a:t>được</a:t>
-            </a:r>
-            <a:r>
-              <a:rPr lang="en" sz="1600" dirty="0"/>
-              <a:t>, </a:t>
-            </a:r>
-            <a:r>
-              <a:rPr lang="en" sz="1600" dirty="0" err="1"/>
-              <a:t>tìm</a:t>
-            </a:r>
-            <a:r>
-              <a:rPr lang="en" sz="1600" dirty="0"/>
-              <a:t> </a:t>
-            </a:r>
-            <a:r>
-              <a:rPr lang="en" sz="1600" dirty="0" err="1"/>
-              <a:t>kiếm</a:t>
-            </a:r>
-            <a:r>
-              <a:rPr lang="en" sz="1600" dirty="0"/>
-              <a:t> </a:t>
-            </a:r>
-            <a:r>
-              <a:rPr lang="en" sz="1600" dirty="0" err="1"/>
-              <a:t>bằng</a:t>
-            </a:r>
-            <a:r>
-              <a:rPr lang="en" sz="1600" dirty="0"/>
-              <a:t> Google.</a:t>
-            </a:r>
-            <a:endParaRPr sz="1600" dirty="0"/>
+            <a:endParaRPr lang="en" sz="1600" dirty="0"/>
           </a:p>
           <a:p>
-            <a:pPr marL="914400" lvl="1" indent="-355600" algn="l" rtl="0">
-              <a:lnSpc>
-                <a:spcPct val="115000"/>
-              </a:lnSpc>
-              <a:spcBef>
-                <a:spcPts val="0"/>
-              </a:spcBef>
-              <a:spcAft>
-                <a:spcPts val="0"/>
-              </a:spcAft>
-              <a:buSzPts val="2000"/>
-              <a:buChar char="○"/>
+            <a:pPr lvl="1">
+              <a:spcBef>
+                <a:spcPts val="0"/>
+              </a:spcBef>
             </a:pPr>
             <a:r>
-              <a:rPr lang="en" sz="1600" dirty="0" err="1"/>
-              <a:t>Gán</a:t>
-            </a:r>
-            <a:r>
-              <a:rPr lang="en" sz="1600" dirty="0"/>
-              <a:t> </a:t>
-            </a:r>
-            <a:r>
-              <a:rPr lang="en" sz="1600" dirty="0" err="1"/>
-              <a:t>nhãn</a:t>
-            </a:r>
-            <a:r>
-              <a:rPr lang="en" sz="1600" dirty="0"/>
-              <a:t>: </a:t>
-            </a:r>
-            <a:r>
-              <a:rPr lang="en" sz="1600" dirty="0" err="1"/>
-              <a:t>thủ</a:t>
-            </a:r>
-            <a:r>
-              <a:rPr lang="en" sz="1600" dirty="0"/>
-              <a:t> </a:t>
-            </a:r>
-            <a:r>
-              <a:rPr lang="en" sz="1600" dirty="0" err="1"/>
-              <a:t>công</a:t>
-            </a:r>
-            <a:r>
-              <a:rPr lang="en" sz="1600" dirty="0"/>
-              <a:t> </a:t>
-            </a:r>
-            <a:r>
-              <a:rPr lang="en" sz="1600" dirty="0" err="1"/>
-              <a:t>bằng</a:t>
-            </a:r>
-            <a:r>
-              <a:rPr lang="en" sz="1600" dirty="0"/>
-              <a:t> </a:t>
-            </a:r>
-            <a:r>
-              <a:rPr lang="en" sz="1600" dirty="0" err="1"/>
-              <a:t>roboflow</a:t>
-            </a:r>
-            <a:r>
-              <a:rPr lang="en" sz="1600" dirty="0"/>
-              <a:t>.</a:t>
-            </a:r>
-            <a:endParaRPr sz="1600" dirty="0"/>
+              <a:rPr lang="en" sz="1600" dirty="0"/>
+              <a:t>Dataset: </a:t>
+            </a:r>
+            <a:r>
+              <a:rPr lang="en-US" sz="1600" dirty="0">
+                <a:hlinkClick r:id="rId3"/>
+              </a:rPr>
+              <a:t>https://github.com/MaiNga-uit/CS2225.CH1507/tree/master/dataset</a:t>
+            </a:r>
+            <a:endParaRPr lang="en-US" sz="1600" dirty="0"/>
           </a:p>
           <a:p>
-            <a:pPr marL="914400" lvl="1" indent="-355600" algn="l" rtl="0">
-              <a:lnSpc>
-                <a:spcPct val="115000"/>
-              </a:lnSpc>
-              <a:spcBef>
-                <a:spcPts val="0"/>
-              </a:spcBef>
-              <a:spcAft>
-                <a:spcPts val="0"/>
-              </a:spcAft>
-              <a:buSzPts val="2000"/>
-              <a:buChar char="○"/>
+            <a:pPr lvl="1">
+              <a:spcBef>
+                <a:spcPts val="0"/>
+              </a:spcBef>
             </a:pPr>
             <a:r>
-              <a:rPr lang="en" sz="1600" dirty="0" err="1"/>
-              <a:t>Sử</a:t>
-            </a:r>
-            <a:r>
-              <a:rPr lang="en" sz="1600" dirty="0"/>
-              <a:t> </a:t>
-            </a:r>
-            <a:r>
-              <a:rPr lang="en" sz="1600" dirty="0" err="1"/>
-              <a:t>dụng</a:t>
-            </a:r>
-            <a:r>
-              <a:rPr lang="en" sz="1600" dirty="0"/>
-              <a:t> </a:t>
-            </a:r>
-            <a:r>
-              <a:rPr lang="en" sz="1600" dirty="0" err="1"/>
-              <a:t>phương</a:t>
-            </a:r>
-            <a:r>
-              <a:rPr lang="en" sz="1600" dirty="0"/>
-              <a:t> </a:t>
-            </a:r>
-            <a:r>
-              <a:rPr lang="en" sz="1600" dirty="0" err="1"/>
-              <a:t>pháp</a:t>
-            </a:r>
-            <a:r>
-              <a:rPr lang="en" sz="1600" dirty="0"/>
-              <a:t> </a:t>
-            </a:r>
-            <a:r>
-              <a:rPr lang="en" sz="1600" dirty="0">
-                <a:latin typeface="Arial"/>
-                <a:ea typeface="Arial"/>
-                <a:cs typeface="Arial"/>
-                <a:sym typeface="Arial"/>
+              <a:rPr lang="en-US" sz="1600" dirty="0"/>
+              <a:t>TF-record </a:t>
+            </a:r>
+            <a:r>
+              <a:rPr lang="en-US" sz="1600" dirty="0" err="1"/>
+              <a:t>từ</a:t>
+            </a:r>
+            <a:r>
+              <a:rPr lang="en-US" sz="1600" dirty="0"/>
+              <a:t> dataset: </a:t>
+            </a:r>
+            <a:r>
+              <a:rPr lang="en-US" sz="1600" dirty="0">
+                <a:hlinkClick r:id="rId4"/>
               </a:rPr>
-              <a:t>augmented </a:t>
-            </a:r>
-            <a:r>
-              <a:rPr lang="en" sz="1600" dirty="0" err="1">
-                <a:latin typeface="Arial"/>
-                <a:ea typeface="Arial"/>
-                <a:cs typeface="Arial"/>
-                <a:sym typeface="Arial"/>
-              </a:rPr>
-              <a:t>trên</a:t>
-            </a:r>
-            <a:r>
-              <a:rPr lang="en" sz="1600" dirty="0">
-                <a:latin typeface="Arial"/>
-                <a:ea typeface="Arial"/>
-                <a:cs typeface="Arial"/>
-                <a:sym typeface="Arial"/>
-              </a:rPr>
-              <a:t> </a:t>
-            </a:r>
-            <a:r>
-              <a:rPr lang="en" sz="1600" dirty="0" err="1">
-                <a:latin typeface="Arial"/>
-                <a:ea typeface="Arial"/>
-                <a:cs typeface="Arial"/>
-                <a:sym typeface="Arial"/>
-              </a:rPr>
-              <a:t>tập</a:t>
-            </a:r>
-            <a:r>
-              <a:rPr lang="en" sz="1600" dirty="0">
-                <a:latin typeface="Arial"/>
-                <a:ea typeface="Arial"/>
-                <a:cs typeface="Arial"/>
-                <a:sym typeface="Arial"/>
-              </a:rPr>
-              <a:t> </a:t>
-            </a:r>
-            <a:r>
-              <a:rPr lang="en" sz="1600" dirty="0" err="1">
-                <a:latin typeface="Arial"/>
-                <a:ea typeface="Arial"/>
-                <a:cs typeface="Arial"/>
-                <a:sym typeface="Arial"/>
-              </a:rPr>
-              <a:t>dữ</a:t>
-            </a:r>
-            <a:r>
-              <a:rPr lang="en" sz="1600" dirty="0">
-                <a:latin typeface="Arial"/>
-                <a:ea typeface="Arial"/>
-                <a:cs typeface="Arial"/>
-                <a:sym typeface="Arial"/>
-              </a:rPr>
-              <a:t> </a:t>
-            </a:r>
-            <a:r>
-              <a:rPr lang="en" sz="1600" dirty="0" err="1">
-                <a:latin typeface="Arial"/>
-                <a:ea typeface="Arial"/>
-                <a:cs typeface="Arial"/>
-                <a:sym typeface="Arial"/>
-              </a:rPr>
-              <a:t>liệu</a:t>
-            </a:r>
-            <a:r>
-              <a:rPr lang="en" sz="1600" dirty="0">
-                <a:latin typeface="Arial"/>
-                <a:ea typeface="Arial"/>
-                <a:cs typeface="Arial"/>
-                <a:sym typeface="Arial"/>
-              </a:rPr>
-              <a:t> </a:t>
-            </a:r>
-            <a:r>
-              <a:rPr lang="en" sz="1600" dirty="0" err="1">
-                <a:latin typeface="Arial"/>
-                <a:ea typeface="Arial"/>
-                <a:cs typeface="Arial"/>
-                <a:sym typeface="Arial"/>
-              </a:rPr>
-              <a:t>đã</a:t>
-            </a:r>
-            <a:r>
-              <a:rPr lang="en" sz="1600" dirty="0">
-                <a:latin typeface="Arial"/>
-                <a:ea typeface="Arial"/>
-                <a:cs typeface="Arial"/>
-                <a:sym typeface="Arial"/>
-              </a:rPr>
-              <a:t> </a:t>
-            </a:r>
-            <a:r>
-              <a:rPr lang="en" sz="1600" dirty="0" err="1">
-                <a:latin typeface="Arial"/>
-                <a:ea typeface="Arial"/>
-                <a:cs typeface="Arial"/>
-                <a:sym typeface="Arial"/>
-              </a:rPr>
-              <a:t>thu</a:t>
-            </a:r>
-            <a:r>
-              <a:rPr lang="en" sz="1600" dirty="0">
-                <a:latin typeface="Arial"/>
-                <a:ea typeface="Arial"/>
-                <a:cs typeface="Arial"/>
-                <a:sym typeface="Arial"/>
-              </a:rPr>
-              <a:t> </a:t>
-            </a:r>
-            <a:r>
-              <a:rPr lang="en" sz="1600" dirty="0" err="1">
-                <a:latin typeface="Arial"/>
-                <a:ea typeface="Arial"/>
-                <a:cs typeface="Arial"/>
-                <a:sym typeface="Arial"/>
-              </a:rPr>
-              <a:t>thập</a:t>
-            </a:r>
-            <a:r>
-              <a:rPr lang="en" sz="1600" dirty="0">
-                <a:latin typeface="Arial"/>
-                <a:ea typeface="Arial"/>
-                <a:cs typeface="Arial"/>
-                <a:sym typeface="Arial"/>
-              </a:rPr>
-              <a:t> </a:t>
-            </a:r>
-            <a:r>
-              <a:rPr lang="en" sz="1600" dirty="0" err="1">
-                <a:latin typeface="Arial"/>
-                <a:ea typeface="Arial"/>
-                <a:cs typeface="Arial"/>
-                <a:sym typeface="Arial"/>
-              </a:rPr>
-              <a:t>để</a:t>
-            </a:r>
-            <a:r>
-              <a:rPr lang="en" sz="1600" dirty="0">
-                <a:latin typeface="Arial"/>
-                <a:ea typeface="Arial"/>
-                <a:cs typeface="Arial"/>
-                <a:sym typeface="Arial"/>
-              </a:rPr>
-              <a:t> </a:t>
-            </a:r>
-            <a:r>
-              <a:rPr lang="en" sz="1600" dirty="0" err="1">
-                <a:latin typeface="Arial"/>
-                <a:ea typeface="Arial"/>
-                <a:cs typeface="Arial"/>
-                <a:sym typeface="Arial"/>
-              </a:rPr>
-              <a:t>tạo</a:t>
-            </a:r>
-            <a:r>
-              <a:rPr lang="en" sz="1600" dirty="0">
-                <a:latin typeface="Arial"/>
-                <a:ea typeface="Arial"/>
-                <a:cs typeface="Arial"/>
-                <a:sym typeface="Arial"/>
-              </a:rPr>
-              <a:t> </a:t>
-            </a:r>
-            <a:r>
-              <a:rPr lang="en" sz="1600" dirty="0" err="1">
-                <a:latin typeface="Arial"/>
-                <a:ea typeface="Arial"/>
-                <a:cs typeface="Arial"/>
-                <a:sym typeface="Arial"/>
-              </a:rPr>
-              <a:t>sự</a:t>
-            </a:r>
-            <a:r>
-              <a:rPr lang="en" sz="1600" dirty="0">
-                <a:latin typeface="Arial"/>
-                <a:ea typeface="Arial"/>
-                <a:cs typeface="Arial"/>
-                <a:sym typeface="Arial"/>
-              </a:rPr>
-              <a:t> </a:t>
-            </a:r>
-            <a:r>
-              <a:rPr lang="en" sz="1600" dirty="0" err="1">
-                <a:latin typeface="Arial"/>
-                <a:ea typeface="Arial"/>
-                <a:cs typeface="Arial"/>
-                <a:sym typeface="Arial"/>
-              </a:rPr>
-              <a:t>đa</a:t>
-            </a:r>
-            <a:r>
-              <a:rPr lang="en" sz="1600" dirty="0">
-                <a:latin typeface="Arial"/>
-                <a:ea typeface="Arial"/>
-                <a:cs typeface="Arial"/>
-                <a:sym typeface="Arial"/>
-              </a:rPr>
-              <a:t> </a:t>
-            </a:r>
-            <a:r>
-              <a:rPr lang="en" sz="1600" dirty="0" err="1">
-                <a:latin typeface="Arial"/>
-                <a:ea typeface="Arial"/>
-                <a:cs typeface="Arial"/>
-                <a:sym typeface="Arial"/>
-              </a:rPr>
-              <a:t>dạng</a:t>
-            </a:r>
-            <a:r>
-              <a:rPr lang="en" sz="1600" dirty="0">
-                <a:latin typeface="Arial"/>
-                <a:ea typeface="Arial"/>
-                <a:cs typeface="Arial"/>
-                <a:sym typeface="Arial"/>
-              </a:rPr>
-              <a:t> </a:t>
-            </a:r>
-            <a:r>
-              <a:rPr lang="en" sz="1600" dirty="0" err="1">
-                <a:latin typeface="Arial"/>
-                <a:ea typeface="Arial"/>
-                <a:cs typeface="Arial"/>
-                <a:sym typeface="Arial"/>
-              </a:rPr>
-              <a:t>cho</a:t>
-            </a:r>
-            <a:r>
-              <a:rPr lang="en" sz="1600" dirty="0">
-                <a:latin typeface="Arial"/>
-                <a:ea typeface="Arial"/>
-                <a:cs typeface="Arial"/>
-                <a:sym typeface="Arial"/>
-              </a:rPr>
-              <a:t> </a:t>
-            </a:r>
-            <a:r>
-              <a:rPr lang="en" sz="1600" dirty="0" err="1">
-                <a:latin typeface="Arial"/>
-                <a:ea typeface="Arial"/>
-                <a:cs typeface="Arial"/>
-                <a:sym typeface="Arial"/>
-              </a:rPr>
-              <a:t>dữ</a:t>
-            </a:r>
-            <a:r>
-              <a:rPr lang="en" sz="1600" dirty="0">
-                <a:latin typeface="Arial"/>
-                <a:ea typeface="Arial"/>
-                <a:cs typeface="Arial"/>
-                <a:sym typeface="Arial"/>
-              </a:rPr>
-              <a:t> </a:t>
-            </a:r>
-            <a:r>
-              <a:rPr lang="en" sz="1600" dirty="0" err="1">
-                <a:latin typeface="Arial"/>
-                <a:ea typeface="Arial"/>
-                <a:cs typeface="Arial"/>
-                <a:sym typeface="Arial"/>
-              </a:rPr>
-              <a:t>liệu</a:t>
-            </a:r>
-            <a:r>
-              <a:rPr lang="en" sz="1600" dirty="0"/>
-              <a:t>.</a:t>
-            </a:r>
-            <a:endParaRPr sz="1600" dirty="0"/>
+              <a:t>https://app.roboflow.com/ds/6kyOg1KHvY?key=9NoENEKLqj</a:t>
+            </a:r>
+            <a:endParaRPr lang="en-US" sz="1600" dirty="0"/>
           </a:p>
           <a:p>
-            <a:pPr marL="914400" lvl="1" indent="-355600" algn="l" rtl="0">
-              <a:lnSpc>
-                <a:spcPct val="115000"/>
-              </a:lnSpc>
-              <a:spcBef>
-                <a:spcPts val="0"/>
-              </a:spcBef>
-              <a:spcAft>
-                <a:spcPts val="0"/>
-              </a:spcAft>
-              <a:buSzPts val="2000"/>
-              <a:buChar char="○"/>
+            <a:pPr lvl="1">
+              <a:spcBef>
+                <a:spcPts val="0"/>
+              </a:spcBef>
             </a:pPr>
-            <a:r>
-              <a:rPr lang="en" sz="1600" dirty="0" err="1"/>
-              <a:t>Số</a:t>
-            </a:r>
-            <a:r>
-              <a:rPr lang="en" sz="1600" dirty="0"/>
-              <a:t> </a:t>
-            </a:r>
-            <a:r>
-              <a:rPr lang="en" sz="1600" dirty="0" err="1"/>
-              <a:t>nhãn</a:t>
-            </a:r>
-            <a:r>
-              <a:rPr lang="en" sz="1600" dirty="0"/>
-              <a:t>: 6 (</a:t>
-            </a:r>
-            <a:r>
-              <a:rPr lang="en" sz="1600" dirty="0" err="1"/>
-              <a:t>loại</a:t>
-            </a:r>
-            <a:r>
-              <a:rPr lang="en" sz="1600" dirty="0"/>
-              <a:t> </a:t>
-            </a:r>
-            <a:r>
-              <a:rPr lang="en" sz="1600" dirty="0" err="1"/>
-              <a:t>trái</a:t>
-            </a:r>
-            <a:r>
-              <a:rPr lang="en" sz="1600" dirty="0"/>
-              <a:t> </a:t>
-            </a:r>
-            <a:r>
-              <a:rPr lang="en" sz="1600" dirty="0" err="1"/>
-              <a:t>cây</a:t>
-            </a:r>
-            <a:r>
-              <a:rPr lang="en" sz="1600" dirty="0"/>
-              <a:t>).</a:t>
-            </a:r>
+            <a:endParaRPr lang="en-US" sz="1600" dirty="0"/>
+          </a:p>
+          <a:p>
+            <a:pPr lvl="1">
+              <a:spcBef>
+                <a:spcPts val="0"/>
+              </a:spcBef>
+            </a:pPr>
+            <a:endParaRPr lang="en" sz="1600" dirty="0"/>
           </a:p>
         </p:txBody>
       </p:sp>
     </p:spTree>
-    <p:extLst>
-      <p:ext uri="{BB962C8B-B14F-4D97-AF65-F5344CB8AC3E}">
-        <p14:creationId xmlns:p14="http://schemas.microsoft.com/office/powerpoint/2010/main" val="573065521"/>
-      </p:ext>
-    </p:extLst>
   </p:cSld>
   <p:clrMapOvr>
     <a:masterClrMapping/>
@@ -15568,7 +16782,7 @@
   <p:cSld>
     <p:spTree>
       <p:nvGrpSpPr>
-        <p:cNvPr id="1" name="Shape 109"/>
+        <p:cNvPr id="1" name="Shape 103"/>
         <p:cNvGrpSpPr/>
         <p:nvPr/>
       </p:nvGrpSpPr>
@@ -15582,7 +16796,7 @@
       </p:grpSpPr>
       <p:sp>
         <p:nvSpPr>
-          <p:cNvPr id="110" name="Google Shape;110;gb23b97c7f9_0_22"/>
+          <p:cNvPr id="104" name="Google Shape;104;p9"/>
           <p:cNvSpPr txBox="1">
             <a:spLocks noGrp="1"/>
           </p:cNvSpPr>
@@ -15623,16 +16837,24 @@
               <a:buNone/>
             </a:pPr>
             <a:r>
-              <a:rPr lang="en" b="1"/>
-              <a:t>Quy trình thực hiện</a:t>
-            </a:r>
-            <a:endParaRPr/>
+              <a:rPr lang="en" b="1" dirty="0" err="1"/>
+              <a:t>Dữ</a:t>
+            </a:r>
+            <a:r>
+              <a:rPr lang="en" b="1" dirty="0"/>
+              <a:t> </a:t>
+            </a:r>
+            <a:r>
+              <a:rPr lang="en" b="1" dirty="0" err="1"/>
+              <a:t>liệu</a:t>
+            </a:r>
+            <a:endParaRPr dirty="0"/>
           </a:p>
         </p:txBody>
       </p:sp>
       <p:sp>
         <p:nvSpPr>
-          <p:cNvPr id="111" name="Google Shape;111;gb23b97c7f9_0_22"/>
+          <p:cNvPr id="105" name="Google Shape;105;p9"/>
           <p:cNvSpPr txBox="1">
             <a:spLocks noGrp="1"/>
           </p:cNvSpPr>
@@ -15659,26 +16881,13 @@
           </a:bodyPr>
           <a:lstStyle/>
           <a:p>
-            <a:pPr marL="457200" lvl="0" indent="-330200" algn="l" rtl="0">
-              <a:lnSpc>
-                <a:spcPct val="115000"/>
-              </a:lnSpc>
-              <a:spcBef>
-                <a:spcPts val="0"/>
-              </a:spcBef>
-              <a:spcAft>
-                <a:spcPts val="0"/>
-              </a:spcAft>
-              <a:buSzPts val="1600"/>
-              <a:buChar char="●"/>
-            </a:pPr>
-            <a:r>
-              <a:rPr lang="en" sz="1600" dirty="0" err="1"/>
-              <a:t>Bước</a:t>
-            </a:r>
-            <a:r>
-              <a:rPr lang="en" sz="1600" dirty="0"/>
-              <a:t> 1: </a:t>
+            <a:r>
+              <a:rPr lang="en" sz="1600" dirty="0" err="1"/>
+              <a:t>Cách</a:t>
+            </a:r>
+            <a:r>
+              <a:rPr lang="en" sz="1600" dirty="0"/>
+              <a:t> </a:t>
             </a:r>
             <a:r>
               <a:rPr lang="en" sz="1600" dirty="0" err="1"/>
@@ -15694,88 +16903,27 @@
             </a:r>
             <a:r>
               <a:rPr lang="en" sz="1600" dirty="0"/>
-              <a:t> </a:t>
-            </a:r>
-            <a:r>
-              <a:rPr lang="en" sz="1600" dirty="0" err="1"/>
-              <a:t>dữ</a:t>
-            </a:r>
-            <a:r>
-              <a:rPr lang="en" sz="1600" dirty="0"/>
-              <a:t> </a:t>
-            </a:r>
-            <a:r>
-              <a:rPr lang="en" sz="1600" dirty="0" err="1"/>
-              <a:t>liệu</a:t>
-            </a:r>
-            <a:r>
-              <a:rPr lang="en" sz="1600" dirty="0"/>
-              <a:t> </a:t>
-            </a:r>
-            <a:r>
-              <a:rPr lang="en" sz="1600" dirty="0" err="1"/>
-              <a:t>ảnh</a:t>
-            </a:r>
-            <a:r>
-              <a:rPr lang="en" sz="1600" dirty="0"/>
-              <a:t>.</a:t>
+              <a:t>:</a:t>
             </a:r>
             <a:endParaRPr sz="1600" dirty="0"/>
           </a:p>
           <a:p>
-            <a:pPr marL="457200" lvl="0" indent="-330200" algn="l" rtl="0">
-              <a:spcBef>
-                <a:spcPts val="0"/>
-              </a:spcBef>
-              <a:spcAft>
-                <a:spcPts val="0"/>
-              </a:spcAft>
-              <a:buSzPts val="1600"/>
-              <a:buChar char="●"/>
+            <a:pPr marL="914400" lvl="1" indent="-355600" algn="l" rtl="0">
+              <a:lnSpc>
+                <a:spcPct val="115000"/>
+              </a:lnSpc>
+              <a:spcBef>
+                <a:spcPts val="0"/>
+              </a:spcBef>
+              <a:spcAft>
+                <a:spcPts val="0"/>
+              </a:spcAft>
+              <a:buSzPts val="2000"/>
+              <a:buChar char="○"/>
             </a:pPr>
             <a:r>
               <a:rPr lang="en" sz="1600" dirty="0" err="1"/>
-              <a:t>Bước</a:t>
-            </a:r>
-            <a:r>
-              <a:rPr lang="en" sz="1600" dirty="0"/>
-              <a:t> 2: </a:t>
-            </a:r>
-            <a:r>
-              <a:rPr lang="en" sz="1600" dirty="0" err="1"/>
-              <a:t>gán</a:t>
-            </a:r>
-            <a:r>
-              <a:rPr lang="en" sz="1600" dirty="0"/>
-              <a:t> </a:t>
-            </a:r>
-            <a:r>
-              <a:rPr lang="en" sz="1600" dirty="0" err="1"/>
-              <a:t>nhãn</a:t>
-            </a:r>
-            <a:r>
-              <a:rPr lang="en" sz="1600" dirty="0"/>
-              <a:t> </a:t>
-            </a:r>
-            <a:r>
-              <a:rPr lang="en" sz="1600" dirty="0" err="1"/>
-              <a:t>thủ</a:t>
-            </a:r>
-            <a:r>
-              <a:rPr lang="en" sz="1600" dirty="0"/>
-              <a:t> </a:t>
-            </a:r>
-            <a:r>
-              <a:rPr lang="en" sz="1600" dirty="0" err="1"/>
-              <a:t>công</a:t>
-            </a:r>
-            <a:r>
-              <a:rPr lang="en" sz="1600" dirty="0"/>
-              <a:t> </a:t>
-            </a:r>
-            <a:r>
-              <a:rPr lang="en" sz="1600" dirty="0" err="1"/>
-              <a:t>cho</a:t>
+              <a:t>Nguồn</a:t>
             </a:r>
             <a:r>
               <a:rPr lang="en" sz="1600" dirty="0"/>
@@ -15795,27 +16943,51 @@
             </a:r>
             <a:r>
               <a:rPr lang="en" sz="1600" dirty="0"/>
-              <a:t> </a:t>
-            </a:r>
-            <a:r>
-              <a:rPr lang="en" sz="1600" dirty="0" err="1"/>
-              <a:t>đã</a:t>
-            </a:r>
-            <a:r>
-              <a:rPr lang="en" sz="1600" dirty="0"/>
-              <a:t> </a:t>
-            </a:r>
-            <a:r>
-              <a:rPr lang="en" sz="1600" dirty="0" err="1"/>
-              <a:t>thu</a:t>
-            </a:r>
-            <a:r>
-              <a:rPr lang="en" sz="1600" dirty="0"/>
-              <a:t> </a:t>
-            </a:r>
-            <a:r>
-              <a:rPr lang="en" sz="1600" dirty="0" err="1"/>
-              <a:t>thập</a:t>
+              <a:t>: </a:t>
+            </a:r>
+            <a:r>
+              <a:rPr lang="en" sz="1600" dirty="0" err="1"/>
+              <a:t>ảnh</a:t>
+            </a:r>
+            <a:r>
+              <a:rPr lang="en" sz="1600" dirty="0"/>
+              <a:t> </a:t>
+            </a:r>
+            <a:r>
+              <a:rPr lang="en" sz="1600" dirty="0" err="1"/>
+              <a:t>tự</a:t>
+            </a:r>
+            <a:r>
+              <a:rPr lang="en" sz="1600" dirty="0"/>
+              <a:t> </a:t>
+            </a:r>
+            <a:r>
+              <a:rPr lang="en" sz="1600" dirty="0" err="1"/>
+              <a:t>chụp</a:t>
+            </a:r>
+            <a:r>
+              <a:rPr lang="en" sz="1600" dirty="0"/>
+              <a:t> </a:t>
+            </a:r>
+            <a:r>
+              <a:rPr lang="en" sz="1600" dirty="0" err="1"/>
+              <a:t>được</a:t>
+            </a:r>
+            <a:r>
+              <a:rPr lang="en" sz="1600" dirty="0"/>
+              <a:t>, </a:t>
+            </a:r>
+            <a:r>
+              <a:rPr lang="en" sz="1600" dirty="0" err="1"/>
+              <a:t>tìm</a:t>
+            </a:r>
+            <a:r>
+              <a:rPr lang="en" sz="1600" dirty="0"/>
+              <a:t> </a:t>
+            </a:r>
+            <a:r>
+              <a:rPr lang="en" sz="1600" dirty="0" err="1"/>
+              <a:t>kiếm</a:t>
             </a:r>
             <a:r>
               <a:rPr lang="en" sz="1600" dirty="0"/>
@@ -15827,56 +16999,59 @@
             </a:r>
             <a:r>
               <a:rPr lang="en" sz="1600" dirty="0"/>
-              <a:t> </a:t>
-            </a:r>
-            <a:r>
-              <a:rPr lang="en" sz="1600" dirty="0" err="1"/>
-              <a:t>roboflow</a:t>
-            </a:r>
-            <a:r>
-              <a:rPr lang="en" sz="1600" dirty="0"/>
-              <a:t>.</a:t>
+              <a:t> Google.</a:t>
             </a:r>
             <a:endParaRPr sz="1600" dirty="0"/>
           </a:p>
           <a:p>
-            <a:pPr marL="457200" lvl="0" indent="-330200" algn="l" rtl="0">
-              <a:spcBef>
-                <a:spcPts val="0"/>
-              </a:spcBef>
-              <a:spcAft>
-                <a:spcPts val="0"/>
-              </a:spcAft>
-              <a:buSzPts val="1600"/>
-              <a:buChar char="●"/>
+            <a:pPr marL="914400" lvl="1" indent="-355600" algn="l" rtl="0">
+              <a:lnSpc>
+                <a:spcPct val="115000"/>
+              </a:lnSpc>
+              <a:spcBef>
+                <a:spcPts val="0"/>
+              </a:spcBef>
+              <a:spcAft>
+                <a:spcPts val="0"/>
+              </a:spcAft>
+              <a:buSzPts val="2000"/>
+              <a:buChar char="○"/>
             </a:pPr>
             <a:r>
               <a:rPr lang="en" sz="1600" dirty="0" err="1"/>
-              <a:t>Bước</a:t>
-            </a:r>
-            <a:r>
-              <a:rPr lang="en" sz="1600" dirty="0"/>
-              <a:t> 3: </a:t>
-            </a:r>
-            <a:r>
-              <a:rPr lang="en" sz="1600" dirty="0" err="1"/>
-              <a:t>sử</a:t>
-            </a:r>
-            <a:r>
-              <a:rPr lang="en" sz="1600" dirty="0"/>
-              <a:t> </a:t>
-            </a:r>
-            <a:r>
-              <a:rPr lang="en" sz="1600" dirty="0" err="1"/>
-              <a:t>dụng</a:t>
-            </a:r>
-            <a:r>
-              <a:rPr lang="en" sz="1600" dirty="0"/>
-              <a:t> </a:t>
-            </a:r>
-            <a:r>
-              <a:rPr lang="en" sz="1600" dirty="0" err="1"/>
-              <a:t>trang</a:t>
+              <a:t>Gán</a:t>
+            </a:r>
+            <a:r>
+              <a:rPr lang="en" sz="1600" dirty="0"/>
+              <a:t> </a:t>
+            </a:r>
+            <a:r>
+              <a:rPr lang="en" sz="1600" dirty="0" err="1"/>
+              <a:t>nhãn</a:t>
+            </a:r>
+            <a:r>
+              <a:rPr lang="en" sz="1600" dirty="0"/>
+              <a:t>: </a:t>
+            </a:r>
+            <a:r>
+              <a:rPr lang="en" sz="1600" dirty="0" err="1"/>
+              <a:t>thủ</a:t>
+            </a:r>
+            <a:r>
+              <a:rPr lang="en" sz="1600" dirty="0"/>
+              <a:t> </a:t>
+            </a:r>
+            <a:r>
+              <a:rPr lang="en" sz="1600" dirty="0" err="1"/>
+              <a:t>công</a:t>
+            </a:r>
+            <a:r>
+              <a:rPr lang="en" sz="1600" dirty="0"/>
+              <a:t> </a:t>
+            </a:r>
+            <a:r>
+              <a:rPr lang="en" sz="1600" dirty="0" err="1"/>
+              <a:t>bằng</a:t>
             </a:r>
             <a:r>
               <a:rPr lang="en" sz="1600" dirty="0"/>
@@ -15888,84 +17063,12 @@
             </a:r>
             <a:r>
               <a:rPr lang="en" sz="1600" dirty="0"/>
-              <a:t> </a:t>
-            </a:r>
-            <a:r>
-              <a:rPr lang="en" sz="1600" dirty="0" err="1"/>
-              <a:t>tăng</a:t>
-            </a:r>
-            <a:r>
-              <a:rPr lang="en" sz="1600" dirty="0"/>
-              <a:t> </a:t>
-            </a:r>
-            <a:r>
-              <a:rPr lang="en" sz="1600" dirty="0" err="1"/>
-              <a:t>cường</a:t>
-            </a:r>
-            <a:r>
-              <a:rPr lang="en" sz="1600" dirty="0"/>
-              <a:t> </a:t>
-            </a:r>
-            <a:r>
-              <a:rPr lang="en" sz="1600" dirty="0" err="1"/>
-              <a:t>thêm</a:t>
-            </a:r>
-            <a:r>
-              <a:rPr lang="en" sz="1600" dirty="0"/>
-              <a:t> </a:t>
-            </a:r>
-            <a:r>
-              <a:rPr lang="en" sz="1600" dirty="0" err="1"/>
-              <a:t>dữ</a:t>
-            </a:r>
-            <a:r>
-              <a:rPr lang="en" sz="1600" dirty="0"/>
-              <a:t> </a:t>
-            </a:r>
-            <a:r>
-              <a:rPr lang="en" sz="1600" dirty="0" err="1"/>
-              <a:t>liệu</a:t>
-            </a:r>
-            <a:r>
-              <a:rPr lang="en" sz="1600" dirty="0"/>
-              <a:t> </a:t>
-            </a:r>
-            <a:r>
-              <a:rPr lang="en" sz="1600" dirty="0" err="1"/>
-              <a:t>trên</a:t>
-            </a:r>
-            <a:r>
-              <a:rPr lang="en" sz="1600" dirty="0"/>
-              <a:t> </a:t>
-            </a:r>
-            <a:r>
-              <a:rPr lang="en" sz="1600" dirty="0" err="1"/>
-              <a:t>và</a:t>
-            </a:r>
-            <a:r>
-              <a:rPr lang="en" sz="1600" dirty="0"/>
-              <a:t> </a:t>
-            </a:r>
-            <a:r>
-              <a:rPr lang="en" sz="1600" dirty="0" err="1"/>
-              <a:t>trích</a:t>
-            </a:r>
-            <a:r>
-              <a:rPr lang="en" sz="1600" dirty="0"/>
-              <a:t> </a:t>
-            </a:r>
-            <a:r>
-              <a:rPr lang="en" sz="1600" dirty="0" err="1"/>
-              <a:t>xuất</a:t>
-            </a:r>
-            <a:r>
-              <a:rPr lang="en" sz="1600" dirty="0"/>
-              <a:t> file TF-Record.</a:t>
+              <a:t>.</a:t>
             </a:r>
             <a:endParaRPr sz="1600" dirty="0"/>
           </a:p>
           <a:p>
-            <a:pPr marL="457200" lvl="0" indent="-330200" algn="l" rtl="0">
+            <a:pPr marL="914400" lvl="1" indent="-355600" algn="l" rtl="0">
               <a:lnSpc>
                 <a:spcPct val="115000"/>
               </a:lnSpc>
@@ -15975,60 +17078,310 @@
               <a:spcAft>
                 <a:spcPts val="0"/>
               </a:spcAft>
-              <a:buSzPts val="1600"/>
-              <a:buChar char="●"/>
+              <a:buSzPts val="2000"/>
+              <a:buChar char="○"/>
             </a:pPr>
             <a:r>
               <a:rPr lang="en" sz="1600" dirty="0" err="1"/>
-              <a:t>Bước</a:t>
-            </a:r>
-            <a:r>
-              <a:rPr lang="en" sz="1600" dirty="0"/>
-              <a:t> 4: </a:t>
-            </a:r>
-            <a:r>
-              <a:rPr lang="en" sz="1600" dirty="0" err="1"/>
-              <a:t>thiết</a:t>
-            </a:r>
-            <a:r>
-              <a:rPr lang="en" sz="1600" dirty="0"/>
-              <a:t> </a:t>
-            </a:r>
-            <a:r>
-              <a:rPr lang="en" sz="1600" dirty="0" err="1"/>
-              <a:t>lập</a:t>
-            </a:r>
-            <a:r>
-              <a:rPr lang="en" sz="1600" dirty="0"/>
-              <a:t> </a:t>
-            </a:r>
-            <a:r>
-              <a:rPr lang="en" sz="1600" dirty="0" err="1"/>
-              <a:t>môi</a:t>
-            </a:r>
-            <a:r>
-              <a:rPr lang="en" sz="1600" dirty="0"/>
-              <a:t> </a:t>
-            </a:r>
-            <a:r>
-              <a:rPr lang="en" sz="1600" dirty="0" err="1"/>
-              <a:t>trường</a:t>
-            </a:r>
-            <a:r>
-              <a:rPr lang="en" sz="1600" dirty="0"/>
-              <a:t> </a:t>
-            </a:r>
-            <a:r>
-              <a:rPr lang="en" sz="1600" dirty="0" err="1"/>
-              <a:t>trong</a:t>
-            </a:r>
-            <a:r>
-              <a:rPr lang="en" sz="1600" dirty="0"/>
-              <a:t> Google </a:t>
-            </a:r>
-            <a:r>
-              <a:rPr lang="en" sz="1600" dirty="0" err="1"/>
-              <a:t>Colab</a:t>
+              <a:t>Sử</a:t>
+            </a:r>
+            <a:r>
+              <a:rPr lang="en" sz="1600" dirty="0"/>
+              <a:t> </a:t>
+            </a:r>
+            <a:r>
+              <a:rPr lang="en" sz="1600" dirty="0" err="1"/>
+              <a:t>dụng</a:t>
+            </a:r>
+            <a:r>
+              <a:rPr lang="en" sz="1600" dirty="0"/>
+              <a:t> </a:t>
+            </a:r>
+            <a:r>
+              <a:rPr lang="en" sz="1600" dirty="0" err="1"/>
+              <a:t>phương</a:t>
+            </a:r>
+            <a:r>
+              <a:rPr lang="en" sz="1600" dirty="0"/>
+              <a:t> </a:t>
+            </a:r>
+            <a:r>
+              <a:rPr lang="en" sz="1600" dirty="0" err="1"/>
+              <a:t>pháp</a:t>
+            </a:r>
+            <a:r>
+              <a:rPr lang="en" sz="1600" dirty="0"/>
+              <a:t> </a:t>
+            </a:r>
+            <a:r>
+              <a:rPr lang="en" sz="1600" dirty="0">
+                <a:latin typeface="Arial"/>
+                <a:ea typeface="Arial"/>
+                <a:cs typeface="Arial"/>
+                <a:sym typeface="Arial"/>
+              </a:rPr>
+              <a:t>augmented </a:t>
+            </a:r>
+            <a:r>
+              <a:rPr lang="en" sz="1600" dirty="0" err="1">
+                <a:latin typeface="Arial"/>
+                <a:ea typeface="Arial"/>
+                <a:cs typeface="Arial"/>
+                <a:sym typeface="Arial"/>
+              </a:rPr>
+              <a:t>trên</a:t>
+            </a:r>
+            <a:r>
+              <a:rPr lang="en" sz="1600" dirty="0">
+                <a:latin typeface="Arial"/>
+                <a:ea typeface="Arial"/>
+                <a:cs typeface="Arial"/>
+                <a:sym typeface="Arial"/>
+              </a:rPr>
+              <a:t> </a:t>
+            </a:r>
+            <a:r>
+              <a:rPr lang="en" sz="1600" dirty="0" err="1">
+                <a:latin typeface="Arial"/>
+                <a:ea typeface="Arial"/>
+                <a:cs typeface="Arial"/>
+                <a:sym typeface="Arial"/>
+              </a:rPr>
+              <a:t>tập</a:t>
+            </a:r>
+            <a:r>
+              <a:rPr lang="en" sz="1600" dirty="0">
+                <a:latin typeface="Arial"/>
+                <a:ea typeface="Arial"/>
+                <a:cs typeface="Arial"/>
+                <a:sym typeface="Arial"/>
+              </a:rPr>
+              <a:t> </a:t>
+            </a:r>
+            <a:r>
+              <a:rPr lang="en" sz="1600" dirty="0" err="1">
+                <a:latin typeface="Arial"/>
+                <a:ea typeface="Arial"/>
+                <a:cs typeface="Arial"/>
+                <a:sym typeface="Arial"/>
+              </a:rPr>
+              <a:t>dữ</a:t>
+            </a:r>
+            <a:r>
+              <a:rPr lang="en" sz="1600" dirty="0">
+                <a:latin typeface="Arial"/>
+                <a:ea typeface="Arial"/>
+                <a:cs typeface="Arial"/>
+                <a:sym typeface="Arial"/>
+              </a:rPr>
+              <a:t> </a:t>
+            </a:r>
+            <a:r>
+              <a:rPr lang="en" sz="1600" dirty="0" err="1">
+                <a:latin typeface="Arial"/>
+                <a:ea typeface="Arial"/>
+                <a:cs typeface="Arial"/>
+                <a:sym typeface="Arial"/>
+              </a:rPr>
+              <a:t>liệu</a:t>
+            </a:r>
+            <a:r>
+              <a:rPr lang="en" sz="1600" dirty="0">
+                <a:latin typeface="Arial"/>
+                <a:ea typeface="Arial"/>
+                <a:cs typeface="Arial"/>
+                <a:sym typeface="Arial"/>
+              </a:rPr>
+              <a:t> </a:t>
+            </a:r>
+            <a:r>
+              <a:rPr lang="en" sz="1600" dirty="0" err="1">
+                <a:latin typeface="Arial"/>
+                <a:ea typeface="Arial"/>
+                <a:cs typeface="Arial"/>
+                <a:sym typeface="Arial"/>
+              </a:rPr>
+              <a:t>đã</a:t>
+            </a:r>
+            <a:r>
+              <a:rPr lang="en" sz="1600" dirty="0">
+                <a:latin typeface="Arial"/>
+                <a:ea typeface="Arial"/>
+                <a:cs typeface="Arial"/>
+                <a:sym typeface="Arial"/>
+              </a:rPr>
+              <a:t> </a:t>
+            </a:r>
+            <a:r>
+              <a:rPr lang="en" sz="1600" dirty="0" err="1">
+                <a:latin typeface="Arial"/>
+                <a:ea typeface="Arial"/>
+                <a:cs typeface="Arial"/>
+                <a:sym typeface="Arial"/>
+              </a:rPr>
+              <a:t>thu</a:t>
+            </a:r>
+            <a:r>
+              <a:rPr lang="en" sz="1600" dirty="0">
+                <a:latin typeface="Arial"/>
+                <a:ea typeface="Arial"/>
+                <a:cs typeface="Arial"/>
+                <a:sym typeface="Arial"/>
+              </a:rPr>
+              <a:t> </a:t>
+            </a:r>
+            <a:r>
+              <a:rPr lang="en" sz="1600" dirty="0" err="1">
+                <a:latin typeface="Arial"/>
+                <a:ea typeface="Arial"/>
+                <a:cs typeface="Arial"/>
+                <a:sym typeface="Arial"/>
+              </a:rPr>
+              <a:t>thập</a:t>
+            </a:r>
+            <a:r>
+              <a:rPr lang="en" sz="1600" dirty="0">
+                <a:latin typeface="Arial"/>
+                <a:ea typeface="Arial"/>
+                <a:cs typeface="Arial"/>
+                <a:sym typeface="Arial"/>
+              </a:rPr>
+              <a:t> </a:t>
+            </a:r>
+            <a:r>
+              <a:rPr lang="en" sz="1600" dirty="0" err="1">
+                <a:latin typeface="Arial"/>
+                <a:ea typeface="Arial"/>
+                <a:cs typeface="Arial"/>
+                <a:sym typeface="Arial"/>
+              </a:rPr>
+              <a:t>để</a:t>
+            </a:r>
+            <a:r>
+              <a:rPr lang="en" sz="1600" dirty="0">
+                <a:latin typeface="Arial"/>
+                <a:ea typeface="Arial"/>
+                <a:cs typeface="Arial"/>
+                <a:sym typeface="Arial"/>
+              </a:rPr>
+              <a:t> </a:t>
+            </a:r>
+            <a:r>
+              <a:rPr lang="en" sz="1600" dirty="0" err="1">
+                <a:latin typeface="Arial"/>
+                <a:ea typeface="Arial"/>
+                <a:cs typeface="Arial"/>
+                <a:sym typeface="Arial"/>
+              </a:rPr>
+              <a:t>tạo</a:t>
+            </a:r>
+            <a:r>
+              <a:rPr lang="en" sz="1600" dirty="0">
+                <a:latin typeface="Arial"/>
+                <a:ea typeface="Arial"/>
+                <a:cs typeface="Arial"/>
+                <a:sym typeface="Arial"/>
+              </a:rPr>
+              <a:t> </a:t>
+            </a:r>
+            <a:r>
+              <a:rPr lang="en" sz="1600" dirty="0" err="1">
+                <a:latin typeface="Arial"/>
+                <a:ea typeface="Arial"/>
+                <a:cs typeface="Arial"/>
+                <a:sym typeface="Arial"/>
+              </a:rPr>
+              <a:t>sự</a:t>
+            </a:r>
+            <a:r>
+              <a:rPr lang="en" sz="1600" dirty="0">
+                <a:latin typeface="Arial"/>
+                <a:ea typeface="Arial"/>
+                <a:cs typeface="Arial"/>
+                <a:sym typeface="Arial"/>
+              </a:rPr>
+              <a:t> </a:t>
+            </a:r>
+            <a:r>
+              <a:rPr lang="en" sz="1600" dirty="0" err="1">
+                <a:latin typeface="Arial"/>
+                <a:ea typeface="Arial"/>
+                <a:cs typeface="Arial"/>
+                <a:sym typeface="Arial"/>
+              </a:rPr>
+              <a:t>đa</a:t>
+            </a:r>
+            <a:r>
+              <a:rPr lang="en" sz="1600" dirty="0">
+                <a:latin typeface="Arial"/>
+                <a:ea typeface="Arial"/>
+                <a:cs typeface="Arial"/>
+                <a:sym typeface="Arial"/>
+              </a:rPr>
+              <a:t> </a:t>
+            </a:r>
+            <a:r>
+              <a:rPr lang="en" sz="1600" dirty="0" err="1">
+                <a:latin typeface="Arial"/>
+                <a:ea typeface="Arial"/>
+                <a:cs typeface="Arial"/>
+                <a:sym typeface="Arial"/>
+              </a:rPr>
+              <a:t>dạng</a:t>
+            </a:r>
+            <a:r>
+              <a:rPr lang="en" sz="1600" dirty="0">
+                <a:latin typeface="Arial"/>
+                <a:ea typeface="Arial"/>
+                <a:cs typeface="Arial"/>
+                <a:sym typeface="Arial"/>
+              </a:rPr>
+              <a:t> </a:t>
+            </a:r>
+            <a:r>
+              <a:rPr lang="en" sz="1600" dirty="0" err="1">
+                <a:latin typeface="Arial"/>
+                <a:ea typeface="Arial"/>
+                <a:cs typeface="Arial"/>
+                <a:sym typeface="Arial"/>
+              </a:rPr>
+              <a:t>cho</a:t>
+            </a:r>
+            <a:r>
+              <a:rPr lang="en" sz="1600" dirty="0">
+                <a:latin typeface="Arial"/>
+                <a:ea typeface="Arial"/>
+                <a:cs typeface="Arial"/>
+                <a:sym typeface="Arial"/>
+              </a:rPr>
+              <a:t> </a:t>
+            </a:r>
+            <a:r>
+              <a:rPr lang="en" sz="1600" dirty="0" err="1">
+                <a:latin typeface="Arial"/>
+                <a:ea typeface="Arial"/>
+                <a:cs typeface="Arial"/>
+                <a:sym typeface="Arial"/>
+              </a:rPr>
+              <a:t>dữ</a:t>
+            </a:r>
+            <a:r>
+              <a:rPr lang="en" sz="1600" dirty="0">
+                <a:latin typeface="Arial"/>
+                <a:ea typeface="Arial"/>
+                <a:cs typeface="Arial"/>
+                <a:sym typeface="Arial"/>
+              </a:rPr>
+              <a:t> </a:t>
+            </a:r>
+            <a:r>
+              <a:rPr lang="en" sz="1600" dirty="0" err="1">
+                <a:latin typeface="Arial"/>
+                <a:ea typeface="Arial"/>
+                <a:cs typeface="Arial"/>
+                <a:sym typeface="Arial"/>
+              </a:rPr>
+              <a:t>liệu</a:t>
             </a:r>
             <a:r>
               <a:rPr lang="en" sz="1600" dirty="0"/>
@@ -16037,173 +17390,68 @@
             <a:endParaRPr sz="1600" dirty="0"/>
           </a:p>
           <a:p>
-            <a:pPr marL="457200" lvl="0" indent="-330200" algn="l" rtl="0">
-              <a:spcBef>
-                <a:spcPts val="0"/>
-              </a:spcBef>
-              <a:spcAft>
-                <a:spcPts val="0"/>
-              </a:spcAft>
-              <a:buSzPts val="1600"/>
-              <a:buChar char="●"/>
+            <a:pPr marL="914400" lvl="1" indent="-355600" algn="l" rtl="0">
+              <a:lnSpc>
+                <a:spcPct val="115000"/>
+              </a:lnSpc>
+              <a:spcBef>
+                <a:spcPts val="0"/>
+              </a:spcBef>
+              <a:spcAft>
+                <a:spcPts val="0"/>
+              </a:spcAft>
+              <a:buSzPts val="2000"/>
+              <a:buChar char="○"/>
             </a:pPr>
             <a:r>
               <a:rPr lang="en" sz="1600" dirty="0" err="1"/>
-              <a:t>Bước</a:t>
-            </a:r>
-            <a:r>
-              <a:rPr lang="en" sz="1600" dirty="0"/>
-              <a:t> 5: </a:t>
-            </a:r>
-            <a:r>
-              <a:rPr lang="en" sz="1600" dirty="0" err="1"/>
-              <a:t>bắt</a:t>
-            </a:r>
-            <a:r>
-              <a:rPr lang="en" sz="1600" dirty="0"/>
-              <a:t> </a:t>
-            </a:r>
-            <a:r>
-              <a:rPr lang="en" sz="1600" dirty="0" err="1"/>
-              <a:t>đầu</a:t>
-            </a:r>
-            <a:r>
-              <a:rPr lang="en" sz="1600" dirty="0"/>
-              <a:t> train EfficientDet-d0 model </a:t>
-            </a:r>
-            <a:r>
-              <a:rPr lang="en" sz="1600" dirty="0" err="1"/>
-              <a:t>với</a:t>
-            </a:r>
-            <a:r>
-              <a:rPr lang="en" sz="1600" dirty="0"/>
-              <a:t> file </a:t>
-            </a:r>
-            <a:r>
-              <a:rPr lang="en" sz="1600" dirty="0" err="1"/>
-              <a:t>đã</a:t>
-            </a:r>
-            <a:r>
-              <a:rPr lang="en" sz="1600" dirty="0"/>
-              <a:t> </a:t>
-            </a:r>
-            <a:r>
-              <a:rPr lang="en" sz="1600" dirty="0" err="1"/>
-              <a:t>trích</a:t>
-            </a:r>
-            <a:r>
-              <a:rPr lang="en" sz="1600" dirty="0"/>
-              <a:t> </a:t>
-            </a:r>
-            <a:r>
-              <a:rPr lang="en" sz="1600" dirty="0" err="1"/>
-              <a:t>xuất</a:t>
-            </a:r>
-            <a:r>
-              <a:rPr lang="en" sz="1600" dirty="0"/>
-              <a:t> </a:t>
-            </a:r>
-            <a:r>
-              <a:rPr lang="en" sz="1600" dirty="0" err="1"/>
-              <a:t>ở</a:t>
-            </a:r>
-            <a:r>
-              <a:rPr lang="en" sz="1600" dirty="0"/>
-              <a:t> </a:t>
-            </a:r>
-            <a:r>
-              <a:rPr lang="en" sz="1600" dirty="0" err="1"/>
-              <a:t>bước</a:t>
-            </a:r>
-            <a:r>
-              <a:rPr lang="en" sz="1600" dirty="0"/>
-              <a:t> 3</a:t>
-            </a:r>
-            <a:endParaRPr sz="1600" dirty="0"/>
-          </a:p>
-          <a:p>
-            <a:pPr marL="457200" lvl="0" indent="-330200" algn="l" rtl="0">
-              <a:lnSpc>
-                <a:spcPct val="115000"/>
-              </a:lnSpc>
-              <a:spcBef>
-                <a:spcPts val="0"/>
-              </a:spcBef>
-              <a:spcAft>
-                <a:spcPts val="0"/>
-              </a:spcAft>
-              <a:buSzPts val="1600"/>
-              <a:buChar char="●"/>
-            </a:pPr>
-            <a:r>
-              <a:rPr lang="en" sz="1600" dirty="0" err="1"/>
-              <a:t>Bước</a:t>
-            </a:r>
-            <a:r>
-              <a:rPr lang="en" sz="1600" dirty="0"/>
-              <a:t> 6: </a:t>
-            </a:r>
-            <a:r>
-              <a:rPr lang="en" sz="1600" dirty="0" err="1"/>
-              <a:t>thử</a:t>
-            </a:r>
-            <a:r>
-              <a:rPr lang="en" sz="1600" dirty="0"/>
-              <a:t> </a:t>
-            </a:r>
-            <a:r>
-              <a:rPr lang="en" sz="1600" dirty="0" err="1"/>
-              <a:t>nghiệm</a:t>
-            </a:r>
-            <a:r>
-              <a:rPr lang="en" sz="1600" dirty="0"/>
-              <a:t> </a:t>
-            </a:r>
-            <a:r>
-              <a:rPr lang="en" sz="1600" dirty="0" err="1"/>
-              <a:t>trên</a:t>
-            </a:r>
-            <a:r>
-              <a:rPr lang="en" sz="1600" dirty="0"/>
-              <a:t> </a:t>
-            </a:r>
-            <a:r>
-              <a:rPr lang="en" sz="1600" dirty="0" err="1"/>
-              <a:t>ảnh</a:t>
-            </a:r>
-            <a:r>
-              <a:rPr lang="en" sz="1600" dirty="0"/>
-              <a:t> </a:t>
-            </a:r>
-            <a:r>
-              <a:rPr lang="en" sz="1600" dirty="0" err="1"/>
-              <a:t>ngoài</a:t>
-            </a:r>
-            <a:r>
-              <a:rPr lang="en" sz="1600" dirty="0"/>
-              <a:t> </a:t>
-            </a:r>
-            <a:r>
-              <a:rPr lang="en" sz="1600" dirty="0" err="1"/>
-              <a:t>thực</a:t>
-            </a:r>
-            <a:r>
-              <a:rPr lang="en" sz="1600" dirty="0"/>
-              <a:t> </a:t>
-            </a:r>
-            <a:r>
-              <a:rPr lang="en" sz="1600" dirty="0" err="1"/>
-              <a:t>tế</a:t>
-            </a:r>
-            <a:r>
-              <a:rPr lang="en" sz="1600" dirty="0"/>
-              <a:t>.</a:t>
-            </a:r>
-            <a:endParaRPr sz="1800" dirty="0"/>
+              <a:t>Số</a:t>
+            </a:r>
+            <a:r>
+              <a:rPr lang="en" sz="1600" dirty="0"/>
+              <a:t> </a:t>
+            </a:r>
+            <a:r>
+              <a:rPr lang="en" sz="1600" dirty="0" err="1"/>
+              <a:t>nhãn</a:t>
+            </a:r>
+            <a:r>
+              <a:rPr lang="en" sz="1600" dirty="0"/>
+              <a:t>: 6 (</a:t>
+            </a:r>
+            <a:r>
+              <a:rPr lang="en" sz="1600" dirty="0" err="1"/>
+              <a:t>loại</a:t>
+            </a:r>
+            <a:r>
+              <a:rPr lang="en" sz="1600" dirty="0"/>
+              <a:t> </a:t>
+            </a:r>
+            <a:r>
+              <a:rPr lang="en" sz="1600" dirty="0" err="1"/>
+              <a:t>trái</a:t>
+            </a:r>
+            <a:r>
+              <a:rPr lang="en" sz="1600" dirty="0"/>
+              <a:t> </a:t>
+            </a:r>
+            <a:r>
+              <a:rPr lang="en" sz="1600" dirty="0" err="1"/>
+              <a:t>cây</a:t>
+            </a:r>
+            <a:r>
+              <a:rPr lang="en" sz="1600" dirty="0"/>
+              <a:t>).</a:t>
+            </a:r>
           </a:p>
         </p:txBody>
       </p:sp>
     </p:spTree>
+    <p:extLst>
+      <p:ext uri="{BB962C8B-B14F-4D97-AF65-F5344CB8AC3E}">
+        <p14:creationId xmlns:p14="http://schemas.microsoft.com/office/powerpoint/2010/main" val="573065521"/>
+      </p:ext>
+    </p:extLst>
   </p:cSld>
   <p:clrMapOvr>
     <a:masterClrMapping/>

</xml_diff>